<commit_message>
End intro y basics section
</commit_message>
<xml_diff>
--- a/Neural Networks/Slides.pptx
+++ b/Neural Networks/Slides.pptx
@@ -20,19 +20,24 @@
     <p:sldId id="281" r:id="rId14"/>
     <p:sldId id="282" r:id="rId15"/>
     <p:sldId id="283" r:id="rId16"/>
-    <p:sldId id="284" r:id="rId17"/>
+    <p:sldId id="287" r:id="rId17"/>
     <p:sldId id="286" r:id="rId18"/>
-    <p:sldId id="285" r:id="rId19"/>
-    <p:sldId id="257" r:id="rId20"/>
-    <p:sldId id="266" r:id="rId21"/>
-    <p:sldId id="265" r:id="rId22"/>
-    <p:sldId id="258" r:id="rId23"/>
-    <p:sldId id="259" r:id="rId24"/>
-    <p:sldId id="260" r:id="rId25"/>
-    <p:sldId id="261" r:id="rId26"/>
-    <p:sldId id="262" r:id="rId27"/>
-    <p:sldId id="263" r:id="rId28"/>
-    <p:sldId id="264" r:id="rId29"/>
+    <p:sldId id="284" r:id="rId19"/>
+    <p:sldId id="288" r:id="rId20"/>
+    <p:sldId id="289" r:id="rId21"/>
+    <p:sldId id="290" r:id="rId22"/>
+    <p:sldId id="292" r:id="rId23"/>
+    <p:sldId id="285" r:id="rId24"/>
+    <p:sldId id="293" r:id="rId25"/>
+    <p:sldId id="294" r:id="rId26"/>
+    <p:sldId id="295" r:id="rId27"/>
+    <p:sldId id="258" r:id="rId28"/>
+    <p:sldId id="259" r:id="rId29"/>
+    <p:sldId id="260" r:id="rId30"/>
+    <p:sldId id="261" r:id="rId31"/>
+    <p:sldId id="262" r:id="rId32"/>
+    <p:sldId id="263" r:id="rId33"/>
+    <p:sldId id="264" r:id="rId34"/>
   </p:sldIdLst>
   <p:sldSz cx="12192000" cy="6858000"/>
   <p:notesSz cx="6858000" cy="9144000"/>
@@ -3475,7 +3480,7 @@
             </a:r>
             <a:r>
               <a:rPr lang="es-ES" sz="3600" dirty="0"/>
-              <a:t> CNN</a:t>
+              <a:t> CNN ?</a:t>
             </a:r>
             <a:endParaRPr lang="en-US" sz="3600" dirty="0"/>
           </a:p>
@@ -4627,6 +4632,132 @@
           </a:p>
         </p:txBody>
       </p:sp>
+      <p:pic>
+        <p:nvPicPr>
+          <p:cNvPr id="9" name="Picture 8">
+            <a:extLst>
+              <a:ext uri="{FF2B5EF4-FFF2-40B4-BE49-F238E27FC236}">
+                <a16:creationId xmlns:a16="http://schemas.microsoft.com/office/drawing/2014/main" id="{8A7E6DDA-1C0F-D292-9611-C36CB0F3F20A}"/>
+              </a:ext>
+            </a:extLst>
+          </p:cNvPr>
+          <p:cNvPicPr>
+            <a:picLocks noChangeAspect="1"/>
+          </p:cNvPicPr>
+          <p:nvPr/>
+        </p:nvPicPr>
+        <p:blipFill>
+          <a:blip r:embed="rId3"/>
+          <a:stretch>
+            <a:fillRect/>
+          </a:stretch>
+        </p:blipFill>
+        <p:spPr>
+          <a:xfrm>
+            <a:off x="990599" y="5292375"/>
+            <a:ext cx="1342950" cy="828513"/>
+          </a:xfrm>
+          <a:prstGeom prst="rect">
+            <a:avLst/>
+          </a:prstGeom>
+        </p:spPr>
+      </p:pic>
+      <p:pic>
+        <p:nvPicPr>
+          <p:cNvPr id="10" name="Picture 9">
+            <a:extLst>
+              <a:ext uri="{FF2B5EF4-FFF2-40B4-BE49-F238E27FC236}">
+                <a16:creationId xmlns:a16="http://schemas.microsoft.com/office/drawing/2014/main" id="{F3EA20A3-6E68-7906-5343-3F2A28320870}"/>
+              </a:ext>
+            </a:extLst>
+          </p:cNvPr>
+          <p:cNvPicPr>
+            <a:picLocks noChangeAspect="1"/>
+          </p:cNvPicPr>
+          <p:nvPr/>
+        </p:nvPicPr>
+        <p:blipFill>
+          <a:blip r:embed="rId3"/>
+          <a:stretch>
+            <a:fillRect/>
+          </a:stretch>
+        </p:blipFill>
+        <p:spPr>
+          <a:xfrm>
+            <a:off x="8623907" y="5301843"/>
+            <a:ext cx="1342950" cy="828513"/>
+          </a:xfrm>
+          <a:prstGeom prst="rect">
+            <a:avLst/>
+          </a:prstGeom>
+        </p:spPr>
+      </p:pic>
+      <p:pic>
+        <p:nvPicPr>
+          <p:cNvPr id="12" name="Picture 11">
+            <a:extLst>
+              <a:ext uri="{FF2B5EF4-FFF2-40B4-BE49-F238E27FC236}">
+                <a16:creationId xmlns:a16="http://schemas.microsoft.com/office/drawing/2014/main" id="{9C6EC9BA-BD1E-ACB1-24F2-554B5F49F724}"/>
+              </a:ext>
+            </a:extLst>
+          </p:cNvPr>
+          <p:cNvPicPr>
+            <a:picLocks noChangeAspect="1"/>
+          </p:cNvPicPr>
+          <p:nvPr/>
+        </p:nvPicPr>
+        <p:blipFill>
+          <a:blip r:embed="rId4"/>
+          <a:stretch>
+            <a:fillRect/>
+          </a:stretch>
+        </p:blipFill>
+        <p:spPr>
+          <a:xfrm>
+            <a:off x="5413217" y="5451758"/>
+            <a:ext cx="1176745" cy="669130"/>
+          </a:xfrm>
+          <a:prstGeom prst="rect">
+            <a:avLst/>
+          </a:prstGeom>
+        </p:spPr>
+      </p:pic>
+      <p:pic>
+        <p:nvPicPr>
+          <p:cNvPr id="3" name="Picture 2">
+            <a:extLst>
+              <a:ext uri="{FF2B5EF4-FFF2-40B4-BE49-F238E27FC236}">
+                <a16:creationId xmlns:a16="http://schemas.microsoft.com/office/drawing/2014/main" id="{FF3827F1-7F7B-AE81-656E-A42ECD1A4A78}"/>
+              </a:ext>
+            </a:extLst>
+          </p:cNvPr>
+          <p:cNvPicPr>
+            <a:picLocks noChangeAspect="1"/>
+          </p:cNvPicPr>
+          <p:nvPr/>
+        </p:nvPicPr>
+        <p:blipFill>
+          <a:blip r:embed="rId5">
+            <a:extLst>
+              <a:ext uri="{28A0092B-C50C-407E-A947-70E740481C1C}">
+                <a14:useLocalDpi xmlns:a14="http://schemas.microsoft.com/office/drawing/2010/main" val="0"/>
+              </a:ext>
+            </a:extLst>
+          </a:blip>
+          <a:stretch>
+            <a:fillRect/>
+          </a:stretch>
+        </p:blipFill>
+        <p:spPr>
+          <a:xfrm>
+            <a:off x="725536" y="2232984"/>
+            <a:ext cx="9375362" cy="2998012"/>
+          </a:xfrm>
+          <a:prstGeom prst="rect">
+            <a:avLst/>
+          </a:prstGeom>
+        </p:spPr>
+      </p:pic>
     </p:spTree>
     <p:extLst>
       <p:ext uri="{BB962C8B-B14F-4D97-AF65-F5344CB8AC3E}">
@@ -4791,8 +4922,8 @@
         </p:nvSpPr>
         <p:spPr>
           <a:xfrm>
-            <a:off x="990599" y="1727276"/>
-            <a:ext cx="8736875" cy="584775"/>
+            <a:off x="990600" y="1727944"/>
+            <a:ext cx="4498849" cy="1077218"/>
           </a:xfrm>
           <a:prstGeom prst="rect">
             <a:avLst/>
@@ -4806,13 +4937,143 @@
           <a:lstStyle/>
           <a:p>
             <a:r>
+              <a:rPr lang="es-ES" sz="3200" dirty="0" err="1"/>
+              <a:t>Weights</a:t>
+            </a:r>
+            <a:r>
               <a:rPr lang="es-ES" sz="3200" dirty="0"/>
-              <a:t>Pesos</a:t>
+              <a:t> W1, W2(pesos)</a:t>
+            </a:r>
+          </a:p>
+          <a:p>
+            <a:r>
+              <a:rPr lang="es-ES" sz="3200" dirty="0" err="1"/>
+              <a:t>Biases</a:t>
+            </a:r>
+            <a:r>
+              <a:rPr lang="es-ES" sz="3200" dirty="0"/>
+              <a:t> B1, B2 (sesgos)</a:t>
             </a:r>
             <a:endParaRPr lang="en-US" dirty="0"/>
           </a:p>
         </p:txBody>
       </p:sp>
+      <p:sp>
+        <p:nvSpPr>
+          <p:cNvPr id="7" name="Right Brace 6">
+            <a:extLst>
+              <a:ext uri="{FF2B5EF4-FFF2-40B4-BE49-F238E27FC236}">
+                <a16:creationId xmlns:a16="http://schemas.microsoft.com/office/drawing/2014/main" id="{B725706E-10C0-664D-4685-3233EFEBB3B8}"/>
+              </a:ext>
+            </a:extLst>
+          </p:cNvPr>
+          <p:cNvSpPr/>
+          <p:nvPr/>
+        </p:nvSpPr>
+        <p:spPr>
+          <a:xfrm>
+            <a:off x="6195975" y="1843088"/>
+            <a:ext cx="219456" cy="844020"/>
+          </a:xfrm>
+          <a:prstGeom prst="rightBrace">
+            <a:avLst/>
+          </a:prstGeom>
+        </p:spPr>
+        <p:style>
+          <a:lnRef idx="2">
+            <a:schemeClr val="dk1"/>
+          </a:lnRef>
+          <a:fillRef idx="0">
+            <a:schemeClr val="dk1"/>
+          </a:fillRef>
+          <a:effectRef idx="1">
+            <a:schemeClr val="dk1"/>
+          </a:effectRef>
+          <a:fontRef idx="minor">
+            <a:schemeClr val="tx1"/>
+          </a:fontRef>
+        </p:style>
+        <p:txBody>
+          <a:bodyPr rtlCol="0" anchor="ctr"/>
+          <a:lstStyle/>
+          <a:p>
+            <a:pPr algn="ctr"/>
+            <a:endParaRPr lang="en-US"/>
+          </a:p>
+        </p:txBody>
+      </p:sp>
+      <p:sp>
+        <p:nvSpPr>
+          <p:cNvPr id="8" name="TextBox 7">
+            <a:extLst>
+              <a:ext uri="{FF2B5EF4-FFF2-40B4-BE49-F238E27FC236}">
+                <a16:creationId xmlns:a16="http://schemas.microsoft.com/office/drawing/2014/main" id="{0AA4559F-C42D-3844-6118-BF89DCF3ABFF}"/>
+              </a:ext>
+            </a:extLst>
+          </p:cNvPr>
+          <p:cNvSpPr txBox="1"/>
+          <p:nvPr/>
+        </p:nvSpPr>
+        <p:spPr>
+          <a:xfrm>
+            <a:off x="6604406" y="1972710"/>
+            <a:ext cx="3313786" cy="584775"/>
+          </a:xfrm>
+          <a:prstGeom prst="rect">
+            <a:avLst/>
+          </a:prstGeom>
+          <a:noFill/>
+        </p:spPr>
+        <p:txBody>
+          <a:bodyPr wrap="square" rtlCol="0">
+            <a:spAutoFit/>
+          </a:bodyPr>
+          <a:lstStyle/>
+          <a:p>
+            <a:r>
+              <a:rPr lang="es-ES" sz="3200" dirty="0" err="1"/>
+              <a:t>Parameters</a:t>
+            </a:r>
+            <a:endParaRPr lang="en-US" sz="3200" dirty="0"/>
+          </a:p>
+        </p:txBody>
+      </p:sp>
+      <p:pic>
+        <p:nvPicPr>
+          <p:cNvPr id="11" name="Picture 10">
+            <a:extLst>
+              <a:ext uri="{FF2B5EF4-FFF2-40B4-BE49-F238E27FC236}">
+                <a16:creationId xmlns:a16="http://schemas.microsoft.com/office/drawing/2014/main" id="{19C3A436-EFEA-E168-F95C-BED61F1DC004}"/>
+              </a:ext>
+            </a:extLst>
+          </p:cNvPr>
+          <p:cNvPicPr>
+            <a:picLocks noChangeAspect="1"/>
+          </p:cNvPicPr>
+          <p:nvPr/>
+        </p:nvPicPr>
+        <p:blipFill>
+          <a:blip r:embed="rId3">
+            <a:extLst>
+              <a:ext uri="{28A0092B-C50C-407E-A947-70E740481C1C}">
+                <a14:useLocalDpi xmlns:a14="http://schemas.microsoft.com/office/drawing/2010/main" val="0"/>
+              </a:ext>
+            </a:extLst>
+          </a:blip>
+          <a:stretch>
+            <a:fillRect/>
+          </a:stretch>
+        </p:blipFill>
+        <p:spPr>
+          <a:xfrm>
+            <a:off x="1720345" y="3052839"/>
+            <a:ext cx="8751310" cy="2859825"/>
+          </a:xfrm>
+          <a:prstGeom prst="rect">
+            <a:avLst/>
+          </a:prstGeom>
+        </p:spPr>
+      </p:pic>
     </p:spTree>
     <p:extLst>
       <p:ext uri="{BB962C8B-B14F-4D97-AF65-F5344CB8AC3E}">
@@ -4834,7 +5095,7 @@
         <p:cNvPr id="1" name="">
           <a:extLst>
             <a:ext uri="{FF2B5EF4-FFF2-40B4-BE49-F238E27FC236}">
-              <a16:creationId xmlns:a16="http://schemas.microsoft.com/office/drawing/2014/main" id="{277DDAA6-999B-0FA9-9967-04E518FB74DA}"/>
+              <a16:creationId xmlns:a16="http://schemas.microsoft.com/office/drawing/2014/main" id="{D1B9F334-0A3A-9D1B-E1B2-28A1871834AC}"/>
             </a:ext>
           </a:extLst>
         </p:cNvPr>
@@ -4854,7 +5115,7 @@
           <p:cNvPr id="4" name="Title 1">
             <a:extLst>
               <a:ext uri="{FF2B5EF4-FFF2-40B4-BE49-F238E27FC236}">
-                <a16:creationId xmlns:a16="http://schemas.microsoft.com/office/drawing/2014/main" id="{B29ED2FB-63E7-6331-FD2C-3E3F89B22963}"/>
+                <a16:creationId xmlns:a16="http://schemas.microsoft.com/office/drawing/2014/main" id="{B37FC8F4-CD55-9E1C-F86C-BE7233184FB2}"/>
               </a:ext>
             </a:extLst>
           </p:cNvPr>
@@ -4921,7 +5182,7 @@
           <p:cNvPr id="5" name="Picture 2">
             <a:extLst>
               <a:ext uri="{FF2B5EF4-FFF2-40B4-BE49-F238E27FC236}">
-                <a16:creationId xmlns:a16="http://schemas.microsoft.com/office/drawing/2014/main" id="{03D4A094-D469-E3CB-CC66-31393B481A3E}"/>
+                <a16:creationId xmlns:a16="http://schemas.microsoft.com/office/drawing/2014/main" id="{954E6DFD-41F1-6997-EE3C-EFFEEF52C707}"/>
               </a:ext>
             </a:extLst>
           </p:cNvPr>
@@ -4965,10 +5226,10 @@
       </p:pic>
       <p:sp>
         <p:nvSpPr>
-          <p:cNvPr id="6" name="TextBox 5">
-            <a:extLst>
-              <a:ext uri="{FF2B5EF4-FFF2-40B4-BE49-F238E27FC236}">
-                <a16:creationId xmlns:a16="http://schemas.microsoft.com/office/drawing/2014/main" id="{E50D7CA9-92C4-A010-CC9A-FCC2E4BA962B}"/>
+          <p:cNvPr id="8" name="TextBox 7">
+            <a:extLst>
+              <a:ext uri="{FF2B5EF4-FFF2-40B4-BE49-F238E27FC236}">
+                <a16:creationId xmlns:a16="http://schemas.microsoft.com/office/drawing/2014/main" id="{6BD7F12F-28BC-DD59-22CD-7651AF106EBD}"/>
               </a:ext>
             </a:extLst>
           </p:cNvPr>
@@ -4977,8 +5238,8 @@
         </p:nvSpPr>
         <p:spPr>
           <a:xfrm>
-            <a:off x="990599" y="1727276"/>
-            <a:ext cx="8736875" cy="584775"/>
+            <a:off x="990599" y="2023917"/>
+            <a:ext cx="10999013" cy="584775"/>
           </a:xfrm>
           <a:prstGeom prst="rect">
             <a:avLst/>
@@ -4993,16 +5254,106 @@
           <a:p>
             <a:r>
               <a:rPr lang="es-ES" sz="3200" dirty="0"/>
-              <a:t>Pass Forward (propagación hacia delante)</a:t>
-            </a:r>
-            <a:endParaRPr lang="en-US" dirty="0"/>
+              <a:t>Entrenar un modelo = Modificar el valor de los parámetros</a:t>
+            </a:r>
+            <a:endParaRPr lang="en-US" sz="3200" dirty="0"/>
+          </a:p>
+        </p:txBody>
+      </p:sp>
+      <p:sp>
+        <p:nvSpPr>
+          <p:cNvPr id="2" name="TextBox 1">
+            <a:extLst>
+              <a:ext uri="{FF2B5EF4-FFF2-40B4-BE49-F238E27FC236}">
+                <a16:creationId xmlns:a16="http://schemas.microsoft.com/office/drawing/2014/main" id="{92CA06DF-5A54-3AF4-AA34-9D961A3F3075}"/>
+              </a:ext>
+            </a:extLst>
+          </p:cNvPr>
+          <p:cNvSpPr txBox="1"/>
+          <p:nvPr/>
+        </p:nvSpPr>
+        <p:spPr>
+          <a:xfrm>
+            <a:off x="2640787" y="3406876"/>
+            <a:ext cx="7176211" cy="954107"/>
+          </a:xfrm>
+          <a:prstGeom prst="rect">
+            <a:avLst/>
+          </a:prstGeom>
+          <a:noFill/>
+        </p:spPr>
+        <p:txBody>
+          <a:bodyPr wrap="square" rtlCol="0">
+            <a:spAutoFit/>
+          </a:bodyPr>
+          <a:lstStyle/>
+          <a:p>
+            <a:r>
+              <a:rPr lang="en-US" sz="2800" dirty="0"/>
+              <a:t>“We are releasing two model sizes: gpt-oss-</a:t>
+            </a:r>
+            <a:r>
+              <a:rPr lang="en-US" sz="2800" b="1" dirty="0"/>
+              <a:t>120b</a:t>
+            </a:r>
+            <a:r>
+              <a:rPr lang="en-US" sz="2800" dirty="0"/>
+              <a:t>, which consists of </a:t>
+            </a:r>
+            <a:r>
+              <a:rPr lang="en-US" sz="2800" b="1" dirty="0"/>
+              <a:t>36 layers</a:t>
+            </a:r>
+            <a:r>
+              <a:rPr lang="en-US" sz="2800" dirty="0"/>
+              <a:t>…”[1]</a:t>
+            </a:r>
+          </a:p>
+        </p:txBody>
+      </p:sp>
+      <p:sp>
+        <p:nvSpPr>
+          <p:cNvPr id="9" name="TextBox 8">
+            <a:extLst>
+              <a:ext uri="{FF2B5EF4-FFF2-40B4-BE49-F238E27FC236}">
+                <a16:creationId xmlns:a16="http://schemas.microsoft.com/office/drawing/2014/main" id="{4AAABB4F-DAFD-05D8-0B36-5D4353A752AD}"/>
+              </a:ext>
+            </a:extLst>
+          </p:cNvPr>
+          <p:cNvSpPr txBox="1"/>
+          <p:nvPr/>
+        </p:nvSpPr>
+        <p:spPr>
+          <a:xfrm>
+            <a:off x="366354" y="6155809"/>
+            <a:ext cx="9912096" cy="369332"/>
+          </a:xfrm>
+          <a:prstGeom prst="rect">
+            <a:avLst/>
+          </a:prstGeom>
+          <a:noFill/>
+        </p:spPr>
+        <p:txBody>
+          <a:bodyPr wrap="square" rtlCol="0">
+            <a:spAutoFit/>
+          </a:bodyPr>
+          <a:lstStyle/>
+          <a:p>
+            <a:r>
+              <a:rPr lang="es-ES" dirty="0"/>
+              <a:t>[1]</a:t>
+            </a:r>
+            <a:r>
+              <a:rPr lang="en-US" dirty="0"/>
+              <a:t> gpt-oss-120b &amp; gpt-oss-20b Model Card. OpenAI. https://arxiv.org/pdf/2508.10925</a:t>
+            </a:r>
           </a:p>
         </p:txBody>
       </p:sp>
     </p:spTree>
     <p:extLst>
       <p:ext uri="{BB962C8B-B14F-4D97-AF65-F5344CB8AC3E}">
-        <p14:creationId xmlns:p14="http://schemas.microsoft.com/office/powerpoint/2010/main" val="1953171923"/>
+        <p14:creationId xmlns:p14="http://schemas.microsoft.com/office/powerpoint/2010/main" val="418169090"/>
       </p:ext>
     </p:extLst>
   </p:cSld>
@@ -5294,7 +5645,7 @@
         <p:cNvPr id="1" name="">
           <a:extLst>
             <a:ext uri="{FF2B5EF4-FFF2-40B4-BE49-F238E27FC236}">
-              <a16:creationId xmlns:a16="http://schemas.microsoft.com/office/drawing/2014/main" id="{32E87B38-98E2-15EB-FC63-3C25970FF057}"/>
+              <a16:creationId xmlns:a16="http://schemas.microsoft.com/office/drawing/2014/main" id="{277DDAA6-999B-0FA9-9967-04E518FB74DA}"/>
             </a:ext>
           </a:extLst>
         </p:cNvPr>
@@ -5314,7 +5665,7 @@
           <p:cNvPr id="4" name="Title 1">
             <a:extLst>
               <a:ext uri="{FF2B5EF4-FFF2-40B4-BE49-F238E27FC236}">
-                <a16:creationId xmlns:a16="http://schemas.microsoft.com/office/drawing/2014/main" id="{EAFFFCD2-F747-E201-305A-DC88A1DEBBAB}"/>
+                <a16:creationId xmlns:a16="http://schemas.microsoft.com/office/drawing/2014/main" id="{B29ED2FB-63E7-6331-FD2C-3E3F89B22963}"/>
               </a:ext>
             </a:extLst>
           </p:cNvPr>
@@ -5381,7 +5732,7 @@
           <p:cNvPr id="5" name="Picture 2">
             <a:extLst>
               <a:ext uri="{FF2B5EF4-FFF2-40B4-BE49-F238E27FC236}">
-                <a16:creationId xmlns:a16="http://schemas.microsoft.com/office/drawing/2014/main" id="{32174535-53DF-3EA4-F65E-4C914EFC5122}"/>
+                <a16:creationId xmlns:a16="http://schemas.microsoft.com/office/drawing/2014/main" id="{03D4A094-D469-E3CB-CC66-31393B481A3E}"/>
               </a:ext>
             </a:extLst>
           </p:cNvPr>
@@ -5428,7 +5779,7 @@
           <p:cNvPr id="6" name="TextBox 5">
             <a:extLst>
               <a:ext uri="{FF2B5EF4-FFF2-40B4-BE49-F238E27FC236}">
-                <a16:creationId xmlns:a16="http://schemas.microsoft.com/office/drawing/2014/main" id="{FDD79EE7-C1AD-B50B-0C62-A1EB6859859B}"/>
+                <a16:creationId xmlns:a16="http://schemas.microsoft.com/office/drawing/2014/main" id="{E50D7CA9-92C4-A010-CC9A-FCC2E4BA962B}"/>
               </a:ext>
             </a:extLst>
           </p:cNvPr>
@@ -5453,7 +5804,7 @@
           <a:p>
             <a:r>
               <a:rPr lang="es-ES" sz="3200" dirty="0"/>
-              <a:t>¡Práctica!</a:t>
+              <a:t>Pass Forward (propagación hacia delante)</a:t>
             </a:r>
             <a:endParaRPr lang="en-US" dirty="0"/>
           </a:p>
@@ -5461,55 +5812,38 @@
       </p:sp>
       <p:pic>
         <p:nvPicPr>
-          <p:cNvPr id="2" name="Picture 2">
-            <a:extLst>
-              <a:ext uri="{FF2B5EF4-FFF2-40B4-BE49-F238E27FC236}">
-                <a16:creationId xmlns:a16="http://schemas.microsoft.com/office/drawing/2014/main" id="{ADC366CC-A8AE-9C55-41A3-8E4D59E419DD}"/>
+          <p:cNvPr id="2" name="Picture 1">
+            <a:extLst>
+              <a:ext uri="{FF2B5EF4-FFF2-40B4-BE49-F238E27FC236}">
+                <a16:creationId xmlns:a16="http://schemas.microsoft.com/office/drawing/2014/main" id="{3D4ABD9C-8F83-29C3-A2D4-4B49294E38E0}"/>
               </a:ext>
             </a:extLst>
           </p:cNvPr>
           <p:cNvPicPr>
-            <a:picLocks noChangeAspect="1" noChangeArrowheads="1"/>
+            <a:picLocks noChangeAspect="1"/>
           </p:cNvPicPr>
           <p:nvPr/>
         </p:nvPicPr>
         <p:blipFill>
-          <a:blip r:embed="rId3">
-            <a:extLst>
-              <a:ext uri="{28A0092B-C50C-407E-A947-70E740481C1C}">
-                <a14:useLocalDpi xmlns:a14="http://schemas.microsoft.com/office/drawing/2010/main" val="0"/>
-              </a:ext>
-            </a:extLst>
-          </a:blip>
-          <a:srcRect/>
+          <a:blip r:embed="rId3"/>
           <a:stretch>
             <a:fillRect/>
           </a:stretch>
         </p:blipFill>
-        <p:spPr bwMode="auto">
-          <a:xfrm>
-            <a:off x="4902933" y="3019048"/>
-            <a:ext cx="2386134" cy="2767275"/>
-          </a:xfrm>
-          <a:prstGeom prst="rect">
-            <a:avLst/>
-          </a:prstGeom>
-          <a:noFill/>
-          <a:extLst>
-            <a:ext uri="{909E8E84-426E-40DD-AFC4-6F175D3DCCD1}">
-              <a14:hiddenFill xmlns:a14="http://schemas.microsoft.com/office/drawing/2010/main">
-                <a:solidFill>
-                  <a:srgbClr val="FFFFFF"/>
-                </a:solidFill>
-              </a14:hiddenFill>
-            </a:ext>
-          </a:extLst>
+        <p:spPr>
+          <a:xfrm>
+            <a:off x="4355287" y="2632481"/>
+            <a:ext cx="3786226" cy="3826938"/>
+          </a:xfrm>
+          <a:prstGeom prst="rect">
+            <a:avLst/>
+          </a:prstGeom>
         </p:spPr>
       </p:pic>
     </p:spTree>
     <p:extLst>
       <p:ext uri="{BB962C8B-B14F-4D97-AF65-F5344CB8AC3E}">
-        <p14:creationId xmlns:p14="http://schemas.microsoft.com/office/powerpoint/2010/main" val="1966078295"/>
+        <p14:creationId xmlns:p14="http://schemas.microsoft.com/office/powerpoint/2010/main" val="1953171923"/>
       </p:ext>
     </p:extLst>
   </p:cSld>
@@ -5524,7 +5858,13 @@
   <p:cSld>
     <p:spTree>
       <p:nvGrpSpPr>
-        <p:cNvPr id="1" name=""/>
+        <p:cNvPr id="1" name="">
+          <a:extLst>
+            <a:ext uri="{FF2B5EF4-FFF2-40B4-BE49-F238E27FC236}">
+              <a16:creationId xmlns:a16="http://schemas.microsoft.com/office/drawing/2014/main" id="{FA080C8F-6E88-3589-C981-9B3F0A3DB5F0}"/>
+            </a:ext>
+          </a:extLst>
+        </p:cNvPr>
         <p:cNvGrpSpPr/>
         <p:nvPr/>
       </p:nvGrpSpPr>
@@ -5538,33 +5878,65 @@
       </p:grpSpPr>
       <p:sp>
         <p:nvSpPr>
-          <p:cNvPr id="2" name="Title 1">
-            <a:extLst>
-              <a:ext uri="{FF2B5EF4-FFF2-40B4-BE49-F238E27FC236}">
-                <a16:creationId xmlns:a16="http://schemas.microsoft.com/office/drawing/2014/main" id="{6E3C9240-27CF-7467-F469-7D3757BE8013}"/>
-              </a:ext>
-            </a:extLst>
-          </p:cNvPr>
-          <p:cNvSpPr>
-            <a:spLocks noGrp="1"/>
+          <p:cNvPr id="4" name="Title 1">
+            <a:extLst>
+              <a:ext uri="{FF2B5EF4-FFF2-40B4-BE49-F238E27FC236}">
+                <a16:creationId xmlns:a16="http://schemas.microsoft.com/office/drawing/2014/main" id="{1232AB38-9326-5BB4-DD43-E2AEBFE4E0CB}"/>
+              </a:ext>
+            </a:extLst>
+          </p:cNvPr>
+          <p:cNvSpPr txBox="1">
+            <a:spLocks/>
           </p:cNvSpPr>
-          <p:nvPr>
-            <p:ph type="title"/>
-          </p:nvPr>
-        </p:nvSpPr>
-        <p:spPr/>
-        <p:txBody>
-          <a:bodyPr/>
-          <a:lstStyle/>
+          <p:nvPr/>
+        </p:nvSpPr>
+        <p:spPr>
+          <a:xfrm>
+            <a:off x="990600" y="517525"/>
+            <a:ext cx="10515600" cy="1325563"/>
+          </a:xfrm>
+          <a:prstGeom prst="rect">
+            <a:avLst/>
+          </a:prstGeom>
+        </p:spPr>
+        <p:txBody>
+          <a:bodyPr vert="horz" lIns="91440" tIns="45720" rIns="91440" bIns="45720" rtlCol="0" anchor="ctr">
+            <a:normAutofit/>
+          </a:bodyPr>
+          <a:lstStyle>
+            <a:lvl1pPr algn="l" defTabSz="914400" rtl="0" eaLnBrk="1" latinLnBrk="0" hangingPunct="1">
+              <a:lnSpc>
+                <a:spcPct val="90000"/>
+              </a:lnSpc>
+              <a:spcBef>
+                <a:spcPct val="0"/>
+              </a:spcBef>
+              <a:buNone/>
+              <a:defRPr sz="4400" kern="1200">
+                <a:solidFill>
+                  <a:schemeClr val="tx1"/>
+                </a:solidFill>
+                <a:latin typeface="+mj-lt"/>
+                <a:ea typeface="+mj-ea"/>
+                <a:cs typeface="+mj-cs"/>
+              </a:defRPr>
+            </a:lvl1pPr>
+          </a:lstStyle>
           <a:p>
             <a:r>
               <a:rPr lang="es-ES" dirty="0">
+                <a:solidFill>
+                  <a:srgbClr val="EB178E"/>
+                </a:solidFill>
                 <a:latin typeface="Arial" panose="020B0604020202020204" pitchFamily="34" charset="0"/>
                 <a:cs typeface="Arial" panose="020B0604020202020204" pitchFamily="34" charset="0"/>
               </a:rPr>
               <a:t>Conceptos fundamentales</a:t>
             </a:r>
             <a:endParaRPr lang="en-US" dirty="0">
+              <a:solidFill>
+                <a:srgbClr val="EB178E"/>
+              </a:solidFill>
               <a:latin typeface="Arial" panose="020B0604020202020204" pitchFamily="34" charset="0"/>
               <a:cs typeface="Arial" panose="020B0604020202020204" pitchFamily="34" charset="0"/>
             </a:endParaRPr>
@@ -5573,19 +5945,17 @@
       </p:sp>
       <p:pic>
         <p:nvPicPr>
-          <p:cNvPr id="1026" name="Picture 2">
-            <a:extLst>
-              <a:ext uri="{FF2B5EF4-FFF2-40B4-BE49-F238E27FC236}">
-                <a16:creationId xmlns:a16="http://schemas.microsoft.com/office/drawing/2014/main" id="{5B808017-F937-05DA-3781-21EA64EA65EF}"/>
+          <p:cNvPr id="5" name="Picture 2">
+            <a:extLst>
+              <a:ext uri="{FF2B5EF4-FFF2-40B4-BE49-F238E27FC236}">
+                <a16:creationId xmlns:a16="http://schemas.microsoft.com/office/drawing/2014/main" id="{07AF7265-CCD1-4410-6491-1078BD87B710}"/>
               </a:ext>
             </a:extLst>
           </p:cNvPr>
           <p:cNvPicPr>
-            <a:picLocks noGrp="1" noChangeAspect="1" noChangeArrowheads="1"/>
+            <a:picLocks noChangeAspect="1" noChangeArrowheads="1"/>
           </p:cNvPicPr>
-          <p:nvPr>
-            <p:ph idx="1"/>
-          </p:nvPr>
+          <p:nvPr/>
         </p:nvPicPr>
         <p:blipFill>
           <a:blip r:embed="rId2">
@@ -5622,10 +5992,10 @@
       </p:pic>
       <p:sp>
         <p:nvSpPr>
-          <p:cNvPr id="4" name="TextBox 3">
-            <a:extLst>
-              <a:ext uri="{FF2B5EF4-FFF2-40B4-BE49-F238E27FC236}">
-                <a16:creationId xmlns:a16="http://schemas.microsoft.com/office/drawing/2014/main" id="{D381F57B-6303-C80A-E73B-F23F9473E923}"/>
+          <p:cNvPr id="6" name="TextBox 5">
+            <a:extLst>
+              <a:ext uri="{FF2B5EF4-FFF2-40B4-BE49-F238E27FC236}">
+                <a16:creationId xmlns:a16="http://schemas.microsoft.com/office/drawing/2014/main" id="{09FE9133-0C85-F3C5-ECAF-9F384692F635}"/>
               </a:ext>
             </a:extLst>
           </p:cNvPr>
@@ -5634,8 +6004,8 @@
         </p:nvSpPr>
         <p:spPr>
           <a:xfrm>
-            <a:off x="1024128" y="1901952"/>
-            <a:ext cx="5435194" cy="1754326"/>
+            <a:off x="990599" y="1727276"/>
+            <a:ext cx="8736875" cy="584775"/>
           </a:xfrm>
           <a:prstGeom prst="rect">
             <a:avLst/>
@@ -5649,62 +6019,83 @@
           <a:lstStyle/>
           <a:p>
             <a:r>
-              <a:rPr lang="es-ES" dirty="0"/>
-              <a:t>-Nodos</a:t>
-            </a:r>
-          </a:p>
-          <a:p>
-            <a:r>
-              <a:rPr lang="es-ES" dirty="0"/>
-              <a:t>-Pesos</a:t>
-            </a:r>
-          </a:p>
-          <a:p>
-            <a:r>
-              <a:rPr lang="es-ES" dirty="0"/>
-              <a:t>-</a:t>
-            </a:r>
-            <a:r>
-              <a:rPr lang="es-ES" dirty="0">
-                <a:latin typeface="Arial" panose="020B0604020202020204" pitchFamily="34" charset="0"/>
-                <a:cs typeface="Arial" panose="020B0604020202020204" pitchFamily="34" charset="0"/>
-              </a:rPr>
-              <a:t>Sesgos</a:t>
-            </a:r>
-          </a:p>
-          <a:p>
-            <a:r>
-              <a:rPr lang="es-ES" dirty="0"/>
-              <a:t>-</a:t>
-            </a:r>
-            <a:r>
-              <a:rPr lang="es-ES" dirty="0" err="1"/>
-              <a:t>Retropropagación</a:t>
-            </a:r>
-            <a:r>
-              <a:rPr lang="es-ES" dirty="0"/>
-              <a:t> (para otra parte)</a:t>
-            </a:r>
-          </a:p>
-          <a:p>
-            <a:r>
-              <a:rPr lang="es-ES" dirty="0"/>
-              <a:t>-Funciones de activación</a:t>
-            </a:r>
-          </a:p>
-          <a:p>
-            <a:r>
-              <a:rPr lang="es-ES" dirty="0"/>
-              <a:t>-Capa de entrada/salida/oculta</a:t>
+              <a:rPr lang="es-ES" sz="3200" dirty="0"/>
+              <a:t>Pass Forward (propagación hacia delante)</a:t>
             </a:r>
             <a:endParaRPr lang="en-US" dirty="0"/>
           </a:p>
         </p:txBody>
       </p:sp>
+      <p:pic>
+        <p:nvPicPr>
+          <p:cNvPr id="7" name="Picture 6">
+            <a:extLst>
+              <a:ext uri="{FF2B5EF4-FFF2-40B4-BE49-F238E27FC236}">
+                <a16:creationId xmlns:a16="http://schemas.microsoft.com/office/drawing/2014/main" id="{2AD97609-E271-1078-6974-332A6A6077F2}"/>
+              </a:ext>
+            </a:extLst>
+          </p:cNvPr>
+          <p:cNvPicPr>
+            <a:picLocks noChangeAspect="1"/>
+          </p:cNvPicPr>
+          <p:nvPr/>
+        </p:nvPicPr>
+        <p:blipFill>
+          <a:blip r:embed="rId3"/>
+          <a:stretch>
+            <a:fillRect/>
+          </a:stretch>
+        </p:blipFill>
+        <p:spPr>
+          <a:xfrm>
+            <a:off x="3652496" y="2481259"/>
+            <a:ext cx="4887007" cy="571580"/>
+          </a:xfrm>
+          <a:prstGeom prst="rect">
+            <a:avLst/>
+          </a:prstGeom>
+        </p:spPr>
+      </p:pic>
+      <p:pic>
+        <p:nvPicPr>
+          <p:cNvPr id="9" name="Picture 8">
+            <a:extLst>
+              <a:ext uri="{FF2B5EF4-FFF2-40B4-BE49-F238E27FC236}">
+                <a16:creationId xmlns:a16="http://schemas.microsoft.com/office/drawing/2014/main" id="{E6C56934-E810-6747-64C8-DBFAC70CC172}"/>
+              </a:ext>
+            </a:extLst>
+          </p:cNvPr>
+          <p:cNvPicPr>
+            <a:picLocks noChangeAspect="1"/>
+          </p:cNvPicPr>
+          <p:nvPr/>
+        </p:nvPicPr>
+        <p:blipFill>
+          <a:blip r:embed="rId4">
+            <a:extLst>
+              <a:ext uri="{28A0092B-C50C-407E-A947-70E740481C1C}">
+                <a14:useLocalDpi xmlns:a14="http://schemas.microsoft.com/office/drawing/2010/main" val="0"/>
+              </a:ext>
+            </a:extLst>
+          </a:blip>
+          <a:stretch>
+            <a:fillRect/>
+          </a:stretch>
+        </p:blipFill>
+        <p:spPr>
+          <a:xfrm>
+            <a:off x="2201205" y="3429000"/>
+            <a:ext cx="7789589" cy="2818673"/>
+          </a:xfrm>
+          <a:prstGeom prst="rect">
+            <a:avLst/>
+          </a:prstGeom>
+        </p:spPr>
+      </p:pic>
     </p:spTree>
     <p:extLst>
       <p:ext uri="{BB962C8B-B14F-4D97-AF65-F5344CB8AC3E}">
-        <p14:creationId xmlns:p14="http://schemas.microsoft.com/office/powerpoint/2010/main" val="1610773564"/>
+        <p14:creationId xmlns:p14="http://schemas.microsoft.com/office/powerpoint/2010/main" val="2422391758"/>
       </p:ext>
     </p:extLst>
   </p:cSld>
@@ -6048,7 +6439,7 @@
         <p:cNvPr id="1" name="">
           <a:extLst>
             <a:ext uri="{FF2B5EF4-FFF2-40B4-BE49-F238E27FC236}">
-              <a16:creationId xmlns:a16="http://schemas.microsoft.com/office/drawing/2014/main" id="{FA20598D-B610-4AF6-9E2E-F2444C6B750D}"/>
+              <a16:creationId xmlns:a16="http://schemas.microsoft.com/office/drawing/2014/main" id="{5E12B96C-E2BC-2818-1E40-A58481865961}"/>
             </a:ext>
           </a:extLst>
         </p:cNvPr>
@@ -6065,33 +6456,65 @@
       </p:grpSpPr>
       <p:sp>
         <p:nvSpPr>
-          <p:cNvPr id="2" name="Title 1">
-            <a:extLst>
-              <a:ext uri="{FF2B5EF4-FFF2-40B4-BE49-F238E27FC236}">
-                <a16:creationId xmlns:a16="http://schemas.microsoft.com/office/drawing/2014/main" id="{4EE59B75-A8A0-C032-8D87-9D069A16E4B6}"/>
-              </a:ext>
-            </a:extLst>
-          </p:cNvPr>
-          <p:cNvSpPr>
-            <a:spLocks noGrp="1"/>
+          <p:cNvPr id="4" name="Title 1">
+            <a:extLst>
+              <a:ext uri="{FF2B5EF4-FFF2-40B4-BE49-F238E27FC236}">
+                <a16:creationId xmlns:a16="http://schemas.microsoft.com/office/drawing/2014/main" id="{7FC70D1A-5588-4FC5-BE89-76F7B600B330}"/>
+              </a:ext>
+            </a:extLst>
+          </p:cNvPr>
+          <p:cNvSpPr txBox="1">
+            <a:spLocks/>
           </p:cNvSpPr>
-          <p:nvPr>
-            <p:ph type="title"/>
-          </p:nvPr>
-        </p:nvSpPr>
-        <p:spPr/>
-        <p:txBody>
-          <a:bodyPr/>
-          <a:lstStyle/>
+          <p:nvPr/>
+        </p:nvSpPr>
+        <p:spPr>
+          <a:xfrm>
+            <a:off x="990600" y="517525"/>
+            <a:ext cx="10515600" cy="1325563"/>
+          </a:xfrm>
+          <a:prstGeom prst="rect">
+            <a:avLst/>
+          </a:prstGeom>
+        </p:spPr>
+        <p:txBody>
+          <a:bodyPr vert="horz" lIns="91440" tIns="45720" rIns="91440" bIns="45720" rtlCol="0" anchor="ctr">
+            <a:normAutofit/>
+          </a:bodyPr>
+          <a:lstStyle>
+            <a:lvl1pPr algn="l" defTabSz="914400" rtl="0" eaLnBrk="1" latinLnBrk="0" hangingPunct="1">
+              <a:lnSpc>
+                <a:spcPct val="90000"/>
+              </a:lnSpc>
+              <a:spcBef>
+                <a:spcPct val="0"/>
+              </a:spcBef>
+              <a:buNone/>
+              <a:defRPr sz="4400" kern="1200">
+                <a:solidFill>
+                  <a:schemeClr val="tx1"/>
+                </a:solidFill>
+                <a:latin typeface="+mj-lt"/>
+                <a:ea typeface="+mj-ea"/>
+                <a:cs typeface="+mj-cs"/>
+              </a:defRPr>
+            </a:lvl1pPr>
+          </a:lstStyle>
           <a:p>
             <a:r>
               <a:rPr lang="es-ES" dirty="0">
+                <a:solidFill>
+                  <a:srgbClr val="EB178E"/>
+                </a:solidFill>
                 <a:latin typeface="Arial" panose="020B0604020202020204" pitchFamily="34" charset="0"/>
                 <a:cs typeface="Arial" panose="020B0604020202020204" pitchFamily="34" charset="0"/>
               </a:rPr>
-              <a:t>Conceptos fundamentales: funciones de activación</a:t>
+              <a:t>Conceptos fundamentales</a:t>
             </a:r>
             <a:endParaRPr lang="en-US" dirty="0">
+              <a:solidFill>
+                <a:srgbClr val="EB178E"/>
+              </a:solidFill>
               <a:latin typeface="Arial" panose="020B0604020202020204" pitchFamily="34" charset="0"/>
               <a:cs typeface="Arial" panose="020B0604020202020204" pitchFamily="34" charset="0"/>
             </a:endParaRPr>
@@ -6100,19 +6523,17 @@
       </p:sp>
       <p:pic>
         <p:nvPicPr>
-          <p:cNvPr id="1026" name="Picture 2">
-            <a:extLst>
-              <a:ext uri="{FF2B5EF4-FFF2-40B4-BE49-F238E27FC236}">
-                <a16:creationId xmlns:a16="http://schemas.microsoft.com/office/drawing/2014/main" id="{6B0A3714-FFAF-2604-0BD4-1F1D2408F1F8}"/>
+          <p:cNvPr id="5" name="Picture 2">
+            <a:extLst>
+              <a:ext uri="{FF2B5EF4-FFF2-40B4-BE49-F238E27FC236}">
+                <a16:creationId xmlns:a16="http://schemas.microsoft.com/office/drawing/2014/main" id="{13D42AF1-776C-00A4-9879-518E88237CE0}"/>
               </a:ext>
             </a:extLst>
           </p:cNvPr>
           <p:cNvPicPr>
-            <a:picLocks noGrp="1" noChangeAspect="1" noChangeArrowheads="1"/>
+            <a:picLocks noChangeAspect="1" noChangeArrowheads="1"/>
           </p:cNvPicPr>
-          <p:nvPr>
-            <p:ph idx="1"/>
-          </p:nvPr>
+          <p:nvPr/>
         </p:nvPicPr>
         <p:blipFill>
           <a:blip r:embed="rId2">
@@ -6149,10 +6570,10 @@
       </p:pic>
       <p:sp>
         <p:nvSpPr>
-          <p:cNvPr id="4" name="TextBox 3">
-            <a:extLst>
-              <a:ext uri="{FF2B5EF4-FFF2-40B4-BE49-F238E27FC236}">
-                <a16:creationId xmlns:a16="http://schemas.microsoft.com/office/drawing/2014/main" id="{C303F093-D49A-89C8-6906-A44462B52555}"/>
+          <p:cNvPr id="6" name="TextBox 5">
+            <a:extLst>
+              <a:ext uri="{FF2B5EF4-FFF2-40B4-BE49-F238E27FC236}">
+                <a16:creationId xmlns:a16="http://schemas.microsoft.com/office/drawing/2014/main" id="{1CBD628B-8587-1A57-295B-DBBFB6A3DAD9}"/>
               </a:ext>
             </a:extLst>
           </p:cNvPr>
@@ -6161,8 +6582,8 @@
         </p:nvSpPr>
         <p:spPr>
           <a:xfrm>
-            <a:off x="1024128" y="1901952"/>
-            <a:ext cx="5435194" cy="923330"/>
+            <a:off x="990599" y="1727276"/>
+            <a:ext cx="8736875" cy="584775"/>
           </a:xfrm>
           <a:prstGeom prst="rect">
             <a:avLst/>
@@ -6176,70 +6597,83 @@
           <a:lstStyle/>
           <a:p>
             <a:r>
-              <a:rPr lang="es-ES" dirty="0">
-                <a:latin typeface="Arial" panose="020B0604020202020204" pitchFamily="34" charset="0"/>
-                <a:cs typeface="Arial" panose="020B0604020202020204" pitchFamily="34" charset="0"/>
-              </a:rPr>
-              <a:t>-</a:t>
-            </a:r>
-            <a:r>
-              <a:rPr lang="es-ES" dirty="0" err="1">
-                <a:latin typeface="Arial" panose="020B0604020202020204" pitchFamily="34" charset="0"/>
-                <a:cs typeface="Arial" panose="020B0604020202020204" pitchFamily="34" charset="0"/>
-              </a:rPr>
-              <a:t>ReLU</a:t>
-            </a:r>
-            <a:endParaRPr lang="es-ES" dirty="0">
-              <a:latin typeface="Arial" panose="020B0604020202020204" pitchFamily="34" charset="0"/>
-              <a:cs typeface="Arial" panose="020B0604020202020204" pitchFamily="34" charset="0"/>
-            </a:endParaRPr>
-          </a:p>
-          <a:p>
-            <a:r>
-              <a:rPr lang="es-ES" dirty="0">
-                <a:latin typeface="Arial" panose="020B0604020202020204" pitchFamily="34" charset="0"/>
-                <a:cs typeface="Arial" panose="020B0604020202020204" pitchFamily="34" charset="0"/>
-              </a:rPr>
-              <a:t>-</a:t>
-            </a:r>
-            <a:r>
-              <a:rPr lang="es-ES" dirty="0" err="1">
-                <a:latin typeface="Arial" panose="020B0604020202020204" pitchFamily="34" charset="0"/>
-                <a:cs typeface="Arial" panose="020B0604020202020204" pitchFamily="34" charset="0"/>
-              </a:rPr>
-              <a:t>SoftPlus</a:t>
-            </a:r>
-            <a:endParaRPr lang="es-ES" dirty="0">
-              <a:latin typeface="Arial" panose="020B0604020202020204" pitchFamily="34" charset="0"/>
-              <a:cs typeface="Arial" panose="020B0604020202020204" pitchFamily="34" charset="0"/>
-            </a:endParaRPr>
-          </a:p>
-          <a:p>
-            <a:r>
-              <a:rPr lang="es-ES" dirty="0">
-                <a:latin typeface="Arial" panose="020B0604020202020204" pitchFamily="34" charset="0"/>
-                <a:cs typeface="Arial" panose="020B0604020202020204" pitchFamily="34" charset="0"/>
-              </a:rPr>
-              <a:t>-</a:t>
-            </a:r>
-            <a:r>
-              <a:rPr lang="es-ES" dirty="0" err="1">
-                <a:latin typeface="Arial" panose="020B0604020202020204" pitchFamily="34" charset="0"/>
-                <a:cs typeface="Arial" panose="020B0604020202020204" pitchFamily="34" charset="0"/>
-              </a:rPr>
-              <a:t>Sigmoid</a:t>
-            </a:r>
-            <a:endParaRPr lang="en-US" dirty="0">
-              <a:latin typeface="Arial" panose="020B0604020202020204" pitchFamily="34" charset="0"/>
-              <a:cs typeface="Arial" panose="020B0604020202020204" pitchFamily="34" charset="0"/>
-            </a:endParaRPr>
-          </a:p>
-        </p:txBody>
-      </p:sp>
+              <a:rPr lang="es-ES" sz="3200" dirty="0"/>
+              <a:t>Pass Forward (propagación hacia delante)</a:t>
+            </a:r>
+            <a:endParaRPr lang="en-US" dirty="0"/>
+          </a:p>
+        </p:txBody>
+      </p:sp>
+      <p:pic>
+        <p:nvPicPr>
+          <p:cNvPr id="7" name="Picture 6">
+            <a:extLst>
+              <a:ext uri="{FF2B5EF4-FFF2-40B4-BE49-F238E27FC236}">
+                <a16:creationId xmlns:a16="http://schemas.microsoft.com/office/drawing/2014/main" id="{1C4BD7C3-8C46-6B85-F74C-68F66997C414}"/>
+              </a:ext>
+            </a:extLst>
+          </p:cNvPr>
+          <p:cNvPicPr>
+            <a:picLocks noChangeAspect="1"/>
+          </p:cNvPicPr>
+          <p:nvPr/>
+        </p:nvPicPr>
+        <p:blipFill>
+          <a:blip r:embed="rId3"/>
+          <a:stretch>
+            <a:fillRect/>
+          </a:stretch>
+        </p:blipFill>
+        <p:spPr>
+          <a:xfrm>
+            <a:off x="3652496" y="2481259"/>
+            <a:ext cx="4887007" cy="571580"/>
+          </a:xfrm>
+          <a:prstGeom prst="rect">
+            <a:avLst/>
+          </a:prstGeom>
+        </p:spPr>
+      </p:pic>
+      <p:pic>
+        <p:nvPicPr>
+          <p:cNvPr id="3" name="Picture 2">
+            <a:extLst>
+              <a:ext uri="{FF2B5EF4-FFF2-40B4-BE49-F238E27FC236}">
+                <a16:creationId xmlns:a16="http://schemas.microsoft.com/office/drawing/2014/main" id="{1AE9D5A0-D8C6-0A04-BE97-129441962666}"/>
+              </a:ext>
+            </a:extLst>
+          </p:cNvPr>
+          <p:cNvPicPr>
+            <a:picLocks noChangeAspect="1"/>
+          </p:cNvPicPr>
+          <p:nvPr/>
+        </p:nvPicPr>
+        <p:blipFill>
+          <a:blip r:embed="rId4">
+            <a:extLst>
+              <a:ext uri="{28A0092B-C50C-407E-A947-70E740481C1C}">
+                <a14:useLocalDpi xmlns:a14="http://schemas.microsoft.com/office/drawing/2010/main" val="0"/>
+              </a:ext>
+            </a:extLst>
+          </a:blip>
+          <a:stretch>
+            <a:fillRect/>
+          </a:stretch>
+        </p:blipFill>
+        <p:spPr>
+          <a:xfrm>
+            <a:off x="2422358" y="3521802"/>
+            <a:ext cx="7583826" cy="2818673"/>
+          </a:xfrm>
+          <a:prstGeom prst="rect">
+            <a:avLst/>
+          </a:prstGeom>
+        </p:spPr>
+      </p:pic>
     </p:spTree>
     <p:extLst>
       <p:ext uri="{BB962C8B-B14F-4D97-AF65-F5344CB8AC3E}">
-        <p14:creationId xmlns:p14="http://schemas.microsoft.com/office/powerpoint/2010/main" val="377772879"/>
+        <p14:creationId xmlns:p14="http://schemas.microsoft.com/office/powerpoint/2010/main" val="1656302540"/>
       </p:ext>
     </p:extLst>
   </p:cSld>
@@ -6257,7 +6691,1280 @@
         <p:cNvPr id="1" name="">
           <a:extLst>
             <a:ext uri="{FF2B5EF4-FFF2-40B4-BE49-F238E27FC236}">
-              <a16:creationId xmlns:a16="http://schemas.microsoft.com/office/drawing/2014/main" id="{760C7D7C-923E-EABF-2409-58053B934E17}"/>
+              <a16:creationId xmlns:a16="http://schemas.microsoft.com/office/drawing/2014/main" id="{045D1CA0-7982-8C06-F58E-B9F3C9B72FCA}"/>
+            </a:ext>
+          </a:extLst>
+        </p:cNvPr>
+        <p:cNvGrpSpPr/>
+        <p:nvPr/>
+      </p:nvGrpSpPr>
+      <p:grpSpPr>
+        <a:xfrm>
+          <a:off x="0" y="0"/>
+          <a:ext cx="0" cy="0"/>
+          <a:chOff x="0" y="0"/>
+          <a:chExt cx="0" cy="0"/>
+        </a:xfrm>
+      </p:grpSpPr>
+      <p:sp>
+        <p:nvSpPr>
+          <p:cNvPr id="4" name="Title 1">
+            <a:extLst>
+              <a:ext uri="{FF2B5EF4-FFF2-40B4-BE49-F238E27FC236}">
+                <a16:creationId xmlns:a16="http://schemas.microsoft.com/office/drawing/2014/main" id="{D3C07CB2-93BF-8088-BDD5-A36FBF31BE4A}"/>
+              </a:ext>
+            </a:extLst>
+          </p:cNvPr>
+          <p:cNvSpPr txBox="1">
+            <a:spLocks/>
+          </p:cNvSpPr>
+          <p:nvPr/>
+        </p:nvSpPr>
+        <p:spPr>
+          <a:xfrm>
+            <a:off x="990600" y="517525"/>
+            <a:ext cx="10515600" cy="1325563"/>
+          </a:xfrm>
+          <a:prstGeom prst="rect">
+            <a:avLst/>
+          </a:prstGeom>
+        </p:spPr>
+        <p:txBody>
+          <a:bodyPr vert="horz" lIns="91440" tIns="45720" rIns="91440" bIns="45720" rtlCol="0" anchor="ctr">
+            <a:normAutofit/>
+          </a:bodyPr>
+          <a:lstStyle>
+            <a:lvl1pPr algn="l" defTabSz="914400" rtl="0" eaLnBrk="1" latinLnBrk="0" hangingPunct="1">
+              <a:lnSpc>
+                <a:spcPct val="90000"/>
+              </a:lnSpc>
+              <a:spcBef>
+                <a:spcPct val="0"/>
+              </a:spcBef>
+              <a:buNone/>
+              <a:defRPr sz="4400" kern="1200">
+                <a:solidFill>
+                  <a:schemeClr val="tx1"/>
+                </a:solidFill>
+                <a:latin typeface="+mj-lt"/>
+                <a:ea typeface="+mj-ea"/>
+                <a:cs typeface="+mj-cs"/>
+              </a:defRPr>
+            </a:lvl1pPr>
+          </a:lstStyle>
+          <a:p>
+            <a:r>
+              <a:rPr lang="es-ES" dirty="0">
+                <a:solidFill>
+                  <a:srgbClr val="EB178E"/>
+                </a:solidFill>
+                <a:latin typeface="Arial" panose="020B0604020202020204" pitchFamily="34" charset="0"/>
+                <a:cs typeface="Arial" panose="020B0604020202020204" pitchFamily="34" charset="0"/>
+              </a:rPr>
+              <a:t>Conceptos fundamentales</a:t>
+            </a:r>
+            <a:endParaRPr lang="en-US" dirty="0">
+              <a:solidFill>
+                <a:srgbClr val="EB178E"/>
+              </a:solidFill>
+              <a:latin typeface="Arial" panose="020B0604020202020204" pitchFamily="34" charset="0"/>
+              <a:cs typeface="Arial" panose="020B0604020202020204" pitchFamily="34" charset="0"/>
+            </a:endParaRPr>
+          </a:p>
+        </p:txBody>
+      </p:sp>
+      <p:pic>
+        <p:nvPicPr>
+          <p:cNvPr id="5" name="Picture 2">
+            <a:extLst>
+              <a:ext uri="{FF2B5EF4-FFF2-40B4-BE49-F238E27FC236}">
+                <a16:creationId xmlns:a16="http://schemas.microsoft.com/office/drawing/2014/main" id="{C50F67BA-0A83-7A30-F8A6-0ABFEB2F7060}"/>
+              </a:ext>
+            </a:extLst>
+          </p:cNvPr>
+          <p:cNvPicPr>
+            <a:picLocks noChangeAspect="1" noChangeArrowheads="1"/>
+          </p:cNvPicPr>
+          <p:nvPr/>
+        </p:nvPicPr>
+        <p:blipFill>
+          <a:blip r:embed="rId2">
+            <a:extLst>
+              <a:ext uri="{28A0092B-C50C-407E-A947-70E740481C1C}">
+                <a14:useLocalDpi xmlns:a14="http://schemas.microsoft.com/office/drawing/2010/main" val="0"/>
+              </a:ext>
+            </a:extLst>
+          </a:blip>
+          <a:srcRect/>
+          <a:stretch>
+            <a:fillRect/>
+          </a:stretch>
+        </p:blipFill>
+        <p:spPr bwMode="auto">
+          <a:xfrm>
+            <a:off x="10881954" y="5786323"/>
+            <a:ext cx="943692" cy="852856"/>
+          </a:xfrm>
+          <a:prstGeom prst="rect">
+            <a:avLst/>
+          </a:prstGeom>
+          <a:noFill/>
+          <a:extLst>
+            <a:ext uri="{909E8E84-426E-40DD-AFC4-6F175D3DCCD1}">
+              <a14:hiddenFill xmlns:a14="http://schemas.microsoft.com/office/drawing/2010/main">
+                <a:solidFill>
+                  <a:srgbClr val="FFFFFF"/>
+                </a:solidFill>
+              </a14:hiddenFill>
+            </a:ext>
+          </a:extLst>
+        </p:spPr>
+      </p:pic>
+      <p:sp>
+        <p:nvSpPr>
+          <p:cNvPr id="6" name="TextBox 5">
+            <a:extLst>
+              <a:ext uri="{FF2B5EF4-FFF2-40B4-BE49-F238E27FC236}">
+                <a16:creationId xmlns:a16="http://schemas.microsoft.com/office/drawing/2014/main" id="{1A22DCB9-9E77-3B0A-4793-1B17F8ED074C}"/>
+              </a:ext>
+            </a:extLst>
+          </p:cNvPr>
+          <p:cNvSpPr txBox="1"/>
+          <p:nvPr/>
+        </p:nvSpPr>
+        <p:spPr>
+          <a:xfrm>
+            <a:off x="990599" y="1727276"/>
+            <a:ext cx="8736875" cy="584775"/>
+          </a:xfrm>
+          <a:prstGeom prst="rect">
+            <a:avLst/>
+          </a:prstGeom>
+          <a:noFill/>
+        </p:spPr>
+        <p:txBody>
+          <a:bodyPr wrap="square" rtlCol="0">
+            <a:spAutoFit/>
+          </a:bodyPr>
+          <a:lstStyle/>
+          <a:p>
+            <a:r>
+              <a:rPr lang="es-ES" sz="3200" dirty="0"/>
+              <a:t>Pass Forward (propagación hacia delante)</a:t>
+            </a:r>
+            <a:endParaRPr lang="en-US" dirty="0"/>
+          </a:p>
+        </p:txBody>
+      </p:sp>
+      <p:pic>
+        <p:nvPicPr>
+          <p:cNvPr id="7" name="Picture 6">
+            <a:extLst>
+              <a:ext uri="{FF2B5EF4-FFF2-40B4-BE49-F238E27FC236}">
+                <a16:creationId xmlns:a16="http://schemas.microsoft.com/office/drawing/2014/main" id="{30DC10D5-2CF6-4AFF-AC27-138248A9A1DB}"/>
+              </a:ext>
+            </a:extLst>
+          </p:cNvPr>
+          <p:cNvPicPr>
+            <a:picLocks noChangeAspect="1"/>
+          </p:cNvPicPr>
+          <p:nvPr/>
+        </p:nvPicPr>
+        <p:blipFill>
+          <a:blip r:embed="rId3"/>
+          <a:stretch>
+            <a:fillRect/>
+          </a:stretch>
+        </p:blipFill>
+        <p:spPr>
+          <a:xfrm>
+            <a:off x="3652496" y="2481259"/>
+            <a:ext cx="4887007" cy="571580"/>
+          </a:xfrm>
+          <a:prstGeom prst="rect">
+            <a:avLst/>
+          </a:prstGeom>
+        </p:spPr>
+      </p:pic>
+      <p:pic>
+        <p:nvPicPr>
+          <p:cNvPr id="8" name="Picture 7">
+            <a:extLst>
+              <a:ext uri="{FF2B5EF4-FFF2-40B4-BE49-F238E27FC236}">
+                <a16:creationId xmlns:a16="http://schemas.microsoft.com/office/drawing/2014/main" id="{1DDE0384-066A-6B1B-0510-0B32D5EB6B14}"/>
+              </a:ext>
+            </a:extLst>
+          </p:cNvPr>
+          <p:cNvPicPr>
+            <a:picLocks noChangeAspect="1"/>
+          </p:cNvPicPr>
+          <p:nvPr/>
+        </p:nvPicPr>
+        <p:blipFill>
+          <a:blip r:embed="rId4">
+            <a:extLst>
+              <a:ext uri="{28A0092B-C50C-407E-A947-70E740481C1C}">
+                <a14:useLocalDpi xmlns:a14="http://schemas.microsoft.com/office/drawing/2010/main" val="0"/>
+              </a:ext>
+            </a:extLst>
+          </a:blip>
+          <a:stretch>
+            <a:fillRect/>
+          </a:stretch>
+        </p:blipFill>
+        <p:spPr>
+          <a:xfrm>
+            <a:off x="2443075" y="3358678"/>
+            <a:ext cx="7305848" cy="3033003"/>
+          </a:xfrm>
+          <a:prstGeom prst="rect">
+            <a:avLst/>
+          </a:prstGeom>
+        </p:spPr>
+      </p:pic>
+    </p:spTree>
+    <p:extLst>
+      <p:ext uri="{BB962C8B-B14F-4D97-AF65-F5344CB8AC3E}">
+        <p14:creationId xmlns:p14="http://schemas.microsoft.com/office/powerpoint/2010/main" val="3847140594"/>
+      </p:ext>
+    </p:extLst>
+  </p:cSld>
+  <p:clrMapOvr>
+    <a:masterClrMapping/>
+  </p:clrMapOvr>
+</p:sld>
+</file>
+
+<file path=ppt/slides/slide22.xml><?xml version="1.0" encoding="utf-8"?>
+<p:sld xmlns:a="http://schemas.openxmlformats.org/drawingml/2006/main" xmlns:r="http://schemas.openxmlformats.org/officeDocument/2006/relationships" xmlns:p="http://schemas.openxmlformats.org/presentationml/2006/main">
+  <p:cSld>
+    <p:spTree>
+      <p:nvGrpSpPr>
+        <p:cNvPr id="1" name="">
+          <a:extLst>
+            <a:ext uri="{FF2B5EF4-FFF2-40B4-BE49-F238E27FC236}">
+              <a16:creationId xmlns:a16="http://schemas.microsoft.com/office/drawing/2014/main" id="{BA139E03-A8DE-213D-DAF0-6C573D506C48}"/>
+            </a:ext>
+          </a:extLst>
+        </p:cNvPr>
+        <p:cNvGrpSpPr/>
+        <p:nvPr/>
+      </p:nvGrpSpPr>
+      <p:grpSpPr>
+        <a:xfrm>
+          <a:off x="0" y="0"/>
+          <a:ext cx="0" cy="0"/>
+          <a:chOff x="0" y="0"/>
+          <a:chExt cx="0" cy="0"/>
+        </a:xfrm>
+      </p:grpSpPr>
+      <p:sp>
+        <p:nvSpPr>
+          <p:cNvPr id="4" name="Title 1">
+            <a:extLst>
+              <a:ext uri="{FF2B5EF4-FFF2-40B4-BE49-F238E27FC236}">
+                <a16:creationId xmlns:a16="http://schemas.microsoft.com/office/drawing/2014/main" id="{56B0ACEE-FC41-3A75-55E1-8855E90BFF92}"/>
+              </a:ext>
+            </a:extLst>
+          </p:cNvPr>
+          <p:cNvSpPr txBox="1">
+            <a:spLocks/>
+          </p:cNvSpPr>
+          <p:nvPr/>
+        </p:nvSpPr>
+        <p:spPr>
+          <a:xfrm>
+            <a:off x="990600" y="517525"/>
+            <a:ext cx="10515600" cy="1325563"/>
+          </a:xfrm>
+          <a:prstGeom prst="rect">
+            <a:avLst/>
+          </a:prstGeom>
+        </p:spPr>
+        <p:txBody>
+          <a:bodyPr vert="horz" lIns="91440" tIns="45720" rIns="91440" bIns="45720" rtlCol="0" anchor="ctr">
+            <a:normAutofit/>
+          </a:bodyPr>
+          <a:lstStyle>
+            <a:lvl1pPr algn="l" defTabSz="914400" rtl="0" eaLnBrk="1" latinLnBrk="0" hangingPunct="1">
+              <a:lnSpc>
+                <a:spcPct val="90000"/>
+              </a:lnSpc>
+              <a:spcBef>
+                <a:spcPct val="0"/>
+              </a:spcBef>
+              <a:buNone/>
+              <a:defRPr sz="4400" kern="1200">
+                <a:solidFill>
+                  <a:schemeClr val="tx1"/>
+                </a:solidFill>
+                <a:latin typeface="+mj-lt"/>
+                <a:ea typeface="+mj-ea"/>
+                <a:cs typeface="+mj-cs"/>
+              </a:defRPr>
+            </a:lvl1pPr>
+          </a:lstStyle>
+          <a:p>
+            <a:r>
+              <a:rPr lang="es-ES" dirty="0">
+                <a:solidFill>
+                  <a:srgbClr val="EB178E"/>
+                </a:solidFill>
+                <a:latin typeface="Arial" panose="020B0604020202020204" pitchFamily="34" charset="0"/>
+                <a:cs typeface="Arial" panose="020B0604020202020204" pitchFamily="34" charset="0"/>
+              </a:rPr>
+              <a:t>Conceptos fundamentales</a:t>
+            </a:r>
+            <a:endParaRPr lang="en-US" dirty="0">
+              <a:solidFill>
+                <a:srgbClr val="EB178E"/>
+              </a:solidFill>
+              <a:latin typeface="Arial" panose="020B0604020202020204" pitchFamily="34" charset="0"/>
+              <a:cs typeface="Arial" panose="020B0604020202020204" pitchFamily="34" charset="0"/>
+            </a:endParaRPr>
+          </a:p>
+        </p:txBody>
+      </p:sp>
+      <p:pic>
+        <p:nvPicPr>
+          <p:cNvPr id="5" name="Picture 2">
+            <a:extLst>
+              <a:ext uri="{FF2B5EF4-FFF2-40B4-BE49-F238E27FC236}">
+                <a16:creationId xmlns:a16="http://schemas.microsoft.com/office/drawing/2014/main" id="{6E555114-EC2B-BB43-EA49-2EF0AC4E278D}"/>
+              </a:ext>
+            </a:extLst>
+          </p:cNvPr>
+          <p:cNvPicPr>
+            <a:picLocks noChangeAspect="1" noChangeArrowheads="1"/>
+          </p:cNvPicPr>
+          <p:nvPr/>
+        </p:nvPicPr>
+        <p:blipFill>
+          <a:blip r:embed="rId2">
+            <a:extLst>
+              <a:ext uri="{28A0092B-C50C-407E-A947-70E740481C1C}">
+                <a14:useLocalDpi xmlns:a14="http://schemas.microsoft.com/office/drawing/2010/main" val="0"/>
+              </a:ext>
+            </a:extLst>
+          </a:blip>
+          <a:srcRect/>
+          <a:stretch>
+            <a:fillRect/>
+          </a:stretch>
+        </p:blipFill>
+        <p:spPr bwMode="auto">
+          <a:xfrm>
+            <a:off x="10881954" y="5786323"/>
+            <a:ext cx="943692" cy="852856"/>
+          </a:xfrm>
+          <a:prstGeom prst="rect">
+            <a:avLst/>
+          </a:prstGeom>
+          <a:noFill/>
+          <a:extLst>
+            <a:ext uri="{909E8E84-426E-40DD-AFC4-6F175D3DCCD1}">
+              <a14:hiddenFill xmlns:a14="http://schemas.microsoft.com/office/drawing/2010/main">
+                <a:solidFill>
+                  <a:srgbClr val="FFFFFF"/>
+                </a:solidFill>
+              </a14:hiddenFill>
+            </a:ext>
+          </a:extLst>
+        </p:spPr>
+      </p:pic>
+      <p:sp>
+        <p:nvSpPr>
+          <p:cNvPr id="6" name="TextBox 5">
+            <a:extLst>
+              <a:ext uri="{FF2B5EF4-FFF2-40B4-BE49-F238E27FC236}">
+                <a16:creationId xmlns:a16="http://schemas.microsoft.com/office/drawing/2014/main" id="{B4B29201-1811-F3AB-E510-BC1B9104C780}"/>
+              </a:ext>
+            </a:extLst>
+          </p:cNvPr>
+          <p:cNvSpPr txBox="1"/>
+          <p:nvPr/>
+        </p:nvSpPr>
+        <p:spPr>
+          <a:xfrm>
+            <a:off x="990599" y="1727276"/>
+            <a:ext cx="8736875" cy="584775"/>
+          </a:xfrm>
+          <a:prstGeom prst="rect">
+            <a:avLst/>
+          </a:prstGeom>
+          <a:noFill/>
+        </p:spPr>
+        <p:txBody>
+          <a:bodyPr wrap="square" rtlCol="0">
+            <a:spAutoFit/>
+          </a:bodyPr>
+          <a:lstStyle/>
+          <a:p>
+            <a:r>
+              <a:rPr lang="es-ES" sz="3200" dirty="0"/>
+              <a:t>Pass Forward (propagación hacia delante)</a:t>
+            </a:r>
+            <a:endParaRPr lang="en-US" dirty="0"/>
+          </a:p>
+        </p:txBody>
+      </p:sp>
+      <p:pic>
+        <p:nvPicPr>
+          <p:cNvPr id="2" name="Picture 1" descr="A graph with blue dots and a triangle&#10;&#10;AI-generated content may be incorrect.">
+            <a:extLst>
+              <a:ext uri="{FF2B5EF4-FFF2-40B4-BE49-F238E27FC236}">
+                <a16:creationId xmlns:a16="http://schemas.microsoft.com/office/drawing/2014/main" id="{131DFFF9-3561-DDE8-2EBC-FEDCE1C5D71C}"/>
+              </a:ext>
+            </a:extLst>
+          </p:cNvPr>
+          <p:cNvPicPr>
+            <a:picLocks noChangeAspect="1"/>
+          </p:cNvPicPr>
+          <p:nvPr/>
+        </p:nvPicPr>
+        <p:blipFill>
+          <a:blip r:embed="rId3">
+            <a:extLst>
+              <a:ext uri="{28A0092B-C50C-407E-A947-70E740481C1C}">
+                <a14:useLocalDpi xmlns:a14="http://schemas.microsoft.com/office/drawing/2010/main" val="0"/>
+              </a:ext>
+            </a:extLst>
+          </a:blip>
+          <a:stretch>
+            <a:fillRect/>
+          </a:stretch>
+        </p:blipFill>
+        <p:spPr>
+          <a:xfrm>
+            <a:off x="3293358" y="2483974"/>
+            <a:ext cx="5605283" cy="4123952"/>
+          </a:xfrm>
+          <a:prstGeom prst="rect">
+            <a:avLst/>
+          </a:prstGeom>
+        </p:spPr>
+      </p:pic>
+    </p:spTree>
+    <p:extLst>
+      <p:ext uri="{BB962C8B-B14F-4D97-AF65-F5344CB8AC3E}">
+        <p14:creationId xmlns:p14="http://schemas.microsoft.com/office/powerpoint/2010/main" val="2078529337"/>
+      </p:ext>
+    </p:extLst>
+  </p:cSld>
+  <p:clrMapOvr>
+    <a:masterClrMapping/>
+  </p:clrMapOvr>
+</p:sld>
+</file>
+
+<file path=ppt/slides/slide23.xml><?xml version="1.0" encoding="utf-8"?>
+<p:sld xmlns:a="http://schemas.openxmlformats.org/drawingml/2006/main" xmlns:r="http://schemas.openxmlformats.org/officeDocument/2006/relationships" xmlns:p="http://schemas.openxmlformats.org/presentationml/2006/main">
+  <p:cSld>
+    <p:spTree>
+      <p:nvGrpSpPr>
+        <p:cNvPr id="1" name="">
+          <a:extLst>
+            <a:ext uri="{FF2B5EF4-FFF2-40B4-BE49-F238E27FC236}">
+              <a16:creationId xmlns:a16="http://schemas.microsoft.com/office/drawing/2014/main" id="{32E87B38-98E2-15EB-FC63-3C25970FF057}"/>
+            </a:ext>
+          </a:extLst>
+        </p:cNvPr>
+        <p:cNvGrpSpPr/>
+        <p:nvPr/>
+      </p:nvGrpSpPr>
+      <p:grpSpPr>
+        <a:xfrm>
+          <a:off x="0" y="0"/>
+          <a:ext cx="0" cy="0"/>
+          <a:chOff x="0" y="0"/>
+          <a:chExt cx="0" cy="0"/>
+        </a:xfrm>
+      </p:grpSpPr>
+      <p:sp>
+        <p:nvSpPr>
+          <p:cNvPr id="4" name="Title 1">
+            <a:extLst>
+              <a:ext uri="{FF2B5EF4-FFF2-40B4-BE49-F238E27FC236}">
+                <a16:creationId xmlns:a16="http://schemas.microsoft.com/office/drawing/2014/main" id="{EAFFFCD2-F747-E201-305A-DC88A1DEBBAB}"/>
+              </a:ext>
+            </a:extLst>
+          </p:cNvPr>
+          <p:cNvSpPr txBox="1">
+            <a:spLocks/>
+          </p:cNvSpPr>
+          <p:nvPr/>
+        </p:nvSpPr>
+        <p:spPr>
+          <a:xfrm>
+            <a:off x="990600" y="517525"/>
+            <a:ext cx="10515600" cy="1325563"/>
+          </a:xfrm>
+          <a:prstGeom prst="rect">
+            <a:avLst/>
+          </a:prstGeom>
+        </p:spPr>
+        <p:txBody>
+          <a:bodyPr vert="horz" lIns="91440" tIns="45720" rIns="91440" bIns="45720" rtlCol="0" anchor="ctr">
+            <a:normAutofit/>
+          </a:bodyPr>
+          <a:lstStyle>
+            <a:lvl1pPr algn="l" defTabSz="914400" rtl="0" eaLnBrk="1" latinLnBrk="0" hangingPunct="1">
+              <a:lnSpc>
+                <a:spcPct val="90000"/>
+              </a:lnSpc>
+              <a:spcBef>
+                <a:spcPct val="0"/>
+              </a:spcBef>
+              <a:buNone/>
+              <a:defRPr sz="4400" kern="1200">
+                <a:solidFill>
+                  <a:schemeClr val="tx1"/>
+                </a:solidFill>
+                <a:latin typeface="+mj-lt"/>
+                <a:ea typeface="+mj-ea"/>
+                <a:cs typeface="+mj-cs"/>
+              </a:defRPr>
+            </a:lvl1pPr>
+          </a:lstStyle>
+          <a:p>
+            <a:r>
+              <a:rPr lang="es-ES" dirty="0">
+                <a:solidFill>
+                  <a:srgbClr val="EB178E"/>
+                </a:solidFill>
+                <a:latin typeface="Arial" panose="020B0604020202020204" pitchFamily="34" charset="0"/>
+                <a:cs typeface="Arial" panose="020B0604020202020204" pitchFamily="34" charset="0"/>
+              </a:rPr>
+              <a:t>Conceptos fundamentales</a:t>
+            </a:r>
+            <a:endParaRPr lang="en-US" dirty="0">
+              <a:solidFill>
+                <a:srgbClr val="EB178E"/>
+              </a:solidFill>
+              <a:latin typeface="Arial" panose="020B0604020202020204" pitchFamily="34" charset="0"/>
+              <a:cs typeface="Arial" panose="020B0604020202020204" pitchFamily="34" charset="0"/>
+            </a:endParaRPr>
+          </a:p>
+        </p:txBody>
+      </p:sp>
+      <p:pic>
+        <p:nvPicPr>
+          <p:cNvPr id="5" name="Picture 2">
+            <a:extLst>
+              <a:ext uri="{FF2B5EF4-FFF2-40B4-BE49-F238E27FC236}">
+                <a16:creationId xmlns:a16="http://schemas.microsoft.com/office/drawing/2014/main" id="{32174535-53DF-3EA4-F65E-4C914EFC5122}"/>
+              </a:ext>
+            </a:extLst>
+          </p:cNvPr>
+          <p:cNvPicPr>
+            <a:picLocks noChangeAspect="1" noChangeArrowheads="1"/>
+          </p:cNvPicPr>
+          <p:nvPr/>
+        </p:nvPicPr>
+        <p:blipFill>
+          <a:blip r:embed="rId2">
+            <a:extLst>
+              <a:ext uri="{28A0092B-C50C-407E-A947-70E740481C1C}">
+                <a14:useLocalDpi xmlns:a14="http://schemas.microsoft.com/office/drawing/2010/main" val="0"/>
+              </a:ext>
+            </a:extLst>
+          </a:blip>
+          <a:srcRect/>
+          <a:stretch>
+            <a:fillRect/>
+          </a:stretch>
+        </p:blipFill>
+        <p:spPr bwMode="auto">
+          <a:xfrm>
+            <a:off x="10881954" y="5786323"/>
+            <a:ext cx="943692" cy="852856"/>
+          </a:xfrm>
+          <a:prstGeom prst="rect">
+            <a:avLst/>
+          </a:prstGeom>
+          <a:noFill/>
+          <a:extLst>
+            <a:ext uri="{909E8E84-426E-40DD-AFC4-6F175D3DCCD1}">
+              <a14:hiddenFill xmlns:a14="http://schemas.microsoft.com/office/drawing/2010/main">
+                <a:solidFill>
+                  <a:srgbClr val="FFFFFF"/>
+                </a:solidFill>
+              </a14:hiddenFill>
+            </a:ext>
+          </a:extLst>
+        </p:spPr>
+      </p:pic>
+      <p:sp>
+        <p:nvSpPr>
+          <p:cNvPr id="6" name="TextBox 5">
+            <a:extLst>
+              <a:ext uri="{FF2B5EF4-FFF2-40B4-BE49-F238E27FC236}">
+                <a16:creationId xmlns:a16="http://schemas.microsoft.com/office/drawing/2014/main" id="{FDD79EE7-C1AD-B50B-0C62-A1EB6859859B}"/>
+              </a:ext>
+            </a:extLst>
+          </p:cNvPr>
+          <p:cNvSpPr txBox="1"/>
+          <p:nvPr/>
+        </p:nvSpPr>
+        <p:spPr>
+          <a:xfrm>
+            <a:off x="990599" y="1727276"/>
+            <a:ext cx="8736875" cy="584775"/>
+          </a:xfrm>
+          <a:prstGeom prst="rect">
+            <a:avLst/>
+          </a:prstGeom>
+          <a:noFill/>
+        </p:spPr>
+        <p:txBody>
+          <a:bodyPr wrap="square" rtlCol="0">
+            <a:spAutoFit/>
+          </a:bodyPr>
+          <a:lstStyle/>
+          <a:p>
+            <a:r>
+              <a:rPr lang="es-ES" sz="3200" dirty="0"/>
+              <a:t>¡Práctica!</a:t>
+            </a:r>
+            <a:endParaRPr lang="en-US" dirty="0"/>
+          </a:p>
+        </p:txBody>
+      </p:sp>
+      <p:pic>
+        <p:nvPicPr>
+          <p:cNvPr id="2" name="Picture 2">
+            <a:extLst>
+              <a:ext uri="{FF2B5EF4-FFF2-40B4-BE49-F238E27FC236}">
+                <a16:creationId xmlns:a16="http://schemas.microsoft.com/office/drawing/2014/main" id="{ADC366CC-A8AE-9C55-41A3-8E4D59E419DD}"/>
+              </a:ext>
+            </a:extLst>
+          </p:cNvPr>
+          <p:cNvPicPr>
+            <a:picLocks noChangeAspect="1" noChangeArrowheads="1"/>
+          </p:cNvPicPr>
+          <p:nvPr/>
+        </p:nvPicPr>
+        <p:blipFill>
+          <a:blip r:embed="rId3">
+            <a:extLst>
+              <a:ext uri="{28A0092B-C50C-407E-A947-70E740481C1C}">
+                <a14:useLocalDpi xmlns:a14="http://schemas.microsoft.com/office/drawing/2010/main" val="0"/>
+              </a:ext>
+            </a:extLst>
+          </a:blip>
+          <a:srcRect/>
+          <a:stretch>
+            <a:fillRect/>
+          </a:stretch>
+        </p:blipFill>
+        <p:spPr bwMode="auto">
+          <a:xfrm>
+            <a:off x="4902933" y="3019048"/>
+            <a:ext cx="2386134" cy="2767275"/>
+          </a:xfrm>
+          <a:prstGeom prst="rect">
+            <a:avLst/>
+          </a:prstGeom>
+          <a:noFill/>
+          <a:extLst>
+            <a:ext uri="{909E8E84-426E-40DD-AFC4-6F175D3DCCD1}">
+              <a14:hiddenFill xmlns:a14="http://schemas.microsoft.com/office/drawing/2010/main">
+                <a:solidFill>
+                  <a:srgbClr val="FFFFFF"/>
+                </a:solidFill>
+              </a14:hiddenFill>
+            </a:ext>
+          </a:extLst>
+        </p:spPr>
+      </p:pic>
+    </p:spTree>
+    <p:extLst>
+      <p:ext uri="{BB962C8B-B14F-4D97-AF65-F5344CB8AC3E}">
+        <p14:creationId xmlns:p14="http://schemas.microsoft.com/office/powerpoint/2010/main" val="1966078295"/>
+      </p:ext>
+    </p:extLst>
+  </p:cSld>
+  <p:clrMapOvr>
+    <a:masterClrMapping/>
+  </p:clrMapOvr>
+</p:sld>
+</file>
+
+<file path=ppt/slides/slide24.xml><?xml version="1.0" encoding="utf-8"?>
+<p:sld xmlns:a="http://schemas.openxmlformats.org/drawingml/2006/main" xmlns:r="http://schemas.openxmlformats.org/officeDocument/2006/relationships" xmlns:p="http://schemas.openxmlformats.org/presentationml/2006/main">
+  <p:cSld>
+    <p:spTree>
+      <p:nvGrpSpPr>
+        <p:cNvPr id="1" name="">
+          <a:extLst>
+            <a:ext uri="{FF2B5EF4-FFF2-40B4-BE49-F238E27FC236}">
+              <a16:creationId xmlns:a16="http://schemas.microsoft.com/office/drawing/2014/main" id="{23F03464-B471-C8B5-2B29-27C840592014}"/>
+            </a:ext>
+          </a:extLst>
+        </p:cNvPr>
+        <p:cNvGrpSpPr/>
+        <p:nvPr/>
+      </p:nvGrpSpPr>
+      <p:grpSpPr>
+        <a:xfrm>
+          <a:off x="0" y="0"/>
+          <a:ext cx="0" cy="0"/>
+          <a:chOff x="0" y="0"/>
+          <a:chExt cx="0" cy="0"/>
+        </a:xfrm>
+      </p:grpSpPr>
+      <p:sp>
+        <p:nvSpPr>
+          <p:cNvPr id="4" name="Title 1">
+            <a:extLst>
+              <a:ext uri="{FF2B5EF4-FFF2-40B4-BE49-F238E27FC236}">
+                <a16:creationId xmlns:a16="http://schemas.microsoft.com/office/drawing/2014/main" id="{DF243AB3-1552-2CEB-9C4E-E055BAA13182}"/>
+              </a:ext>
+            </a:extLst>
+          </p:cNvPr>
+          <p:cNvSpPr txBox="1">
+            <a:spLocks/>
+          </p:cNvSpPr>
+          <p:nvPr/>
+        </p:nvSpPr>
+        <p:spPr>
+          <a:xfrm>
+            <a:off x="990600" y="517525"/>
+            <a:ext cx="11079480" cy="1325563"/>
+          </a:xfrm>
+          <a:prstGeom prst="rect">
+            <a:avLst/>
+          </a:prstGeom>
+        </p:spPr>
+        <p:txBody>
+          <a:bodyPr vert="horz" lIns="91440" tIns="45720" rIns="91440" bIns="45720" rtlCol="0" anchor="ctr">
+            <a:normAutofit/>
+          </a:bodyPr>
+          <a:lstStyle>
+            <a:lvl1pPr algn="l" defTabSz="914400" rtl="0" eaLnBrk="1" latinLnBrk="0" hangingPunct="1">
+              <a:lnSpc>
+                <a:spcPct val="90000"/>
+              </a:lnSpc>
+              <a:spcBef>
+                <a:spcPct val="0"/>
+              </a:spcBef>
+              <a:buNone/>
+              <a:defRPr sz="4400" kern="1200">
+                <a:solidFill>
+                  <a:schemeClr val="tx1"/>
+                </a:solidFill>
+                <a:latin typeface="+mj-lt"/>
+                <a:ea typeface="+mj-ea"/>
+                <a:cs typeface="+mj-cs"/>
+              </a:defRPr>
+            </a:lvl1pPr>
+          </a:lstStyle>
+          <a:p>
+            <a:r>
+              <a:rPr lang="es-ES" dirty="0">
+                <a:solidFill>
+                  <a:srgbClr val="EB178E"/>
+                </a:solidFill>
+                <a:latin typeface="Arial" panose="020B0604020202020204" pitchFamily="34" charset="0"/>
+                <a:cs typeface="Arial" panose="020B0604020202020204" pitchFamily="34" charset="0"/>
+              </a:rPr>
+              <a:t>Optimización </a:t>
+            </a:r>
+            <a:r>
+              <a:rPr lang="es-ES" dirty="0" err="1">
+                <a:solidFill>
+                  <a:srgbClr val="EB178E"/>
+                </a:solidFill>
+                <a:latin typeface="Arial" panose="020B0604020202020204" pitchFamily="34" charset="0"/>
+                <a:cs typeface="Arial" panose="020B0604020202020204" pitchFamily="34" charset="0"/>
+              </a:rPr>
+              <a:t>weights</a:t>
+            </a:r>
+            <a:r>
+              <a:rPr lang="es-ES" dirty="0">
+                <a:solidFill>
+                  <a:srgbClr val="EB178E"/>
+                </a:solidFill>
+                <a:latin typeface="Arial" panose="020B0604020202020204" pitchFamily="34" charset="0"/>
+                <a:cs typeface="Arial" panose="020B0604020202020204" pitchFamily="34" charset="0"/>
+              </a:rPr>
+              <a:t> &amp; </a:t>
+            </a:r>
+            <a:r>
+              <a:rPr lang="es-ES" dirty="0" err="1">
+                <a:solidFill>
+                  <a:srgbClr val="EB178E"/>
+                </a:solidFill>
+                <a:latin typeface="Arial" panose="020B0604020202020204" pitchFamily="34" charset="0"/>
+                <a:cs typeface="Arial" panose="020B0604020202020204" pitchFamily="34" charset="0"/>
+              </a:rPr>
+              <a:t>bias</a:t>
+            </a:r>
+            <a:r>
+              <a:rPr lang="es-ES" dirty="0">
+                <a:solidFill>
+                  <a:srgbClr val="EB178E"/>
+                </a:solidFill>
+                <a:latin typeface="Arial" panose="020B0604020202020204" pitchFamily="34" charset="0"/>
+                <a:cs typeface="Arial" panose="020B0604020202020204" pitchFamily="34" charset="0"/>
+              </a:rPr>
+              <a:t> con </a:t>
+            </a:r>
+            <a:r>
+              <a:rPr lang="es-ES" dirty="0" err="1">
+                <a:solidFill>
+                  <a:srgbClr val="EB178E"/>
+                </a:solidFill>
+                <a:latin typeface="Arial" panose="020B0604020202020204" pitchFamily="34" charset="0"/>
+                <a:cs typeface="Arial" panose="020B0604020202020204" pitchFamily="34" charset="0"/>
+              </a:rPr>
+              <a:t>backpropagation</a:t>
+            </a:r>
+            <a:endParaRPr lang="en-US" dirty="0">
+              <a:solidFill>
+                <a:srgbClr val="EB178E"/>
+              </a:solidFill>
+              <a:latin typeface="Arial" panose="020B0604020202020204" pitchFamily="34" charset="0"/>
+              <a:cs typeface="Arial" panose="020B0604020202020204" pitchFamily="34" charset="0"/>
+            </a:endParaRPr>
+          </a:p>
+        </p:txBody>
+      </p:sp>
+      <p:pic>
+        <p:nvPicPr>
+          <p:cNvPr id="5" name="Picture 2">
+            <a:extLst>
+              <a:ext uri="{FF2B5EF4-FFF2-40B4-BE49-F238E27FC236}">
+                <a16:creationId xmlns:a16="http://schemas.microsoft.com/office/drawing/2014/main" id="{B0FE11C3-3249-6B06-7D79-A1AB73ED727C}"/>
+              </a:ext>
+            </a:extLst>
+          </p:cNvPr>
+          <p:cNvPicPr>
+            <a:picLocks noChangeAspect="1" noChangeArrowheads="1"/>
+          </p:cNvPicPr>
+          <p:nvPr/>
+        </p:nvPicPr>
+        <p:blipFill>
+          <a:blip r:embed="rId2">
+            <a:extLst>
+              <a:ext uri="{28A0092B-C50C-407E-A947-70E740481C1C}">
+                <a14:useLocalDpi xmlns:a14="http://schemas.microsoft.com/office/drawing/2010/main" val="0"/>
+              </a:ext>
+            </a:extLst>
+          </a:blip>
+          <a:srcRect/>
+          <a:stretch>
+            <a:fillRect/>
+          </a:stretch>
+        </p:blipFill>
+        <p:spPr bwMode="auto">
+          <a:xfrm>
+            <a:off x="10881954" y="5786323"/>
+            <a:ext cx="943692" cy="852856"/>
+          </a:xfrm>
+          <a:prstGeom prst="rect">
+            <a:avLst/>
+          </a:prstGeom>
+          <a:noFill/>
+          <a:extLst>
+            <a:ext uri="{909E8E84-426E-40DD-AFC4-6F175D3DCCD1}">
+              <a14:hiddenFill xmlns:a14="http://schemas.microsoft.com/office/drawing/2010/main">
+                <a:solidFill>
+                  <a:srgbClr val="FFFFFF"/>
+                </a:solidFill>
+              </a14:hiddenFill>
+            </a:ext>
+          </a:extLst>
+        </p:spPr>
+      </p:pic>
+      <p:pic>
+        <p:nvPicPr>
+          <p:cNvPr id="3" name="Picture 2">
+            <a:extLst>
+              <a:ext uri="{FF2B5EF4-FFF2-40B4-BE49-F238E27FC236}">
+                <a16:creationId xmlns:a16="http://schemas.microsoft.com/office/drawing/2014/main" id="{A1913630-E9E2-E520-C394-DD947F26D306}"/>
+              </a:ext>
+            </a:extLst>
+          </p:cNvPr>
+          <p:cNvPicPr>
+            <a:picLocks noChangeAspect="1"/>
+          </p:cNvPicPr>
+          <p:nvPr/>
+        </p:nvPicPr>
+        <p:blipFill>
+          <a:blip r:embed="rId3">
+            <a:extLst>
+              <a:ext uri="{28A0092B-C50C-407E-A947-70E740481C1C}">
+                <a14:useLocalDpi xmlns:a14="http://schemas.microsoft.com/office/drawing/2010/main" val="0"/>
+              </a:ext>
+            </a:extLst>
+          </a:blip>
+          <a:stretch>
+            <a:fillRect/>
+          </a:stretch>
+        </p:blipFill>
+        <p:spPr>
+          <a:xfrm>
+            <a:off x="1720345" y="3052839"/>
+            <a:ext cx="8751310" cy="2859825"/>
+          </a:xfrm>
+          <a:prstGeom prst="rect">
+            <a:avLst/>
+          </a:prstGeom>
+        </p:spPr>
+      </p:pic>
+      <p:sp>
+        <p:nvSpPr>
+          <p:cNvPr id="7" name="TextBox 6">
+            <a:extLst>
+              <a:ext uri="{FF2B5EF4-FFF2-40B4-BE49-F238E27FC236}">
+                <a16:creationId xmlns:a16="http://schemas.microsoft.com/office/drawing/2014/main" id="{E2FA79E4-E327-557D-8F3D-C172E5528DF9}"/>
+              </a:ext>
+            </a:extLst>
+          </p:cNvPr>
+          <p:cNvSpPr txBox="1"/>
+          <p:nvPr/>
+        </p:nvSpPr>
+        <p:spPr>
+          <a:xfrm>
+            <a:off x="990600" y="1909354"/>
+            <a:ext cx="4498849" cy="1077218"/>
+          </a:xfrm>
+          <a:prstGeom prst="rect">
+            <a:avLst/>
+          </a:prstGeom>
+          <a:noFill/>
+        </p:spPr>
+        <p:txBody>
+          <a:bodyPr wrap="square" rtlCol="0">
+            <a:spAutoFit/>
+          </a:bodyPr>
+          <a:lstStyle/>
+          <a:p>
+            <a:r>
+              <a:rPr lang="es-ES" sz="3200" dirty="0" err="1"/>
+              <a:t>Weights</a:t>
+            </a:r>
+            <a:r>
+              <a:rPr lang="es-ES" sz="3200" dirty="0"/>
+              <a:t> W1, W2</a:t>
+            </a:r>
+          </a:p>
+          <a:p>
+            <a:r>
+              <a:rPr lang="es-ES" sz="3200" dirty="0" err="1"/>
+              <a:t>Biases</a:t>
+            </a:r>
+            <a:r>
+              <a:rPr lang="es-ES" sz="3200" dirty="0"/>
+              <a:t> B1, B2</a:t>
+            </a:r>
+            <a:endParaRPr lang="en-US" dirty="0"/>
+          </a:p>
+        </p:txBody>
+      </p:sp>
+    </p:spTree>
+    <p:extLst>
+      <p:ext uri="{BB962C8B-B14F-4D97-AF65-F5344CB8AC3E}">
+        <p14:creationId xmlns:p14="http://schemas.microsoft.com/office/powerpoint/2010/main" val="4082406625"/>
+      </p:ext>
+    </p:extLst>
+  </p:cSld>
+  <p:clrMapOvr>
+    <a:masterClrMapping/>
+  </p:clrMapOvr>
+</p:sld>
+</file>
+
+<file path=ppt/slides/slide25.xml><?xml version="1.0" encoding="utf-8"?>
+<p:sld xmlns:a="http://schemas.openxmlformats.org/drawingml/2006/main" xmlns:r="http://schemas.openxmlformats.org/officeDocument/2006/relationships" xmlns:p="http://schemas.openxmlformats.org/presentationml/2006/main">
+  <p:cSld>
+    <p:spTree>
+      <p:nvGrpSpPr>
+        <p:cNvPr id="1" name="">
+          <a:extLst>
+            <a:ext uri="{FF2B5EF4-FFF2-40B4-BE49-F238E27FC236}">
+              <a16:creationId xmlns:a16="http://schemas.microsoft.com/office/drawing/2014/main" id="{98CF55ED-15E7-0673-3127-C4D16A2C90B5}"/>
+            </a:ext>
+          </a:extLst>
+        </p:cNvPr>
+        <p:cNvGrpSpPr/>
+        <p:nvPr/>
+      </p:nvGrpSpPr>
+      <p:grpSpPr>
+        <a:xfrm>
+          <a:off x="0" y="0"/>
+          <a:ext cx="0" cy="0"/>
+          <a:chOff x="0" y="0"/>
+          <a:chExt cx="0" cy="0"/>
+        </a:xfrm>
+      </p:grpSpPr>
+      <p:sp>
+        <p:nvSpPr>
+          <p:cNvPr id="4" name="Title 1">
+            <a:extLst>
+              <a:ext uri="{FF2B5EF4-FFF2-40B4-BE49-F238E27FC236}">
+                <a16:creationId xmlns:a16="http://schemas.microsoft.com/office/drawing/2014/main" id="{A2FC4572-C349-192C-6E46-249DE1EE7D5F}"/>
+              </a:ext>
+            </a:extLst>
+          </p:cNvPr>
+          <p:cNvSpPr txBox="1">
+            <a:spLocks/>
+          </p:cNvSpPr>
+          <p:nvPr/>
+        </p:nvSpPr>
+        <p:spPr>
+          <a:xfrm>
+            <a:off x="990600" y="517525"/>
+            <a:ext cx="11079480" cy="1325563"/>
+          </a:xfrm>
+          <a:prstGeom prst="rect">
+            <a:avLst/>
+          </a:prstGeom>
+        </p:spPr>
+        <p:txBody>
+          <a:bodyPr vert="horz" lIns="91440" tIns="45720" rIns="91440" bIns="45720" rtlCol="0" anchor="ctr">
+            <a:normAutofit/>
+          </a:bodyPr>
+          <a:lstStyle>
+            <a:lvl1pPr algn="l" defTabSz="914400" rtl="0" eaLnBrk="1" latinLnBrk="0" hangingPunct="1">
+              <a:lnSpc>
+                <a:spcPct val="90000"/>
+              </a:lnSpc>
+              <a:spcBef>
+                <a:spcPct val="0"/>
+              </a:spcBef>
+              <a:buNone/>
+              <a:defRPr sz="4400" kern="1200">
+                <a:solidFill>
+                  <a:schemeClr val="tx1"/>
+                </a:solidFill>
+                <a:latin typeface="+mj-lt"/>
+                <a:ea typeface="+mj-ea"/>
+                <a:cs typeface="+mj-cs"/>
+              </a:defRPr>
+            </a:lvl1pPr>
+          </a:lstStyle>
+          <a:p>
+            <a:r>
+              <a:rPr lang="es-ES" dirty="0">
+                <a:solidFill>
+                  <a:srgbClr val="EB178E"/>
+                </a:solidFill>
+                <a:latin typeface="Arial" panose="020B0604020202020204" pitchFamily="34" charset="0"/>
+                <a:cs typeface="Arial" panose="020B0604020202020204" pitchFamily="34" charset="0"/>
+              </a:rPr>
+              <a:t>Optimización </a:t>
+            </a:r>
+            <a:r>
+              <a:rPr lang="es-ES" dirty="0" err="1">
+                <a:solidFill>
+                  <a:srgbClr val="EB178E"/>
+                </a:solidFill>
+                <a:latin typeface="Arial" panose="020B0604020202020204" pitchFamily="34" charset="0"/>
+                <a:cs typeface="Arial" panose="020B0604020202020204" pitchFamily="34" charset="0"/>
+              </a:rPr>
+              <a:t>weights</a:t>
+            </a:r>
+            <a:r>
+              <a:rPr lang="es-ES" dirty="0">
+                <a:solidFill>
+                  <a:srgbClr val="EB178E"/>
+                </a:solidFill>
+                <a:latin typeface="Arial" panose="020B0604020202020204" pitchFamily="34" charset="0"/>
+                <a:cs typeface="Arial" panose="020B0604020202020204" pitchFamily="34" charset="0"/>
+              </a:rPr>
+              <a:t> &amp; </a:t>
+            </a:r>
+            <a:r>
+              <a:rPr lang="es-ES" dirty="0" err="1">
+                <a:solidFill>
+                  <a:srgbClr val="EB178E"/>
+                </a:solidFill>
+                <a:latin typeface="Arial" panose="020B0604020202020204" pitchFamily="34" charset="0"/>
+                <a:cs typeface="Arial" panose="020B0604020202020204" pitchFamily="34" charset="0"/>
+              </a:rPr>
+              <a:t>bias</a:t>
+            </a:r>
+            <a:r>
+              <a:rPr lang="es-ES" dirty="0">
+                <a:solidFill>
+                  <a:srgbClr val="EB178E"/>
+                </a:solidFill>
+                <a:latin typeface="Arial" panose="020B0604020202020204" pitchFamily="34" charset="0"/>
+                <a:cs typeface="Arial" panose="020B0604020202020204" pitchFamily="34" charset="0"/>
+              </a:rPr>
+              <a:t> con </a:t>
+            </a:r>
+            <a:r>
+              <a:rPr lang="es-ES" dirty="0" err="1">
+                <a:solidFill>
+                  <a:srgbClr val="EB178E"/>
+                </a:solidFill>
+                <a:latin typeface="Arial" panose="020B0604020202020204" pitchFamily="34" charset="0"/>
+                <a:cs typeface="Arial" panose="020B0604020202020204" pitchFamily="34" charset="0"/>
+              </a:rPr>
+              <a:t>backpropagation</a:t>
+            </a:r>
+            <a:endParaRPr lang="en-US" dirty="0">
+              <a:solidFill>
+                <a:srgbClr val="EB178E"/>
+              </a:solidFill>
+              <a:latin typeface="Arial" panose="020B0604020202020204" pitchFamily="34" charset="0"/>
+              <a:cs typeface="Arial" panose="020B0604020202020204" pitchFamily="34" charset="0"/>
+            </a:endParaRPr>
+          </a:p>
+        </p:txBody>
+      </p:sp>
+      <p:pic>
+        <p:nvPicPr>
+          <p:cNvPr id="5" name="Picture 2">
+            <a:extLst>
+              <a:ext uri="{FF2B5EF4-FFF2-40B4-BE49-F238E27FC236}">
+                <a16:creationId xmlns:a16="http://schemas.microsoft.com/office/drawing/2014/main" id="{7A50CC6B-1B00-9277-9495-2F8E349C7C3F}"/>
+              </a:ext>
+            </a:extLst>
+          </p:cNvPr>
+          <p:cNvPicPr>
+            <a:picLocks noChangeAspect="1" noChangeArrowheads="1"/>
+          </p:cNvPicPr>
+          <p:nvPr/>
+        </p:nvPicPr>
+        <p:blipFill>
+          <a:blip r:embed="rId2">
+            <a:extLst>
+              <a:ext uri="{28A0092B-C50C-407E-A947-70E740481C1C}">
+                <a14:useLocalDpi xmlns:a14="http://schemas.microsoft.com/office/drawing/2010/main" val="0"/>
+              </a:ext>
+            </a:extLst>
+          </a:blip>
+          <a:srcRect/>
+          <a:stretch>
+            <a:fillRect/>
+          </a:stretch>
+        </p:blipFill>
+        <p:spPr bwMode="auto">
+          <a:xfrm>
+            <a:off x="10881954" y="5786323"/>
+            <a:ext cx="943692" cy="852856"/>
+          </a:xfrm>
+          <a:prstGeom prst="rect">
+            <a:avLst/>
+          </a:prstGeom>
+          <a:noFill/>
+          <a:extLst>
+            <a:ext uri="{909E8E84-426E-40DD-AFC4-6F175D3DCCD1}">
+              <a14:hiddenFill xmlns:a14="http://schemas.microsoft.com/office/drawing/2010/main">
+                <a:solidFill>
+                  <a:srgbClr val="FFFFFF"/>
+                </a:solidFill>
+              </a14:hiddenFill>
+            </a:ext>
+          </a:extLst>
+        </p:spPr>
+      </p:pic>
+      <p:sp>
+        <p:nvSpPr>
+          <p:cNvPr id="7" name="TextBox 6">
+            <a:extLst>
+              <a:ext uri="{FF2B5EF4-FFF2-40B4-BE49-F238E27FC236}">
+                <a16:creationId xmlns:a16="http://schemas.microsoft.com/office/drawing/2014/main" id="{3256EC35-046F-C8C9-1C3E-28111583A01F}"/>
+              </a:ext>
+            </a:extLst>
+          </p:cNvPr>
+          <p:cNvSpPr txBox="1"/>
+          <p:nvPr/>
+        </p:nvSpPr>
+        <p:spPr>
+          <a:xfrm>
+            <a:off x="990600" y="1909354"/>
+            <a:ext cx="4498849" cy="1754326"/>
+          </a:xfrm>
+          <a:prstGeom prst="rect">
+            <a:avLst/>
+          </a:prstGeom>
+          <a:noFill/>
+        </p:spPr>
+        <p:txBody>
+          <a:bodyPr wrap="square" rtlCol="0">
+            <a:spAutoFit/>
+          </a:bodyPr>
+          <a:lstStyle/>
+          <a:p>
+            <a:r>
+              <a:rPr lang="es-ES" dirty="0"/>
+              <a:t>-Funciones de pérdidas (SSR)</a:t>
+            </a:r>
+          </a:p>
+          <a:p>
+            <a:r>
+              <a:rPr lang="es-ES" dirty="0"/>
+              <a:t>-Regla de la cadena (breve)</a:t>
+            </a:r>
+          </a:p>
+          <a:p>
+            <a:r>
+              <a:rPr lang="es-ES" dirty="0"/>
+              <a:t>-</a:t>
+            </a:r>
+            <a:r>
+              <a:rPr lang="es-ES" dirty="0" err="1"/>
+              <a:t>Retropropagación</a:t>
+            </a:r>
+            <a:endParaRPr lang="es-ES" dirty="0"/>
+          </a:p>
+          <a:p>
+            <a:r>
+              <a:rPr lang="es-ES" dirty="0"/>
+              <a:t>-Ejemplo numérico</a:t>
+            </a:r>
+          </a:p>
+          <a:p>
+            <a:r>
+              <a:rPr lang="es-ES" dirty="0"/>
+              <a:t>-Código son </a:t>
+            </a:r>
+            <a:r>
+              <a:rPr lang="es-ES" dirty="0" err="1"/>
+              <a:t>Pytorch</a:t>
+            </a:r>
+            <a:endParaRPr lang="es-ES" dirty="0"/>
+          </a:p>
+          <a:p>
+            <a:r>
+              <a:rPr lang="es-ES" dirty="0"/>
+              <a:t>-Código </a:t>
+            </a:r>
+            <a:r>
+              <a:rPr lang="es-ES" dirty="0" err="1"/>
+              <a:t>Pytorch</a:t>
+            </a:r>
+            <a:endParaRPr lang="es-ES" dirty="0"/>
+          </a:p>
+        </p:txBody>
+      </p:sp>
+    </p:spTree>
+    <p:extLst>
+      <p:ext uri="{BB962C8B-B14F-4D97-AF65-F5344CB8AC3E}">
+        <p14:creationId xmlns:p14="http://schemas.microsoft.com/office/powerpoint/2010/main" val="1647417615"/>
+      </p:ext>
+    </p:extLst>
+  </p:cSld>
+  <p:clrMapOvr>
+    <a:masterClrMapping/>
+  </p:clrMapOvr>
+</p:sld>
+</file>
+
+<file path=ppt/slides/slide26.xml><?xml version="1.0" encoding="utf-8"?>
+<p:sld xmlns:a="http://schemas.openxmlformats.org/drawingml/2006/main" xmlns:r="http://schemas.openxmlformats.org/officeDocument/2006/relationships" xmlns:p="http://schemas.openxmlformats.org/presentationml/2006/main">
+  <p:cSld>
+    <p:spTree>
+      <p:nvGrpSpPr>
+        <p:cNvPr id="1" name="">
+          <a:extLst>
+            <a:ext uri="{FF2B5EF4-FFF2-40B4-BE49-F238E27FC236}">
+              <a16:creationId xmlns:a16="http://schemas.microsoft.com/office/drawing/2014/main" id="{46C4D660-6A4C-B646-B7BE-F0959804453B}"/>
             </a:ext>
           </a:extLst>
         </p:cNvPr>
@@ -6274,19 +7981,17 @@
       </p:grpSpPr>
       <p:pic>
         <p:nvPicPr>
-          <p:cNvPr id="1026" name="Picture 2">
-            <a:extLst>
-              <a:ext uri="{FF2B5EF4-FFF2-40B4-BE49-F238E27FC236}">
-                <a16:creationId xmlns:a16="http://schemas.microsoft.com/office/drawing/2014/main" id="{2283E1D8-99E1-576E-AC56-89B1FA9FE873}"/>
+          <p:cNvPr id="5" name="Picture 2">
+            <a:extLst>
+              <a:ext uri="{FF2B5EF4-FFF2-40B4-BE49-F238E27FC236}">
+                <a16:creationId xmlns:a16="http://schemas.microsoft.com/office/drawing/2014/main" id="{837FC799-7B81-A307-FFD9-BDFA0D18E14C}"/>
               </a:ext>
             </a:extLst>
           </p:cNvPr>
           <p:cNvPicPr>
-            <a:picLocks noGrp="1" noChangeAspect="1" noChangeArrowheads="1"/>
+            <a:picLocks noChangeAspect="1" noChangeArrowheads="1"/>
           </p:cNvPicPr>
-          <p:nvPr>
-            <p:ph idx="1"/>
-          </p:nvPr>
+          <p:nvPr/>
         </p:nvPicPr>
         <p:blipFill>
           <a:blip r:embed="rId2">
@@ -6323,50 +8028,10 @@
       </p:pic>
       <p:sp>
         <p:nvSpPr>
-          <p:cNvPr id="3" name="Title 1">
-            <a:extLst>
-              <a:ext uri="{FF2B5EF4-FFF2-40B4-BE49-F238E27FC236}">
-                <a16:creationId xmlns:a16="http://schemas.microsoft.com/office/drawing/2014/main" id="{F511B612-C047-C402-C176-94EB123743BC}"/>
-              </a:ext>
-            </a:extLst>
-          </p:cNvPr>
-          <p:cNvSpPr>
-            <a:spLocks noGrp="1"/>
-          </p:cNvSpPr>
-          <p:nvPr>
-            <p:ph type="title"/>
-          </p:nvPr>
-        </p:nvSpPr>
-        <p:spPr>
-          <a:xfrm>
-            <a:off x="838200" y="365125"/>
-            <a:ext cx="10515600" cy="1325563"/>
-          </a:xfrm>
-        </p:spPr>
-        <p:txBody>
-          <a:bodyPr/>
-          <a:lstStyle/>
-          <a:p>
-            <a:r>
-              <a:rPr lang="es-ES" dirty="0">
-                <a:latin typeface="Arial" panose="020B0604020202020204" pitchFamily="34" charset="0"/>
-                <a:cs typeface="Arial" panose="020B0604020202020204" pitchFamily="34" charset="0"/>
-              </a:rPr>
-              <a:t>Conceptos fundamentales</a:t>
-            </a:r>
-            <a:endParaRPr lang="en-US" dirty="0">
-              <a:latin typeface="Arial" panose="020B0604020202020204" pitchFamily="34" charset="0"/>
-              <a:cs typeface="Arial" panose="020B0604020202020204" pitchFamily="34" charset="0"/>
-            </a:endParaRPr>
-          </a:p>
-        </p:txBody>
-      </p:sp>
-      <p:sp>
-        <p:nvSpPr>
-          <p:cNvPr id="4" name="TextBox 3">
-            <a:extLst>
-              <a:ext uri="{FF2B5EF4-FFF2-40B4-BE49-F238E27FC236}">
-                <a16:creationId xmlns:a16="http://schemas.microsoft.com/office/drawing/2014/main" id="{4E2952AB-1A79-159D-490A-9662ED4355BA}"/>
+          <p:cNvPr id="6" name="TextBox 5">
+            <a:extLst>
+              <a:ext uri="{FF2B5EF4-FFF2-40B4-BE49-F238E27FC236}">
+                <a16:creationId xmlns:a16="http://schemas.microsoft.com/office/drawing/2014/main" id="{CB4B70AA-CDDF-2BC1-8775-0732B8C955E7}"/>
               </a:ext>
             </a:extLst>
           </p:cNvPr>
@@ -6375,8 +8040,8 @@
         </p:nvSpPr>
         <p:spPr>
           <a:xfrm>
-            <a:off x="1046074" y="1777594"/>
-            <a:ext cx="6217920" cy="923330"/>
+            <a:off x="990599" y="1727276"/>
+            <a:ext cx="8736875" cy="584775"/>
           </a:xfrm>
           <a:prstGeom prst="rect">
             <a:avLst/>
@@ -6390,29 +8055,171 @@
           <a:lstStyle/>
           <a:p>
             <a:r>
+              <a:rPr lang="es-ES" sz="3200" dirty="0"/>
+              <a:t>¡Práctica!</a:t>
+            </a:r>
+            <a:endParaRPr lang="en-US" dirty="0"/>
+          </a:p>
+        </p:txBody>
+      </p:sp>
+      <p:pic>
+        <p:nvPicPr>
+          <p:cNvPr id="2" name="Picture 2">
+            <a:extLst>
+              <a:ext uri="{FF2B5EF4-FFF2-40B4-BE49-F238E27FC236}">
+                <a16:creationId xmlns:a16="http://schemas.microsoft.com/office/drawing/2014/main" id="{3477D16D-9759-F25C-A225-E2EF81296CDD}"/>
+              </a:ext>
+            </a:extLst>
+          </p:cNvPr>
+          <p:cNvPicPr>
+            <a:picLocks noChangeAspect="1" noChangeArrowheads="1"/>
+          </p:cNvPicPr>
+          <p:nvPr/>
+        </p:nvPicPr>
+        <p:blipFill>
+          <a:blip r:embed="rId3">
+            <a:extLst>
+              <a:ext uri="{28A0092B-C50C-407E-A947-70E740481C1C}">
+                <a14:useLocalDpi xmlns:a14="http://schemas.microsoft.com/office/drawing/2010/main" val="0"/>
+              </a:ext>
+            </a:extLst>
+          </a:blip>
+          <a:srcRect/>
+          <a:stretch>
+            <a:fillRect/>
+          </a:stretch>
+        </p:blipFill>
+        <p:spPr bwMode="auto">
+          <a:xfrm>
+            <a:off x="4902933" y="3019048"/>
+            <a:ext cx="2386134" cy="2767275"/>
+          </a:xfrm>
+          <a:prstGeom prst="rect">
+            <a:avLst/>
+          </a:prstGeom>
+          <a:noFill/>
+          <a:extLst>
+            <a:ext uri="{909E8E84-426E-40DD-AFC4-6F175D3DCCD1}">
+              <a14:hiddenFill xmlns:a14="http://schemas.microsoft.com/office/drawing/2010/main">
+                <a:solidFill>
+                  <a:srgbClr val="FFFFFF"/>
+                </a:solidFill>
+              </a14:hiddenFill>
+            </a:ext>
+          </a:extLst>
+        </p:spPr>
+      </p:pic>
+      <p:sp>
+        <p:nvSpPr>
+          <p:cNvPr id="3" name="Title 1">
+            <a:extLst>
+              <a:ext uri="{FF2B5EF4-FFF2-40B4-BE49-F238E27FC236}">
+                <a16:creationId xmlns:a16="http://schemas.microsoft.com/office/drawing/2014/main" id="{AF013A8C-31FC-6A62-561A-92AA3D990B5B}"/>
+              </a:ext>
+            </a:extLst>
+          </p:cNvPr>
+          <p:cNvSpPr txBox="1">
+            <a:spLocks/>
+          </p:cNvSpPr>
+          <p:nvPr/>
+        </p:nvSpPr>
+        <p:spPr>
+          <a:xfrm>
+            <a:off x="990600" y="517525"/>
+            <a:ext cx="11079480" cy="1325563"/>
+          </a:xfrm>
+          <a:prstGeom prst="rect">
+            <a:avLst/>
+          </a:prstGeom>
+        </p:spPr>
+        <p:txBody>
+          <a:bodyPr vert="horz" lIns="91440" tIns="45720" rIns="91440" bIns="45720" rtlCol="0" anchor="ctr">
+            <a:normAutofit/>
+          </a:bodyPr>
+          <a:lstStyle>
+            <a:lvl1pPr algn="l" defTabSz="914400" rtl="0" eaLnBrk="1" latinLnBrk="0" hangingPunct="1">
+              <a:lnSpc>
+                <a:spcPct val="90000"/>
+              </a:lnSpc>
+              <a:spcBef>
+                <a:spcPct val="0"/>
+              </a:spcBef>
+              <a:buNone/>
+              <a:defRPr sz="4400" kern="1200">
+                <a:solidFill>
+                  <a:schemeClr val="tx1"/>
+                </a:solidFill>
+                <a:latin typeface="+mj-lt"/>
+                <a:ea typeface="+mj-ea"/>
+                <a:cs typeface="+mj-cs"/>
+              </a:defRPr>
+            </a:lvl1pPr>
+          </a:lstStyle>
+          <a:p>
+            <a:r>
               <a:rPr lang="es-ES" dirty="0">
+                <a:solidFill>
+                  <a:srgbClr val="EB178E"/>
+                </a:solidFill>
                 <a:latin typeface="Arial" panose="020B0604020202020204" pitchFamily="34" charset="0"/>
                 <a:cs typeface="Arial" panose="020B0604020202020204" pitchFamily="34" charset="0"/>
               </a:rPr>
-              <a:t>-Ejemplo paso datos por red neuronal paso a paso sin cambiar valores</a:t>
-            </a:r>
-          </a:p>
-          <a:p>
-            <a:r>
-              <a:rPr lang="es-ES" dirty="0">
+              <a:t>Optimización </a:t>
+            </a:r>
+            <a:r>
+              <a:rPr lang="es-ES" dirty="0" err="1">
+                <a:solidFill>
+                  <a:srgbClr val="EB178E"/>
+                </a:solidFill>
                 <a:latin typeface="Arial" panose="020B0604020202020204" pitchFamily="34" charset="0"/>
                 <a:cs typeface="Arial" panose="020B0604020202020204" pitchFamily="34" charset="0"/>
               </a:rPr>
-              <a:t>-Ejemplo Python sin </a:t>
-            </a:r>
-            <a:r>
-              <a:rPr lang="es-ES" dirty="0" err="1">
+              <a:t>weights</a:t>
+            </a:r>
+            <a:r>
+              <a:rPr lang="es-ES" dirty="0">
+                <a:solidFill>
+                  <a:srgbClr val="EB178E"/>
+                </a:solidFill>
                 <a:latin typeface="Arial" panose="020B0604020202020204" pitchFamily="34" charset="0"/>
                 <a:cs typeface="Arial" panose="020B0604020202020204" pitchFamily="34" charset="0"/>
               </a:rPr>
-              <a:t>Pytorch</a:t>
+              <a:t> &amp; </a:t>
+            </a:r>
+            <a:r>
+              <a:rPr lang="es-ES" dirty="0" err="1">
+                <a:solidFill>
+                  <a:srgbClr val="EB178E"/>
+                </a:solidFill>
+                <a:latin typeface="Arial" panose="020B0604020202020204" pitchFamily="34" charset="0"/>
+                <a:cs typeface="Arial" panose="020B0604020202020204" pitchFamily="34" charset="0"/>
+              </a:rPr>
+              <a:t>bias</a:t>
+            </a:r>
+            <a:r>
+              <a:rPr lang="es-ES" dirty="0">
+                <a:solidFill>
+                  <a:srgbClr val="EB178E"/>
+                </a:solidFill>
+                <a:latin typeface="Arial" panose="020B0604020202020204" pitchFamily="34" charset="0"/>
+                <a:cs typeface="Arial" panose="020B0604020202020204" pitchFamily="34" charset="0"/>
+              </a:rPr>
+              <a:t> con </a:t>
+            </a:r>
+            <a:r>
+              <a:rPr lang="es-ES" dirty="0" err="1">
+                <a:solidFill>
+                  <a:srgbClr val="EB178E"/>
+                </a:solidFill>
+                <a:latin typeface="Arial" panose="020B0604020202020204" pitchFamily="34" charset="0"/>
+                <a:cs typeface="Arial" panose="020B0604020202020204" pitchFamily="34" charset="0"/>
+              </a:rPr>
+              <a:t>backpropagation</a:t>
             </a:r>
             <a:endParaRPr lang="en-US" dirty="0">
+              <a:solidFill>
+                <a:srgbClr val="EB178E"/>
+              </a:solidFill>
               <a:latin typeface="Arial" panose="020B0604020202020204" pitchFamily="34" charset="0"/>
               <a:cs typeface="Arial" panose="020B0604020202020204" pitchFamily="34" charset="0"/>
             </a:endParaRPr>
@@ -6422,7 +8229,7 @@
     </p:spTree>
     <p:extLst>
       <p:ext uri="{BB962C8B-B14F-4D97-AF65-F5344CB8AC3E}">
-        <p14:creationId xmlns:p14="http://schemas.microsoft.com/office/powerpoint/2010/main" val="3394783645"/>
+        <p14:creationId xmlns:p14="http://schemas.microsoft.com/office/powerpoint/2010/main" val="1673312006"/>
       </p:ext>
     </p:extLst>
   </p:cSld>
@@ -6432,7 +8239,7 @@
 </p:sld>
 </file>
 
-<file path=ppt/slides/slide22.xml><?xml version="1.0" encoding="utf-8"?>
+<file path=ppt/slides/slide27.xml><?xml version="1.0" encoding="utf-8"?>
 <p:sld xmlns:a="http://schemas.openxmlformats.org/drawingml/2006/main" xmlns:r="http://schemas.openxmlformats.org/officeDocument/2006/relationships" xmlns:p="http://schemas.openxmlformats.org/presentationml/2006/main">
   <p:cSld>
     <p:spTree>
@@ -6542,7 +8349,7 @@
 </p:sld>
 </file>
 
-<file path=ppt/slides/slide23.xml><?xml version="1.0" encoding="utf-8"?>
+<file path=ppt/slides/slide28.xml><?xml version="1.0" encoding="utf-8"?>
 <p:sld xmlns:a="http://schemas.openxmlformats.org/drawingml/2006/main" xmlns:r="http://schemas.openxmlformats.org/officeDocument/2006/relationships" xmlns:p="http://schemas.openxmlformats.org/presentationml/2006/main">
   <p:cSld>
     <p:spTree>
@@ -6652,7 +8459,7 @@
 </p:sld>
 </file>
 
-<file path=ppt/slides/slide24.xml><?xml version="1.0" encoding="utf-8"?>
+<file path=ppt/slides/slide29.xml><?xml version="1.0" encoding="utf-8"?>
 <p:sld xmlns:a="http://schemas.openxmlformats.org/drawingml/2006/main" xmlns:r="http://schemas.openxmlformats.org/officeDocument/2006/relationships" xmlns:p="http://schemas.openxmlformats.org/presentationml/2006/main">
   <p:cSld>
     <p:spTree>
@@ -6753,446 +8560,6 @@
     <p:extLst>
       <p:ext uri="{BB962C8B-B14F-4D97-AF65-F5344CB8AC3E}">
         <p14:creationId xmlns:p14="http://schemas.microsoft.com/office/powerpoint/2010/main" val="2581888322"/>
-      </p:ext>
-    </p:extLst>
-  </p:cSld>
-  <p:clrMapOvr>
-    <a:masterClrMapping/>
-  </p:clrMapOvr>
-</p:sld>
-</file>
-
-<file path=ppt/slides/slide25.xml><?xml version="1.0" encoding="utf-8"?>
-<p:sld xmlns:a="http://schemas.openxmlformats.org/drawingml/2006/main" xmlns:r="http://schemas.openxmlformats.org/officeDocument/2006/relationships" xmlns:p="http://schemas.openxmlformats.org/presentationml/2006/main">
-  <p:cSld>
-    <p:spTree>
-      <p:nvGrpSpPr>
-        <p:cNvPr id="1" name="">
-          <a:extLst>
-            <a:ext uri="{FF2B5EF4-FFF2-40B4-BE49-F238E27FC236}">
-              <a16:creationId xmlns:a16="http://schemas.microsoft.com/office/drawing/2014/main" id="{DA8BDF43-C7CA-4F32-E57A-810BE1CB32A5}"/>
-            </a:ext>
-          </a:extLst>
-        </p:cNvPr>
-        <p:cNvGrpSpPr/>
-        <p:nvPr/>
-      </p:nvGrpSpPr>
-      <p:grpSpPr>
-        <a:xfrm>
-          <a:off x="0" y="0"/>
-          <a:ext cx="0" cy="0"/>
-          <a:chOff x="0" y="0"/>
-          <a:chExt cx="0" cy="0"/>
-        </a:xfrm>
-      </p:grpSpPr>
-      <p:sp>
-        <p:nvSpPr>
-          <p:cNvPr id="2" name="Title 1">
-            <a:extLst>
-              <a:ext uri="{FF2B5EF4-FFF2-40B4-BE49-F238E27FC236}">
-                <a16:creationId xmlns:a16="http://schemas.microsoft.com/office/drawing/2014/main" id="{495B92A9-526B-864A-93E4-0B25D352B0D8}"/>
-              </a:ext>
-            </a:extLst>
-          </p:cNvPr>
-          <p:cNvSpPr>
-            <a:spLocks noGrp="1"/>
-          </p:cNvSpPr>
-          <p:nvPr>
-            <p:ph type="title"/>
-          </p:nvPr>
-        </p:nvSpPr>
-        <p:spPr/>
-        <p:txBody>
-          <a:bodyPr/>
-          <a:lstStyle/>
-          <a:p>
-            <a:endParaRPr lang="en-US"/>
-          </a:p>
-        </p:txBody>
-      </p:sp>
-      <p:pic>
-        <p:nvPicPr>
-          <p:cNvPr id="1026" name="Picture 2">
-            <a:extLst>
-              <a:ext uri="{FF2B5EF4-FFF2-40B4-BE49-F238E27FC236}">
-                <a16:creationId xmlns:a16="http://schemas.microsoft.com/office/drawing/2014/main" id="{4776C738-78E4-C6A8-96AF-309166D0525A}"/>
-              </a:ext>
-            </a:extLst>
-          </p:cNvPr>
-          <p:cNvPicPr>
-            <a:picLocks noGrp="1" noChangeAspect="1" noChangeArrowheads="1"/>
-          </p:cNvPicPr>
-          <p:nvPr>
-            <p:ph idx="1"/>
-          </p:nvPr>
-        </p:nvPicPr>
-        <p:blipFill>
-          <a:blip r:embed="rId2">
-            <a:extLst>
-              <a:ext uri="{28A0092B-C50C-407E-A947-70E740481C1C}">
-                <a14:useLocalDpi xmlns:a14="http://schemas.microsoft.com/office/drawing/2010/main" val="0"/>
-              </a:ext>
-            </a:extLst>
-          </a:blip>
-          <a:srcRect/>
-          <a:stretch>
-            <a:fillRect/>
-          </a:stretch>
-        </p:blipFill>
-        <p:spPr bwMode="auto">
-          <a:xfrm>
-            <a:off x="10881954" y="5786323"/>
-            <a:ext cx="943692" cy="852856"/>
-          </a:xfrm>
-          <a:prstGeom prst="rect">
-            <a:avLst/>
-          </a:prstGeom>
-          <a:noFill/>
-          <a:extLst>
-            <a:ext uri="{909E8E84-426E-40DD-AFC4-6F175D3DCCD1}">
-              <a14:hiddenFill xmlns:a14="http://schemas.microsoft.com/office/drawing/2010/main">
-                <a:solidFill>
-                  <a:srgbClr val="FFFFFF"/>
-                </a:solidFill>
-              </a14:hiddenFill>
-            </a:ext>
-          </a:extLst>
-        </p:spPr>
-      </p:pic>
-    </p:spTree>
-    <p:extLst>
-      <p:ext uri="{BB962C8B-B14F-4D97-AF65-F5344CB8AC3E}">
-        <p14:creationId xmlns:p14="http://schemas.microsoft.com/office/powerpoint/2010/main" val="1291079095"/>
-      </p:ext>
-    </p:extLst>
-  </p:cSld>
-  <p:clrMapOvr>
-    <a:masterClrMapping/>
-  </p:clrMapOvr>
-</p:sld>
-</file>
-
-<file path=ppt/slides/slide26.xml><?xml version="1.0" encoding="utf-8"?>
-<p:sld xmlns:a="http://schemas.openxmlformats.org/drawingml/2006/main" xmlns:r="http://schemas.openxmlformats.org/officeDocument/2006/relationships" xmlns:p="http://schemas.openxmlformats.org/presentationml/2006/main">
-  <p:cSld>
-    <p:spTree>
-      <p:nvGrpSpPr>
-        <p:cNvPr id="1" name="">
-          <a:extLst>
-            <a:ext uri="{FF2B5EF4-FFF2-40B4-BE49-F238E27FC236}">
-              <a16:creationId xmlns:a16="http://schemas.microsoft.com/office/drawing/2014/main" id="{0E5C286C-4F86-55CD-EE5B-ED31813B9B00}"/>
-            </a:ext>
-          </a:extLst>
-        </p:cNvPr>
-        <p:cNvGrpSpPr/>
-        <p:nvPr/>
-      </p:nvGrpSpPr>
-      <p:grpSpPr>
-        <a:xfrm>
-          <a:off x="0" y="0"/>
-          <a:ext cx="0" cy="0"/>
-          <a:chOff x="0" y="0"/>
-          <a:chExt cx="0" cy="0"/>
-        </a:xfrm>
-      </p:grpSpPr>
-      <p:sp>
-        <p:nvSpPr>
-          <p:cNvPr id="2" name="Title 1">
-            <a:extLst>
-              <a:ext uri="{FF2B5EF4-FFF2-40B4-BE49-F238E27FC236}">
-                <a16:creationId xmlns:a16="http://schemas.microsoft.com/office/drawing/2014/main" id="{FE9EB1FA-4FB1-27F6-0C7B-2EB871EB17E5}"/>
-              </a:ext>
-            </a:extLst>
-          </p:cNvPr>
-          <p:cNvSpPr>
-            <a:spLocks noGrp="1"/>
-          </p:cNvSpPr>
-          <p:nvPr>
-            <p:ph type="title"/>
-          </p:nvPr>
-        </p:nvSpPr>
-        <p:spPr/>
-        <p:txBody>
-          <a:bodyPr/>
-          <a:lstStyle/>
-          <a:p>
-            <a:endParaRPr lang="en-US"/>
-          </a:p>
-        </p:txBody>
-      </p:sp>
-      <p:pic>
-        <p:nvPicPr>
-          <p:cNvPr id="1026" name="Picture 2">
-            <a:extLst>
-              <a:ext uri="{FF2B5EF4-FFF2-40B4-BE49-F238E27FC236}">
-                <a16:creationId xmlns:a16="http://schemas.microsoft.com/office/drawing/2014/main" id="{C88CC039-1627-CBE9-F7D9-1CFAE3BF03C3}"/>
-              </a:ext>
-            </a:extLst>
-          </p:cNvPr>
-          <p:cNvPicPr>
-            <a:picLocks noGrp="1" noChangeAspect="1" noChangeArrowheads="1"/>
-          </p:cNvPicPr>
-          <p:nvPr>
-            <p:ph idx="1"/>
-          </p:nvPr>
-        </p:nvPicPr>
-        <p:blipFill>
-          <a:blip r:embed="rId2">
-            <a:extLst>
-              <a:ext uri="{28A0092B-C50C-407E-A947-70E740481C1C}">
-                <a14:useLocalDpi xmlns:a14="http://schemas.microsoft.com/office/drawing/2010/main" val="0"/>
-              </a:ext>
-            </a:extLst>
-          </a:blip>
-          <a:srcRect/>
-          <a:stretch>
-            <a:fillRect/>
-          </a:stretch>
-        </p:blipFill>
-        <p:spPr bwMode="auto">
-          <a:xfrm>
-            <a:off x="10881954" y="5786323"/>
-            <a:ext cx="943692" cy="852856"/>
-          </a:xfrm>
-          <a:prstGeom prst="rect">
-            <a:avLst/>
-          </a:prstGeom>
-          <a:noFill/>
-          <a:extLst>
-            <a:ext uri="{909E8E84-426E-40DD-AFC4-6F175D3DCCD1}">
-              <a14:hiddenFill xmlns:a14="http://schemas.microsoft.com/office/drawing/2010/main">
-                <a:solidFill>
-                  <a:srgbClr val="FFFFFF"/>
-                </a:solidFill>
-              </a14:hiddenFill>
-            </a:ext>
-          </a:extLst>
-        </p:spPr>
-      </p:pic>
-    </p:spTree>
-    <p:extLst>
-      <p:ext uri="{BB962C8B-B14F-4D97-AF65-F5344CB8AC3E}">
-        <p14:creationId xmlns:p14="http://schemas.microsoft.com/office/powerpoint/2010/main" val="3678410639"/>
-      </p:ext>
-    </p:extLst>
-  </p:cSld>
-  <p:clrMapOvr>
-    <a:masterClrMapping/>
-  </p:clrMapOvr>
-</p:sld>
-</file>
-
-<file path=ppt/slides/slide27.xml><?xml version="1.0" encoding="utf-8"?>
-<p:sld xmlns:a="http://schemas.openxmlformats.org/drawingml/2006/main" xmlns:r="http://schemas.openxmlformats.org/officeDocument/2006/relationships" xmlns:p="http://schemas.openxmlformats.org/presentationml/2006/main">
-  <p:cSld>
-    <p:spTree>
-      <p:nvGrpSpPr>
-        <p:cNvPr id="1" name="">
-          <a:extLst>
-            <a:ext uri="{FF2B5EF4-FFF2-40B4-BE49-F238E27FC236}">
-              <a16:creationId xmlns:a16="http://schemas.microsoft.com/office/drawing/2014/main" id="{B3165C58-7741-594C-3D4A-F77959661B3B}"/>
-            </a:ext>
-          </a:extLst>
-        </p:cNvPr>
-        <p:cNvGrpSpPr/>
-        <p:nvPr/>
-      </p:nvGrpSpPr>
-      <p:grpSpPr>
-        <a:xfrm>
-          <a:off x="0" y="0"/>
-          <a:ext cx="0" cy="0"/>
-          <a:chOff x="0" y="0"/>
-          <a:chExt cx="0" cy="0"/>
-        </a:xfrm>
-      </p:grpSpPr>
-      <p:sp>
-        <p:nvSpPr>
-          <p:cNvPr id="2" name="Title 1">
-            <a:extLst>
-              <a:ext uri="{FF2B5EF4-FFF2-40B4-BE49-F238E27FC236}">
-                <a16:creationId xmlns:a16="http://schemas.microsoft.com/office/drawing/2014/main" id="{CD21192D-E761-251B-1D18-6408C308046B}"/>
-              </a:ext>
-            </a:extLst>
-          </p:cNvPr>
-          <p:cNvSpPr>
-            <a:spLocks noGrp="1"/>
-          </p:cNvSpPr>
-          <p:nvPr>
-            <p:ph type="title"/>
-          </p:nvPr>
-        </p:nvSpPr>
-        <p:spPr/>
-        <p:txBody>
-          <a:bodyPr/>
-          <a:lstStyle/>
-          <a:p>
-            <a:endParaRPr lang="en-US"/>
-          </a:p>
-        </p:txBody>
-      </p:sp>
-      <p:pic>
-        <p:nvPicPr>
-          <p:cNvPr id="1026" name="Picture 2">
-            <a:extLst>
-              <a:ext uri="{FF2B5EF4-FFF2-40B4-BE49-F238E27FC236}">
-                <a16:creationId xmlns:a16="http://schemas.microsoft.com/office/drawing/2014/main" id="{66FF3372-7B11-D907-CBCE-E1BD6B8D93FB}"/>
-              </a:ext>
-            </a:extLst>
-          </p:cNvPr>
-          <p:cNvPicPr>
-            <a:picLocks noGrp="1" noChangeAspect="1" noChangeArrowheads="1"/>
-          </p:cNvPicPr>
-          <p:nvPr>
-            <p:ph idx="1"/>
-          </p:nvPr>
-        </p:nvPicPr>
-        <p:blipFill>
-          <a:blip r:embed="rId2">
-            <a:extLst>
-              <a:ext uri="{28A0092B-C50C-407E-A947-70E740481C1C}">
-                <a14:useLocalDpi xmlns:a14="http://schemas.microsoft.com/office/drawing/2010/main" val="0"/>
-              </a:ext>
-            </a:extLst>
-          </a:blip>
-          <a:srcRect/>
-          <a:stretch>
-            <a:fillRect/>
-          </a:stretch>
-        </p:blipFill>
-        <p:spPr bwMode="auto">
-          <a:xfrm>
-            <a:off x="10881954" y="5786323"/>
-            <a:ext cx="943692" cy="852856"/>
-          </a:xfrm>
-          <a:prstGeom prst="rect">
-            <a:avLst/>
-          </a:prstGeom>
-          <a:noFill/>
-          <a:extLst>
-            <a:ext uri="{909E8E84-426E-40DD-AFC4-6F175D3DCCD1}">
-              <a14:hiddenFill xmlns:a14="http://schemas.microsoft.com/office/drawing/2010/main">
-                <a:solidFill>
-                  <a:srgbClr val="FFFFFF"/>
-                </a:solidFill>
-              </a14:hiddenFill>
-            </a:ext>
-          </a:extLst>
-        </p:spPr>
-      </p:pic>
-    </p:spTree>
-    <p:extLst>
-      <p:ext uri="{BB962C8B-B14F-4D97-AF65-F5344CB8AC3E}">
-        <p14:creationId xmlns:p14="http://schemas.microsoft.com/office/powerpoint/2010/main" val="1118147558"/>
-      </p:ext>
-    </p:extLst>
-  </p:cSld>
-  <p:clrMapOvr>
-    <a:masterClrMapping/>
-  </p:clrMapOvr>
-</p:sld>
-</file>
-
-<file path=ppt/slides/slide28.xml><?xml version="1.0" encoding="utf-8"?>
-<p:sld xmlns:a="http://schemas.openxmlformats.org/drawingml/2006/main" xmlns:r="http://schemas.openxmlformats.org/officeDocument/2006/relationships" xmlns:p="http://schemas.openxmlformats.org/presentationml/2006/main">
-  <p:cSld>
-    <p:spTree>
-      <p:nvGrpSpPr>
-        <p:cNvPr id="1" name="">
-          <a:extLst>
-            <a:ext uri="{FF2B5EF4-FFF2-40B4-BE49-F238E27FC236}">
-              <a16:creationId xmlns:a16="http://schemas.microsoft.com/office/drawing/2014/main" id="{31E5A3D8-F806-9C0A-1AD2-0BCD8AEE9313}"/>
-            </a:ext>
-          </a:extLst>
-        </p:cNvPr>
-        <p:cNvGrpSpPr/>
-        <p:nvPr/>
-      </p:nvGrpSpPr>
-      <p:grpSpPr>
-        <a:xfrm>
-          <a:off x="0" y="0"/>
-          <a:ext cx="0" cy="0"/>
-          <a:chOff x="0" y="0"/>
-          <a:chExt cx="0" cy="0"/>
-        </a:xfrm>
-      </p:grpSpPr>
-      <p:sp>
-        <p:nvSpPr>
-          <p:cNvPr id="2" name="Title 1">
-            <a:extLst>
-              <a:ext uri="{FF2B5EF4-FFF2-40B4-BE49-F238E27FC236}">
-                <a16:creationId xmlns:a16="http://schemas.microsoft.com/office/drawing/2014/main" id="{7144FE53-12BB-C42B-F029-622AAD568268}"/>
-              </a:ext>
-            </a:extLst>
-          </p:cNvPr>
-          <p:cNvSpPr>
-            <a:spLocks noGrp="1"/>
-          </p:cNvSpPr>
-          <p:nvPr>
-            <p:ph type="title"/>
-          </p:nvPr>
-        </p:nvSpPr>
-        <p:spPr/>
-        <p:txBody>
-          <a:bodyPr/>
-          <a:lstStyle/>
-          <a:p>
-            <a:endParaRPr lang="en-US"/>
-          </a:p>
-        </p:txBody>
-      </p:sp>
-      <p:pic>
-        <p:nvPicPr>
-          <p:cNvPr id="1026" name="Picture 2">
-            <a:extLst>
-              <a:ext uri="{FF2B5EF4-FFF2-40B4-BE49-F238E27FC236}">
-                <a16:creationId xmlns:a16="http://schemas.microsoft.com/office/drawing/2014/main" id="{EDD7A040-C83E-E640-F9BA-368FB018DFB3}"/>
-              </a:ext>
-            </a:extLst>
-          </p:cNvPr>
-          <p:cNvPicPr>
-            <a:picLocks noGrp="1" noChangeAspect="1" noChangeArrowheads="1"/>
-          </p:cNvPicPr>
-          <p:nvPr>
-            <p:ph idx="1"/>
-          </p:nvPr>
-        </p:nvPicPr>
-        <p:blipFill>
-          <a:blip r:embed="rId2">
-            <a:extLst>
-              <a:ext uri="{28A0092B-C50C-407E-A947-70E740481C1C}">
-                <a14:useLocalDpi xmlns:a14="http://schemas.microsoft.com/office/drawing/2010/main" val="0"/>
-              </a:ext>
-            </a:extLst>
-          </a:blip>
-          <a:srcRect/>
-          <a:stretch>
-            <a:fillRect/>
-          </a:stretch>
-        </p:blipFill>
-        <p:spPr bwMode="auto">
-          <a:xfrm>
-            <a:off x="10881954" y="5786323"/>
-            <a:ext cx="943692" cy="852856"/>
-          </a:xfrm>
-          <a:prstGeom prst="rect">
-            <a:avLst/>
-          </a:prstGeom>
-          <a:noFill/>
-          <a:extLst>
-            <a:ext uri="{909E8E84-426E-40DD-AFC4-6F175D3DCCD1}">
-              <a14:hiddenFill xmlns:a14="http://schemas.microsoft.com/office/drawing/2010/main">
-                <a:solidFill>
-                  <a:srgbClr val="FFFFFF"/>
-                </a:solidFill>
-              </a14:hiddenFill>
-            </a:ext>
-          </a:extLst>
-        </p:spPr>
-      </p:pic>
-    </p:spTree>
-    <p:extLst>
-      <p:ext uri="{BB962C8B-B14F-4D97-AF65-F5344CB8AC3E}">
-        <p14:creationId xmlns:p14="http://schemas.microsoft.com/office/powerpoint/2010/main" val="2014022677"/>
       </p:ext>
     </p:extLst>
   </p:cSld>
@@ -7319,6 +8686,446 @@
     <p:extLst>
       <p:ext uri="{BB962C8B-B14F-4D97-AF65-F5344CB8AC3E}">
         <p14:creationId xmlns:p14="http://schemas.microsoft.com/office/powerpoint/2010/main" val="2754829841"/>
+      </p:ext>
+    </p:extLst>
+  </p:cSld>
+  <p:clrMapOvr>
+    <a:masterClrMapping/>
+  </p:clrMapOvr>
+</p:sld>
+</file>
+
+<file path=ppt/slides/slide30.xml><?xml version="1.0" encoding="utf-8"?>
+<p:sld xmlns:a="http://schemas.openxmlformats.org/drawingml/2006/main" xmlns:r="http://schemas.openxmlformats.org/officeDocument/2006/relationships" xmlns:p="http://schemas.openxmlformats.org/presentationml/2006/main">
+  <p:cSld>
+    <p:spTree>
+      <p:nvGrpSpPr>
+        <p:cNvPr id="1" name="">
+          <a:extLst>
+            <a:ext uri="{FF2B5EF4-FFF2-40B4-BE49-F238E27FC236}">
+              <a16:creationId xmlns:a16="http://schemas.microsoft.com/office/drawing/2014/main" id="{DA8BDF43-C7CA-4F32-E57A-810BE1CB32A5}"/>
+            </a:ext>
+          </a:extLst>
+        </p:cNvPr>
+        <p:cNvGrpSpPr/>
+        <p:nvPr/>
+      </p:nvGrpSpPr>
+      <p:grpSpPr>
+        <a:xfrm>
+          <a:off x="0" y="0"/>
+          <a:ext cx="0" cy="0"/>
+          <a:chOff x="0" y="0"/>
+          <a:chExt cx="0" cy="0"/>
+        </a:xfrm>
+      </p:grpSpPr>
+      <p:sp>
+        <p:nvSpPr>
+          <p:cNvPr id="2" name="Title 1">
+            <a:extLst>
+              <a:ext uri="{FF2B5EF4-FFF2-40B4-BE49-F238E27FC236}">
+                <a16:creationId xmlns:a16="http://schemas.microsoft.com/office/drawing/2014/main" id="{495B92A9-526B-864A-93E4-0B25D352B0D8}"/>
+              </a:ext>
+            </a:extLst>
+          </p:cNvPr>
+          <p:cNvSpPr>
+            <a:spLocks noGrp="1"/>
+          </p:cNvSpPr>
+          <p:nvPr>
+            <p:ph type="title"/>
+          </p:nvPr>
+        </p:nvSpPr>
+        <p:spPr/>
+        <p:txBody>
+          <a:bodyPr/>
+          <a:lstStyle/>
+          <a:p>
+            <a:endParaRPr lang="en-US"/>
+          </a:p>
+        </p:txBody>
+      </p:sp>
+      <p:pic>
+        <p:nvPicPr>
+          <p:cNvPr id="1026" name="Picture 2">
+            <a:extLst>
+              <a:ext uri="{FF2B5EF4-FFF2-40B4-BE49-F238E27FC236}">
+                <a16:creationId xmlns:a16="http://schemas.microsoft.com/office/drawing/2014/main" id="{4776C738-78E4-C6A8-96AF-309166D0525A}"/>
+              </a:ext>
+            </a:extLst>
+          </p:cNvPr>
+          <p:cNvPicPr>
+            <a:picLocks noGrp="1" noChangeAspect="1" noChangeArrowheads="1"/>
+          </p:cNvPicPr>
+          <p:nvPr>
+            <p:ph idx="1"/>
+          </p:nvPr>
+        </p:nvPicPr>
+        <p:blipFill>
+          <a:blip r:embed="rId2">
+            <a:extLst>
+              <a:ext uri="{28A0092B-C50C-407E-A947-70E740481C1C}">
+                <a14:useLocalDpi xmlns:a14="http://schemas.microsoft.com/office/drawing/2010/main" val="0"/>
+              </a:ext>
+            </a:extLst>
+          </a:blip>
+          <a:srcRect/>
+          <a:stretch>
+            <a:fillRect/>
+          </a:stretch>
+        </p:blipFill>
+        <p:spPr bwMode="auto">
+          <a:xfrm>
+            <a:off x="10881954" y="5786323"/>
+            <a:ext cx="943692" cy="852856"/>
+          </a:xfrm>
+          <a:prstGeom prst="rect">
+            <a:avLst/>
+          </a:prstGeom>
+          <a:noFill/>
+          <a:extLst>
+            <a:ext uri="{909E8E84-426E-40DD-AFC4-6F175D3DCCD1}">
+              <a14:hiddenFill xmlns:a14="http://schemas.microsoft.com/office/drawing/2010/main">
+                <a:solidFill>
+                  <a:srgbClr val="FFFFFF"/>
+                </a:solidFill>
+              </a14:hiddenFill>
+            </a:ext>
+          </a:extLst>
+        </p:spPr>
+      </p:pic>
+    </p:spTree>
+    <p:extLst>
+      <p:ext uri="{BB962C8B-B14F-4D97-AF65-F5344CB8AC3E}">
+        <p14:creationId xmlns:p14="http://schemas.microsoft.com/office/powerpoint/2010/main" val="1291079095"/>
+      </p:ext>
+    </p:extLst>
+  </p:cSld>
+  <p:clrMapOvr>
+    <a:masterClrMapping/>
+  </p:clrMapOvr>
+</p:sld>
+</file>
+
+<file path=ppt/slides/slide31.xml><?xml version="1.0" encoding="utf-8"?>
+<p:sld xmlns:a="http://schemas.openxmlformats.org/drawingml/2006/main" xmlns:r="http://schemas.openxmlformats.org/officeDocument/2006/relationships" xmlns:p="http://schemas.openxmlformats.org/presentationml/2006/main">
+  <p:cSld>
+    <p:spTree>
+      <p:nvGrpSpPr>
+        <p:cNvPr id="1" name="">
+          <a:extLst>
+            <a:ext uri="{FF2B5EF4-FFF2-40B4-BE49-F238E27FC236}">
+              <a16:creationId xmlns:a16="http://schemas.microsoft.com/office/drawing/2014/main" id="{0E5C286C-4F86-55CD-EE5B-ED31813B9B00}"/>
+            </a:ext>
+          </a:extLst>
+        </p:cNvPr>
+        <p:cNvGrpSpPr/>
+        <p:nvPr/>
+      </p:nvGrpSpPr>
+      <p:grpSpPr>
+        <a:xfrm>
+          <a:off x="0" y="0"/>
+          <a:ext cx="0" cy="0"/>
+          <a:chOff x="0" y="0"/>
+          <a:chExt cx="0" cy="0"/>
+        </a:xfrm>
+      </p:grpSpPr>
+      <p:sp>
+        <p:nvSpPr>
+          <p:cNvPr id="2" name="Title 1">
+            <a:extLst>
+              <a:ext uri="{FF2B5EF4-FFF2-40B4-BE49-F238E27FC236}">
+                <a16:creationId xmlns:a16="http://schemas.microsoft.com/office/drawing/2014/main" id="{FE9EB1FA-4FB1-27F6-0C7B-2EB871EB17E5}"/>
+              </a:ext>
+            </a:extLst>
+          </p:cNvPr>
+          <p:cNvSpPr>
+            <a:spLocks noGrp="1"/>
+          </p:cNvSpPr>
+          <p:nvPr>
+            <p:ph type="title"/>
+          </p:nvPr>
+        </p:nvSpPr>
+        <p:spPr/>
+        <p:txBody>
+          <a:bodyPr/>
+          <a:lstStyle/>
+          <a:p>
+            <a:endParaRPr lang="en-US"/>
+          </a:p>
+        </p:txBody>
+      </p:sp>
+      <p:pic>
+        <p:nvPicPr>
+          <p:cNvPr id="1026" name="Picture 2">
+            <a:extLst>
+              <a:ext uri="{FF2B5EF4-FFF2-40B4-BE49-F238E27FC236}">
+                <a16:creationId xmlns:a16="http://schemas.microsoft.com/office/drawing/2014/main" id="{C88CC039-1627-CBE9-F7D9-1CFAE3BF03C3}"/>
+              </a:ext>
+            </a:extLst>
+          </p:cNvPr>
+          <p:cNvPicPr>
+            <a:picLocks noGrp="1" noChangeAspect="1" noChangeArrowheads="1"/>
+          </p:cNvPicPr>
+          <p:nvPr>
+            <p:ph idx="1"/>
+          </p:nvPr>
+        </p:nvPicPr>
+        <p:blipFill>
+          <a:blip r:embed="rId2">
+            <a:extLst>
+              <a:ext uri="{28A0092B-C50C-407E-A947-70E740481C1C}">
+                <a14:useLocalDpi xmlns:a14="http://schemas.microsoft.com/office/drawing/2010/main" val="0"/>
+              </a:ext>
+            </a:extLst>
+          </a:blip>
+          <a:srcRect/>
+          <a:stretch>
+            <a:fillRect/>
+          </a:stretch>
+        </p:blipFill>
+        <p:spPr bwMode="auto">
+          <a:xfrm>
+            <a:off x="10881954" y="5786323"/>
+            <a:ext cx="943692" cy="852856"/>
+          </a:xfrm>
+          <a:prstGeom prst="rect">
+            <a:avLst/>
+          </a:prstGeom>
+          <a:noFill/>
+          <a:extLst>
+            <a:ext uri="{909E8E84-426E-40DD-AFC4-6F175D3DCCD1}">
+              <a14:hiddenFill xmlns:a14="http://schemas.microsoft.com/office/drawing/2010/main">
+                <a:solidFill>
+                  <a:srgbClr val="FFFFFF"/>
+                </a:solidFill>
+              </a14:hiddenFill>
+            </a:ext>
+          </a:extLst>
+        </p:spPr>
+      </p:pic>
+    </p:spTree>
+    <p:extLst>
+      <p:ext uri="{BB962C8B-B14F-4D97-AF65-F5344CB8AC3E}">
+        <p14:creationId xmlns:p14="http://schemas.microsoft.com/office/powerpoint/2010/main" val="3678410639"/>
+      </p:ext>
+    </p:extLst>
+  </p:cSld>
+  <p:clrMapOvr>
+    <a:masterClrMapping/>
+  </p:clrMapOvr>
+</p:sld>
+</file>
+
+<file path=ppt/slides/slide32.xml><?xml version="1.0" encoding="utf-8"?>
+<p:sld xmlns:a="http://schemas.openxmlformats.org/drawingml/2006/main" xmlns:r="http://schemas.openxmlformats.org/officeDocument/2006/relationships" xmlns:p="http://schemas.openxmlformats.org/presentationml/2006/main">
+  <p:cSld>
+    <p:spTree>
+      <p:nvGrpSpPr>
+        <p:cNvPr id="1" name="">
+          <a:extLst>
+            <a:ext uri="{FF2B5EF4-FFF2-40B4-BE49-F238E27FC236}">
+              <a16:creationId xmlns:a16="http://schemas.microsoft.com/office/drawing/2014/main" id="{B3165C58-7741-594C-3D4A-F77959661B3B}"/>
+            </a:ext>
+          </a:extLst>
+        </p:cNvPr>
+        <p:cNvGrpSpPr/>
+        <p:nvPr/>
+      </p:nvGrpSpPr>
+      <p:grpSpPr>
+        <a:xfrm>
+          <a:off x="0" y="0"/>
+          <a:ext cx="0" cy="0"/>
+          <a:chOff x="0" y="0"/>
+          <a:chExt cx="0" cy="0"/>
+        </a:xfrm>
+      </p:grpSpPr>
+      <p:sp>
+        <p:nvSpPr>
+          <p:cNvPr id="2" name="Title 1">
+            <a:extLst>
+              <a:ext uri="{FF2B5EF4-FFF2-40B4-BE49-F238E27FC236}">
+                <a16:creationId xmlns:a16="http://schemas.microsoft.com/office/drawing/2014/main" id="{CD21192D-E761-251B-1D18-6408C308046B}"/>
+              </a:ext>
+            </a:extLst>
+          </p:cNvPr>
+          <p:cNvSpPr>
+            <a:spLocks noGrp="1"/>
+          </p:cNvSpPr>
+          <p:nvPr>
+            <p:ph type="title"/>
+          </p:nvPr>
+        </p:nvSpPr>
+        <p:spPr/>
+        <p:txBody>
+          <a:bodyPr/>
+          <a:lstStyle/>
+          <a:p>
+            <a:endParaRPr lang="en-US"/>
+          </a:p>
+        </p:txBody>
+      </p:sp>
+      <p:pic>
+        <p:nvPicPr>
+          <p:cNvPr id="1026" name="Picture 2">
+            <a:extLst>
+              <a:ext uri="{FF2B5EF4-FFF2-40B4-BE49-F238E27FC236}">
+                <a16:creationId xmlns:a16="http://schemas.microsoft.com/office/drawing/2014/main" id="{66FF3372-7B11-D907-CBCE-E1BD6B8D93FB}"/>
+              </a:ext>
+            </a:extLst>
+          </p:cNvPr>
+          <p:cNvPicPr>
+            <a:picLocks noGrp="1" noChangeAspect="1" noChangeArrowheads="1"/>
+          </p:cNvPicPr>
+          <p:nvPr>
+            <p:ph idx="1"/>
+          </p:nvPr>
+        </p:nvPicPr>
+        <p:blipFill>
+          <a:blip r:embed="rId2">
+            <a:extLst>
+              <a:ext uri="{28A0092B-C50C-407E-A947-70E740481C1C}">
+                <a14:useLocalDpi xmlns:a14="http://schemas.microsoft.com/office/drawing/2010/main" val="0"/>
+              </a:ext>
+            </a:extLst>
+          </a:blip>
+          <a:srcRect/>
+          <a:stretch>
+            <a:fillRect/>
+          </a:stretch>
+        </p:blipFill>
+        <p:spPr bwMode="auto">
+          <a:xfrm>
+            <a:off x="10881954" y="5786323"/>
+            <a:ext cx="943692" cy="852856"/>
+          </a:xfrm>
+          <a:prstGeom prst="rect">
+            <a:avLst/>
+          </a:prstGeom>
+          <a:noFill/>
+          <a:extLst>
+            <a:ext uri="{909E8E84-426E-40DD-AFC4-6F175D3DCCD1}">
+              <a14:hiddenFill xmlns:a14="http://schemas.microsoft.com/office/drawing/2010/main">
+                <a:solidFill>
+                  <a:srgbClr val="FFFFFF"/>
+                </a:solidFill>
+              </a14:hiddenFill>
+            </a:ext>
+          </a:extLst>
+        </p:spPr>
+      </p:pic>
+    </p:spTree>
+    <p:extLst>
+      <p:ext uri="{BB962C8B-B14F-4D97-AF65-F5344CB8AC3E}">
+        <p14:creationId xmlns:p14="http://schemas.microsoft.com/office/powerpoint/2010/main" val="1118147558"/>
+      </p:ext>
+    </p:extLst>
+  </p:cSld>
+  <p:clrMapOvr>
+    <a:masterClrMapping/>
+  </p:clrMapOvr>
+</p:sld>
+</file>
+
+<file path=ppt/slides/slide33.xml><?xml version="1.0" encoding="utf-8"?>
+<p:sld xmlns:a="http://schemas.openxmlformats.org/drawingml/2006/main" xmlns:r="http://schemas.openxmlformats.org/officeDocument/2006/relationships" xmlns:p="http://schemas.openxmlformats.org/presentationml/2006/main">
+  <p:cSld>
+    <p:spTree>
+      <p:nvGrpSpPr>
+        <p:cNvPr id="1" name="">
+          <a:extLst>
+            <a:ext uri="{FF2B5EF4-FFF2-40B4-BE49-F238E27FC236}">
+              <a16:creationId xmlns:a16="http://schemas.microsoft.com/office/drawing/2014/main" id="{31E5A3D8-F806-9C0A-1AD2-0BCD8AEE9313}"/>
+            </a:ext>
+          </a:extLst>
+        </p:cNvPr>
+        <p:cNvGrpSpPr/>
+        <p:nvPr/>
+      </p:nvGrpSpPr>
+      <p:grpSpPr>
+        <a:xfrm>
+          <a:off x="0" y="0"/>
+          <a:ext cx="0" cy="0"/>
+          <a:chOff x="0" y="0"/>
+          <a:chExt cx="0" cy="0"/>
+        </a:xfrm>
+      </p:grpSpPr>
+      <p:sp>
+        <p:nvSpPr>
+          <p:cNvPr id="2" name="Title 1">
+            <a:extLst>
+              <a:ext uri="{FF2B5EF4-FFF2-40B4-BE49-F238E27FC236}">
+                <a16:creationId xmlns:a16="http://schemas.microsoft.com/office/drawing/2014/main" id="{7144FE53-12BB-C42B-F029-622AAD568268}"/>
+              </a:ext>
+            </a:extLst>
+          </p:cNvPr>
+          <p:cNvSpPr>
+            <a:spLocks noGrp="1"/>
+          </p:cNvSpPr>
+          <p:nvPr>
+            <p:ph type="title"/>
+          </p:nvPr>
+        </p:nvSpPr>
+        <p:spPr/>
+        <p:txBody>
+          <a:bodyPr/>
+          <a:lstStyle/>
+          <a:p>
+            <a:endParaRPr lang="en-US"/>
+          </a:p>
+        </p:txBody>
+      </p:sp>
+      <p:pic>
+        <p:nvPicPr>
+          <p:cNvPr id="1026" name="Picture 2">
+            <a:extLst>
+              <a:ext uri="{FF2B5EF4-FFF2-40B4-BE49-F238E27FC236}">
+                <a16:creationId xmlns:a16="http://schemas.microsoft.com/office/drawing/2014/main" id="{EDD7A040-C83E-E640-F9BA-368FB018DFB3}"/>
+              </a:ext>
+            </a:extLst>
+          </p:cNvPr>
+          <p:cNvPicPr>
+            <a:picLocks noGrp="1" noChangeAspect="1" noChangeArrowheads="1"/>
+          </p:cNvPicPr>
+          <p:nvPr>
+            <p:ph idx="1"/>
+          </p:nvPr>
+        </p:nvPicPr>
+        <p:blipFill>
+          <a:blip r:embed="rId2">
+            <a:extLst>
+              <a:ext uri="{28A0092B-C50C-407E-A947-70E740481C1C}">
+                <a14:useLocalDpi xmlns:a14="http://schemas.microsoft.com/office/drawing/2010/main" val="0"/>
+              </a:ext>
+            </a:extLst>
+          </a:blip>
+          <a:srcRect/>
+          <a:stretch>
+            <a:fillRect/>
+          </a:stretch>
+        </p:blipFill>
+        <p:spPr bwMode="auto">
+          <a:xfrm>
+            <a:off x="10881954" y="5786323"/>
+            <a:ext cx="943692" cy="852856"/>
+          </a:xfrm>
+          <a:prstGeom prst="rect">
+            <a:avLst/>
+          </a:prstGeom>
+          <a:noFill/>
+          <a:extLst>
+            <a:ext uri="{909E8E84-426E-40DD-AFC4-6F175D3DCCD1}">
+              <a14:hiddenFill xmlns:a14="http://schemas.microsoft.com/office/drawing/2010/main">
+                <a:solidFill>
+                  <a:srgbClr val="FFFFFF"/>
+                </a:solidFill>
+              </a14:hiddenFill>
+            </a:ext>
+          </a:extLst>
+        </p:spPr>
+      </p:pic>
+    </p:spTree>
+    <p:extLst>
+      <p:ext uri="{BB962C8B-B14F-4D97-AF65-F5344CB8AC3E}">
+        <p14:creationId xmlns:p14="http://schemas.microsoft.com/office/powerpoint/2010/main" val="2014022677"/>
       </p:ext>
     </p:extLst>
   </p:cSld>
@@ -8031,10 +9838,10 @@
       </p:sp>
       <p:pic>
         <p:nvPicPr>
-          <p:cNvPr id="9" name="Picture 8">
-            <a:extLst>
-              <a:ext uri="{FF2B5EF4-FFF2-40B4-BE49-F238E27FC236}">
-                <a16:creationId xmlns:a16="http://schemas.microsoft.com/office/drawing/2014/main" id="{6A4E5AB4-6305-CB86-139D-4A0D225E68D3}"/>
+          <p:cNvPr id="3" name="Picture 2">
+            <a:extLst>
+              <a:ext uri="{FF2B5EF4-FFF2-40B4-BE49-F238E27FC236}">
+                <a16:creationId xmlns:a16="http://schemas.microsoft.com/office/drawing/2014/main" id="{127F4383-34BE-00F8-AEC2-EE1550AED1D6}"/>
               </a:ext>
             </a:extLst>
           </p:cNvPr>
@@ -8051,8 +9858,8 @@
         </p:blipFill>
         <p:spPr>
           <a:xfrm>
-            <a:off x="420295" y="2691552"/>
-            <a:ext cx="4163006" cy="3858163"/>
+            <a:off x="990600" y="2601605"/>
+            <a:ext cx="3786226" cy="3826938"/>
           </a:xfrm>
           <a:prstGeom prst="rect">
             <a:avLst/>
@@ -8061,10 +9868,10 @@
       </p:pic>
       <p:pic>
         <p:nvPicPr>
-          <p:cNvPr id="11" name="Picture 10" descr="A graph of a number of blue dots&#10;&#10;AI-generated content may be incorrect.">
-            <a:extLst>
-              <a:ext uri="{FF2B5EF4-FFF2-40B4-BE49-F238E27FC236}">
-                <a16:creationId xmlns:a16="http://schemas.microsoft.com/office/drawing/2014/main" id="{02A99CDA-B0D0-1E5B-A7C2-EEF098EA5877}"/>
+          <p:cNvPr id="10" name="Picture 9">
+            <a:extLst>
+              <a:ext uri="{FF2B5EF4-FFF2-40B4-BE49-F238E27FC236}">
+                <a16:creationId xmlns:a16="http://schemas.microsoft.com/office/drawing/2014/main" id="{A33D4D7C-45C1-E8D5-0CE5-750A64DD44FD}"/>
               </a:ext>
             </a:extLst>
           </p:cNvPr>
@@ -8087,8 +9894,8 @@
         </p:blipFill>
         <p:spPr>
           <a:xfrm>
-            <a:off x="5480905" y="2688963"/>
-            <a:ext cx="5221234" cy="3950216"/>
+            <a:off x="5390993" y="2688963"/>
+            <a:ext cx="5184658" cy="3950216"/>
           </a:xfrm>
           <a:prstGeom prst="rect">
             <a:avLst/>
@@ -8131,42 +9938,6 @@
           <a:chExt cx="0" cy="0"/>
         </a:xfrm>
       </p:grpSpPr>
-      <p:pic>
-        <p:nvPicPr>
-          <p:cNvPr id="16" name="Picture 15" descr="A red and blue line graph&#10;&#10;AI-generated content may be incorrect.">
-            <a:extLst>
-              <a:ext uri="{FF2B5EF4-FFF2-40B4-BE49-F238E27FC236}">
-                <a16:creationId xmlns:a16="http://schemas.microsoft.com/office/drawing/2014/main" id="{E06FF294-8243-AC0F-EA0C-717B0CA497F1}"/>
-              </a:ext>
-            </a:extLst>
-          </p:cNvPr>
-          <p:cNvPicPr>
-            <a:picLocks noChangeAspect="1"/>
-          </p:cNvPicPr>
-          <p:nvPr/>
-        </p:nvPicPr>
-        <p:blipFill>
-          <a:blip r:embed="rId2">
-            <a:extLst>
-              <a:ext uri="{28A0092B-C50C-407E-A947-70E740481C1C}">
-                <a14:useLocalDpi xmlns:a14="http://schemas.microsoft.com/office/drawing/2010/main" val="0"/>
-              </a:ext>
-            </a:extLst>
-          </a:blip>
-          <a:stretch>
-            <a:fillRect/>
-          </a:stretch>
-        </p:blipFill>
-        <p:spPr>
-          <a:xfrm>
-            <a:off x="3474612" y="2490671"/>
-            <a:ext cx="5339581" cy="4039754"/>
-          </a:xfrm>
-          <a:prstGeom prst="rect">
-            <a:avLst/>
-          </a:prstGeom>
-        </p:spPr>
-      </p:pic>
       <p:sp>
         <p:nvSpPr>
           <p:cNvPr id="4" name="Title 1">
@@ -8249,7 +10020,7 @@
           <p:nvPr/>
         </p:nvPicPr>
         <p:blipFill>
-          <a:blip r:embed="rId3">
+          <a:blip r:embed="rId2">
             <a:extLst>
               <a:ext uri="{28A0092B-C50C-407E-A947-70E740481C1C}">
                 <a14:useLocalDpi xmlns:a14="http://schemas.microsoft.com/office/drawing/2010/main" val="0"/>
@@ -8317,6 +10088,42 @@
           </a:p>
         </p:txBody>
       </p:sp>
+      <p:pic>
+        <p:nvPicPr>
+          <p:cNvPr id="8" name="Picture 7">
+            <a:extLst>
+              <a:ext uri="{FF2B5EF4-FFF2-40B4-BE49-F238E27FC236}">
+                <a16:creationId xmlns:a16="http://schemas.microsoft.com/office/drawing/2014/main" id="{77770E30-11FE-CC1F-9843-7B9F2DD169E9}"/>
+              </a:ext>
+            </a:extLst>
+          </p:cNvPr>
+          <p:cNvPicPr>
+            <a:picLocks noChangeAspect="1"/>
+          </p:cNvPicPr>
+          <p:nvPr/>
+        </p:nvPicPr>
+        <p:blipFill>
+          <a:blip r:embed="rId3">
+            <a:extLst>
+              <a:ext uri="{28A0092B-C50C-407E-A947-70E740481C1C}">
+                <a14:useLocalDpi xmlns:a14="http://schemas.microsoft.com/office/drawing/2010/main" val="0"/>
+              </a:ext>
+            </a:extLst>
+          </a:blip>
+          <a:stretch>
+            <a:fillRect/>
+          </a:stretch>
+        </p:blipFill>
+        <p:spPr>
+          <a:xfrm>
+            <a:off x="3159857" y="2374959"/>
+            <a:ext cx="5698850" cy="4341982"/>
+          </a:xfrm>
+          <a:prstGeom prst="rect">
+            <a:avLst/>
+          </a:prstGeom>
+        </p:spPr>
+      </p:pic>
     </p:spTree>
     <p:extLst>
       <p:ext uri="{BB962C8B-B14F-4D97-AF65-F5344CB8AC3E}">

</xml_diff>

<commit_message>
Finish single weight optimization
</commit_message>
<xml_diff>
--- a/Neural Networks/Slides.pptx
+++ b/Neural Networks/Slides.pptx
@@ -57,17 +57,23 @@
     <p:sldId id="328" r:id="rId51"/>
     <p:sldId id="329" r:id="rId52"/>
     <p:sldId id="330" r:id="rId53"/>
-    <p:sldId id="325" r:id="rId54"/>
-    <p:sldId id="305" r:id="rId55"/>
-    <p:sldId id="294" r:id="rId56"/>
-    <p:sldId id="295" r:id="rId57"/>
-    <p:sldId id="258" r:id="rId58"/>
-    <p:sldId id="259" r:id="rId59"/>
-    <p:sldId id="260" r:id="rId60"/>
-    <p:sldId id="261" r:id="rId61"/>
-    <p:sldId id="262" r:id="rId62"/>
-    <p:sldId id="263" r:id="rId63"/>
-    <p:sldId id="264" r:id="rId64"/>
+    <p:sldId id="331" r:id="rId54"/>
+    <p:sldId id="332" r:id="rId55"/>
+    <p:sldId id="333" r:id="rId56"/>
+    <p:sldId id="334" r:id="rId57"/>
+    <p:sldId id="335" r:id="rId58"/>
+    <p:sldId id="336" r:id="rId59"/>
+    <p:sldId id="337" r:id="rId60"/>
+    <p:sldId id="295" r:id="rId61"/>
+    <p:sldId id="325" r:id="rId62"/>
+    <p:sldId id="305" r:id="rId63"/>
+    <p:sldId id="258" r:id="rId64"/>
+    <p:sldId id="259" r:id="rId65"/>
+    <p:sldId id="260" r:id="rId66"/>
+    <p:sldId id="261" r:id="rId67"/>
+    <p:sldId id="262" r:id="rId68"/>
+    <p:sldId id="263" r:id="rId69"/>
+    <p:sldId id="264" r:id="rId70"/>
   </p:sldIdLst>
   <p:sldSz cx="12192000" cy="6858000"/>
   <p:notesSz cx="6858000" cy="9144000"/>
@@ -433,7 +439,7 @@
           <a:p>
             <a:fld id="{B113BE1E-415D-4FEA-A839-B33FA07073C5}" type="datetimeFigureOut">
               <a:rPr lang="en-US" smtClean="0"/>
-              <a:t>10/5/2025</a:t>
+              <a:t>10/6/2025</a:t>
             </a:fld>
             <a:endParaRPr lang="en-US"/>
           </a:p>
@@ -631,7 +637,7 @@
           <a:p>
             <a:fld id="{B113BE1E-415D-4FEA-A839-B33FA07073C5}" type="datetimeFigureOut">
               <a:rPr lang="en-US" smtClean="0"/>
-              <a:t>10/5/2025</a:t>
+              <a:t>10/6/2025</a:t>
             </a:fld>
             <a:endParaRPr lang="en-US"/>
           </a:p>
@@ -839,7 +845,7 @@
           <a:p>
             <a:fld id="{B113BE1E-415D-4FEA-A839-B33FA07073C5}" type="datetimeFigureOut">
               <a:rPr lang="en-US" smtClean="0"/>
-              <a:t>10/5/2025</a:t>
+              <a:t>10/6/2025</a:t>
             </a:fld>
             <a:endParaRPr lang="en-US"/>
           </a:p>
@@ -1037,7 +1043,7 @@
           <a:p>
             <a:fld id="{B113BE1E-415D-4FEA-A839-B33FA07073C5}" type="datetimeFigureOut">
               <a:rPr lang="en-US" smtClean="0"/>
-              <a:t>10/5/2025</a:t>
+              <a:t>10/6/2025</a:t>
             </a:fld>
             <a:endParaRPr lang="en-US"/>
           </a:p>
@@ -1312,7 +1318,7 @@
           <a:p>
             <a:fld id="{B113BE1E-415D-4FEA-A839-B33FA07073C5}" type="datetimeFigureOut">
               <a:rPr lang="en-US" smtClean="0"/>
-              <a:t>10/5/2025</a:t>
+              <a:t>10/6/2025</a:t>
             </a:fld>
             <a:endParaRPr lang="en-US"/>
           </a:p>
@@ -1577,7 +1583,7 @@
           <a:p>
             <a:fld id="{B113BE1E-415D-4FEA-A839-B33FA07073C5}" type="datetimeFigureOut">
               <a:rPr lang="en-US" smtClean="0"/>
-              <a:t>10/5/2025</a:t>
+              <a:t>10/6/2025</a:t>
             </a:fld>
             <a:endParaRPr lang="en-US"/>
           </a:p>
@@ -1989,7 +1995,7 @@
           <a:p>
             <a:fld id="{B113BE1E-415D-4FEA-A839-B33FA07073C5}" type="datetimeFigureOut">
               <a:rPr lang="en-US" smtClean="0"/>
-              <a:t>10/5/2025</a:t>
+              <a:t>10/6/2025</a:t>
             </a:fld>
             <a:endParaRPr lang="en-US"/>
           </a:p>
@@ -2130,7 +2136,7 @@
           <a:p>
             <a:fld id="{B113BE1E-415D-4FEA-A839-B33FA07073C5}" type="datetimeFigureOut">
               <a:rPr lang="en-US" smtClean="0"/>
-              <a:t>10/5/2025</a:t>
+              <a:t>10/6/2025</a:t>
             </a:fld>
             <a:endParaRPr lang="en-US"/>
           </a:p>
@@ -2243,7 +2249,7 @@
           <a:p>
             <a:fld id="{B113BE1E-415D-4FEA-A839-B33FA07073C5}" type="datetimeFigureOut">
               <a:rPr lang="en-US" smtClean="0"/>
-              <a:t>10/5/2025</a:t>
+              <a:t>10/6/2025</a:t>
             </a:fld>
             <a:endParaRPr lang="en-US"/>
           </a:p>
@@ -2554,7 +2560,7 @@
           <a:p>
             <a:fld id="{B113BE1E-415D-4FEA-A839-B33FA07073C5}" type="datetimeFigureOut">
               <a:rPr lang="en-US" smtClean="0"/>
-              <a:t>10/5/2025</a:t>
+              <a:t>10/6/2025</a:t>
             </a:fld>
             <a:endParaRPr lang="en-US"/>
           </a:p>
@@ -2842,7 +2848,7 @@
           <a:p>
             <a:fld id="{B113BE1E-415D-4FEA-A839-B33FA07073C5}" type="datetimeFigureOut">
               <a:rPr lang="en-US" smtClean="0"/>
-              <a:t>10/5/2025</a:t>
+              <a:t>10/6/2025</a:t>
             </a:fld>
             <a:endParaRPr lang="en-US"/>
           </a:p>
@@ -3083,7 +3089,7 @@
           <a:p>
             <a:fld id="{B113BE1E-415D-4FEA-A839-B33FA07073C5}" type="datetimeFigureOut">
               <a:rPr lang="en-US" smtClean="0"/>
-              <a:t>10/5/2025</a:t>
+              <a:t>10/6/2025</a:t>
             </a:fld>
             <a:endParaRPr lang="en-US"/>
           </a:p>
@@ -12630,8 +12636,8 @@
           </a:extLst>
         </p:spPr>
       </p:pic>
-      <mc:AlternateContent xmlns:mc="http://schemas.openxmlformats.org/markup-compatibility/2006">
-        <mc:Choice xmlns:a14="http://schemas.microsoft.com/office/drawing/2010/main" Requires="a14">
+      <mc:AlternateContent xmlns:mc="http://schemas.openxmlformats.org/markup-compatibility/2006" xmlns:a14="http://schemas.microsoft.com/office/drawing/2010/main">
+        <mc:Choice Requires="a14">
           <p:sp>
             <p:nvSpPr>
               <p:cNvPr id="9" name="TextBox 8">
@@ -12784,7 +12790,7 @@
             </p:txBody>
           </p:sp>
         </mc:Choice>
-        <mc:Fallback>
+        <mc:Fallback xmlns="">
           <p:sp>
             <p:nvSpPr>
               <p:cNvPr id="9" name="TextBox 8">
@@ -13108,8 +13114,8 @@
           </a:fontRef>
         </p:style>
       </p:cxnSp>
-      <mc:AlternateContent xmlns:mc="http://schemas.openxmlformats.org/markup-compatibility/2006">
-        <mc:Choice xmlns:a14="http://schemas.microsoft.com/office/drawing/2010/main" Requires="a14">
+      <mc:AlternateContent xmlns:mc="http://schemas.openxmlformats.org/markup-compatibility/2006" xmlns:a14="http://schemas.microsoft.com/office/drawing/2010/main">
+        <mc:Choice Requires="a14">
           <p:sp>
             <p:nvSpPr>
               <p:cNvPr id="7" name="TextBox 6">
@@ -13260,7 +13266,7 @@
             </p:txBody>
           </p:sp>
         </mc:Choice>
-        <mc:Fallback>
+        <mc:Fallback xmlns="">
           <p:sp>
             <p:nvSpPr>
               <p:cNvPr id="7" name="TextBox 6">
@@ -13584,8 +13590,8 @@
           </a:fontRef>
         </p:style>
       </p:cxnSp>
-      <mc:AlternateContent xmlns:mc="http://schemas.openxmlformats.org/markup-compatibility/2006">
-        <mc:Choice xmlns:a14="http://schemas.microsoft.com/office/drawing/2010/main" Requires="a14">
+      <mc:AlternateContent xmlns:mc="http://schemas.openxmlformats.org/markup-compatibility/2006" xmlns:a14="http://schemas.microsoft.com/office/drawing/2010/main">
+        <mc:Choice Requires="a14">
           <p:sp>
             <p:nvSpPr>
               <p:cNvPr id="9" name="TextBox 8">
@@ -13716,7 +13722,7 @@
             </p:txBody>
           </p:sp>
         </mc:Choice>
-        <mc:Fallback>
+        <mc:Fallback xmlns="">
           <p:sp>
             <p:nvSpPr>
               <p:cNvPr id="9" name="TextBox 8">
@@ -14040,8 +14046,8 @@
           </a:fontRef>
         </p:style>
       </p:cxnSp>
-      <mc:AlternateContent xmlns:mc="http://schemas.openxmlformats.org/markup-compatibility/2006">
-        <mc:Choice xmlns:a14="http://schemas.microsoft.com/office/drawing/2010/main" Requires="a14">
+      <mc:AlternateContent xmlns:mc="http://schemas.openxmlformats.org/markup-compatibility/2006" xmlns:a14="http://schemas.microsoft.com/office/drawing/2010/main">
+        <mc:Choice Requires="a14">
           <p:sp>
             <p:nvSpPr>
               <p:cNvPr id="9" name="TextBox 8">
@@ -14172,7 +14178,7 @@
             </p:txBody>
           </p:sp>
         </mc:Choice>
-        <mc:Fallback>
+        <mc:Fallback xmlns="">
           <p:sp>
             <p:nvSpPr>
               <p:cNvPr id="9" name="TextBox 8">
@@ -14417,8 +14423,8 @@
           </a:extLst>
         </p:spPr>
       </p:pic>
-      <mc:AlternateContent xmlns:mc="http://schemas.openxmlformats.org/markup-compatibility/2006">
-        <mc:Choice xmlns:a14="http://schemas.microsoft.com/office/drawing/2010/main" Requires="a14">
+      <mc:AlternateContent xmlns:mc="http://schemas.openxmlformats.org/markup-compatibility/2006" xmlns:a14="http://schemas.microsoft.com/office/drawing/2010/main">
+        <mc:Choice Requires="a14">
           <p:sp>
             <p:nvSpPr>
               <p:cNvPr id="7" name="TextBox 6">
@@ -14447,6 +14453,7 @@
               </a:bodyPr>
               <a:lstStyle/>
               <a:p>
+                <a:pPr/>
                 <a14:m>
                   <m:oMathPara xmlns:m="http://schemas.openxmlformats.org/officeDocument/2006/math">
                     <m:oMathParaPr>
@@ -14479,21 +14486,7 @@
                               </a:solidFill>
                               <a:latin typeface="Cambria Math" panose="02040503050406030204" pitchFamily="18" charset="0"/>
                             </a:rPr>
-                            <m:t>d</m:t>
-                          </m:r>
-                          <m:r>
-                            <m:rPr>
-                              <m:sty m:val="p"/>
-                            </m:rPr>
-                            <a:rPr lang="es-ES" sz="4000" b="0" i="1" smtClean="0">
-                              <a:solidFill>
-                                <a:schemeClr val="accent5">
-                                  <a:lumMod val="75000"/>
-                                </a:schemeClr>
-                              </a:solidFill>
-                              <a:latin typeface="Cambria Math" panose="02040503050406030204" pitchFamily="18" charset="0"/>
-                            </a:rPr>
-                            <m:t>SSR</m:t>
+                            <m:t>dSSR</m:t>
                           </m:r>
                         </m:num>
                         <m:den>
@@ -14536,7 +14529,7 @@
             </p:txBody>
           </p:sp>
         </mc:Choice>
-        <mc:Fallback>
+        <mc:Fallback xmlns="">
           <p:sp>
             <p:nvSpPr>
               <p:cNvPr id="7" name="TextBox 6">
@@ -15296,8 +15289,8 @@
           </a:fontRef>
         </p:style>
       </p:cxnSp>
-      <mc:AlternateContent xmlns:mc="http://schemas.openxmlformats.org/markup-compatibility/2006">
-        <mc:Choice xmlns:a14="http://schemas.microsoft.com/office/drawing/2010/main" Requires="a14">
+      <mc:AlternateContent xmlns:mc="http://schemas.openxmlformats.org/markup-compatibility/2006" xmlns:a14="http://schemas.microsoft.com/office/drawing/2010/main">
+        <mc:Choice Requires="a14">
           <p:sp>
             <p:nvSpPr>
               <p:cNvPr id="9" name="TextBox 8">
@@ -15575,7 +15568,7 @@
                               <a:rPr lang="es-ES" sz="2800" b="0" i="1" smtClean="0">
                                 <a:latin typeface="Cambria Math" panose="02040503050406030204" pitchFamily="18" charset="0"/>
                               </a:rPr>
-                              <m:t> -</m:t>
+                              <m:t> −</m:t>
                             </m:r>
                             <m:sSub>
                               <m:sSubPr>
@@ -15636,7 +15629,7 @@
             </p:txBody>
           </p:sp>
         </mc:Choice>
-        <mc:Fallback>
+        <mc:Fallback xmlns="">
           <p:sp>
             <p:nvSpPr>
               <p:cNvPr id="9" name="TextBox 8">
@@ -16924,8 +16917,8 @@
           </a:extLst>
         </p:spPr>
       </p:pic>
-      <mc:AlternateContent xmlns:mc="http://schemas.openxmlformats.org/markup-compatibility/2006">
-        <mc:Choice xmlns:a14="http://schemas.microsoft.com/office/drawing/2010/main" Requires="a14">
+      <mc:AlternateContent xmlns:mc="http://schemas.openxmlformats.org/markup-compatibility/2006" xmlns:a14="http://schemas.microsoft.com/office/drawing/2010/main">
+        <mc:Choice Requires="a14">
           <p:sp>
             <p:nvSpPr>
               <p:cNvPr id="9" name="TextBox 8">
@@ -17052,7 +17045,7 @@
                               <a:rPr lang="es-ES" sz="2800" b="0" i="1" smtClean="0">
                                 <a:latin typeface="Cambria Math" panose="02040503050406030204" pitchFamily="18" charset="0"/>
                               </a:rPr>
-                              <m:t> -</m:t>
+                              <m:t> −</m:t>
                             </m:r>
                             <m:sSub>
                               <m:sSubPr>
@@ -17113,7 +17106,7 @@
             </p:txBody>
           </p:sp>
         </mc:Choice>
-        <mc:Fallback>
+        <mc:Fallback xmlns="">
           <p:sp>
             <p:nvSpPr>
               <p:cNvPr id="9" name="TextBox 8">
@@ -17444,8 +17437,8 @@
           </a:extLst>
         </p:spPr>
       </p:pic>
-      <mc:AlternateContent xmlns:mc="http://schemas.openxmlformats.org/markup-compatibility/2006">
-        <mc:Choice xmlns:a14="http://schemas.microsoft.com/office/drawing/2010/main" Requires="a14">
+      <mc:AlternateContent xmlns:mc="http://schemas.openxmlformats.org/markup-compatibility/2006" xmlns:a14="http://schemas.microsoft.com/office/drawing/2010/main">
+        <mc:Choice Requires="a14">
           <p:sp>
             <p:nvSpPr>
               <p:cNvPr id="9" name="TextBox 8">
@@ -17572,7 +17565,7 @@
                               <a:rPr lang="es-ES" sz="2800" b="0" i="1" smtClean="0">
                                 <a:latin typeface="Cambria Math" panose="02040503050406030204" pitchFamily="18" charset="0"/>
                               </a:rPr>
-                              <m:t> -</m:t>
+                              <m:t> −</m:t>
                             </m:r>
                             <m:sSub>
                               <m:sSubPr>
@@ -17633,7 +17626,7 @@
             </p:txBody>
           </p:sp>
         </mc:Choice>
-        <mc:Fallback>
+        <mc:Fallback xmlns="">
           <p:sp>
             <p:nvSpPr>
               <p:cNvPr id="9" name="TextBox 8">
@@ -18038,8 +18031,8 @@
           </a:extLst>
         </p:spPr>
       </p:pic>
-      <mc:AlternateContent xmlns:mc="http://schemas.openxmlformats.org/markup-compatibility/2006">
-        <mc:Choice xmlns:a14="http://schemas.microsoft.com/office/drawing/2010/main" Requires="a14">
+      <mc:AlternateContent xmlns:mc="http://schemas.openxmlformats.org/markup-compatibility/2006" xmlns:a14="http://schemas.microsoft.com/office/drawing/2010/main">
+        <mc:Choice Requires="a14">
           <p:sp>
             <p:nvSpPr>
               <p:cNvPr id="12" name="TextBox 11">
@@ -18092,19 +18085,7 @@
                             </a:solidFill>
                             <a:latin typeface="Cambria Math" panose="02040503050406030204" pitchFamily="18" charset="0"/>
                           </a:rPr>
-                          <m:t>d</m:t>
-                        </m:r>
-                        <m:r>
-                          <m:rPr>
-                            <m:sty m:val="p"/>
-                          </m:rPr>
-                          <a:rPr lang="es-ES" sz="4800" b="0" i="1" smtClean="0">
-                            <a:solidFill>
-                              <a:schemeClr val="tx1"/>
-                            </a:solidFill>
-                            <a:latin typeface="Cambria Math" panose="02040503050406030204" pitchFamily="18" charset="0"/>
-                          </a:rPr>
-                          <m:t>SSR</m:t>
+                          <m:t>dSSR</m:t>
                         </m:r>
                       </m:num>
                       <m:den>
@@ -18177,19 +18158,7 @@
                             </a:solidFill>
                             <a:latin typeface="Cambria Math" panose="02040503050406030204" pitchFamily="18" charset="0"/>
                           </a:rPr>
-                          <m:t>d</m:t>
-                        </m:r>
-                        <m:r>
-                          <m:rPr>
-                            <m:sty m:val="p"/>
-                          </m:rPr>
-                          <a:rPr lang="es-ES" sz="4800" b="0" i="1" smtClean="0">
-                            <a:solidFill>
-                              <a:schemeClr val="tx1"/>
-                            </a:solidFill>
-                            <a:latin typeface="Cambria Math" panose="02040503050406030204" pitchFamily="18" charset="0"/>
-                          </a:rPr>
-                          <m:t>SSR</m:t>
+                          <m:t>dSSR</m:t>
                         </m:r>
                       </m:num>
                       <m:den>
@@ -18214,7 +18183,7 @@
                         </a:solidFill>
                         <a:latin typeface="Cambria Math" panose="02040503050406030204" pitchFamily="18" charset="0"/>
                       </a:rPr>
-                      <m:t>*</m:t>
+                      <m:t>∗</m:t>
                     </m:r>
                     <m:f>
                       <m:fPr>
@@ -18300,7 +18269,7 @@
             </p:txBody>
           </p:sp>
         </mc:Choice>
-        <mc:Fallback>
+        <mc:Fallback xmlns="">
           <p:sp>
             <p:nvSpPr>
               <p:cNvPr id="12" name="TextBox 11">
@@ -18624,8 +18593,8 @@
           </a:extLst>
         </p:spPr>
       </p:pic>
-      <mc:AlternateContent xmlns:mc="http://schemas.openxmlformats.org/markup-compatibility/2006">
-        <mc:Choice xmlns:a14="http://schemas.microsoft.com/office/drawing/2010/main" Requires="a14">
+      <mc:AlternateContent xmlns:mc="http://schemas.openxmlformats.org/markup-compatibility/2006" xmlns:a14="http://schemas.microsoft.com/office/drawing/2010/main">
+        <mc:Choice Requires="a14">
           <p:sp>
             <p:nvSpPr>
               <p:cNvPr id="12" name="TextBox 11">
@@ -18678,19 +18647,7 @@
                             </a:solidFill>
                             <a:latin typeface="Cambria Math" panose="02040503050406030204" pitchFamily="18" charset="0"/>
                           </a:rPr>
-                          <m:t>d</m:t>
-                        </m:r>
-                        <m:r>
-                          <m:rPr>
-                            <m:sty m:val="p"/>
-                          </m:rPr>
-                          <a:rPr lang="es-ES" sz="3200" b="0" i="1" smtClean="0">
-                            <a:solidFill>
-                              <a:schemeClr val="tx1"/>
-                            </a:solidFill>
-                            <a:latin typeface="Cambria Math" panose="02040503050406030204" pitchFamily="18" charset="0"/>
-                          </a:rPr>
-                          <m:t>SSR</m:t>
+                          <m:t>dSSR</m:t>
                         </m:r>
                       </m:num>
                       <m:den>
@@ -18763,19 +18720,7 @@
                             </a:solidFill>
                             <a:latin typeface="Cambria Math" panose="02040503050406030204" pitchFamily="18" charset="0"/>
                           </a:rPr>
-                          <m:t>d</m:t>
-                        </m:r>
-                        <m:r>
-                          <m:rPr>
-                            <m:sty m:val="p"/>
-                          </m:rPr>
-                          <a:rPr lang="es-ES" sz="3200" b="0" i="1" smtClean="0">
-                            <a:solidFill>
-                              <a:schemeClr val="tx1"/>
-                            </a:solidFill>
-                            <a:latin typeface="Cambria Math" panose="02040503050406030204" pitchFamily="18" charset="0"/>
-                          </a:rPr>
-                          <m:t>SSR</m:t>
+                          <m:t>dSSR</m:t>
                         </m:r>
                       </m:num>
                       <m:den>
@@ -18800,7 +18745,7 @@
                         </a:solidFill>
                         <a:latin typeface="Cambria Math" panose="02040503050406030204" pitchFamily="18" charset="0"/>
                       </a:rPr>
-                      <m:t>*</m:t>
+                      <m:t>∗</m:t>
                     </m:r>
                     <m:f>
                       <m:fPr>
@@ -18886,7 +18831,7 @@
             </p:txBody>
           </p:sp>
         </mc:Choice>
-        <mc:Fallback>
+        <mc:Fallback xmlns="">
           <p:sp>
             <p:nvSpPr>
               <p:cNvPr id="12" name="TextBox 11">
@@ -18931,8 +18876,8 @@
           </p:sp>
         </mc:Fallback>
       </mc:AlternateContent>
-      <mc:AlternateContent xmlns:mc="http://schemas.openxmlformats.org/markup-compatibility/2006">
-        <mc:Choice xmlns:a14="http://schemas.microsoft.com/office/drawing/2010/main" Requires="a14">
+      <mc:AlternateContent xmlns:mc="http://schemas.openxmlformats.org/markup-compatibility/2006" xmlns:a14="http://schemas.microsoft.com/office/drawing/2010/main">
+        <mc:Choice Requires="a14">
           <p:sp>
             <p:nvSpPr>
               <p:cNvPr id="2" name="TextBox 1">
@@ -18985,19 +18930,7 @@
                             </a:solidFill>
                             <a:latin typeface="Cambria Math" panose="02040503050406030204" pitchFamily="18" charset="0"/>
                           </a:rPr>
-                          <m:t>d</m:t>
-                        </m:r>
-                        <m:r>
-                          <m:rPr>
-                            <m:sty m:val="p"/>
-                          </m:rPr>
-                          <a:rPr lang="es-ES" sz="3200" b="0" i="1" smtClean="0">
-                            <a:solidFill>
-                              <a:schemeClr val="tx1"/>
-                            </a:solidFill>
-                            <a:latin typeface="Cambria Math" panose="02040503050406030204" pitchFamily="18" charset="0"/>
-                          </a:rPr>
-                          <m:t>SSR</m:t>
+                          <m:t>dSSR</m:t>
                         </m:r>
                       </m:num>
                       <m:den>
@@ -19283,7 +19216,7 @@
                                   <a:rPr lang="es-ES" sz="2400" b="0" i="1" smtClean="0">
                                     <a:latin typeface="Cambria Math" panose="02040503050406030204" pitchFamily="18" charset="0"/>
                                   </a:rPr>
-                                  <m:t>-2</m:t>
+                                  <m:t>−2</m:t>
                                 </m:r>
                                 <m:r>
                                   <a:rPr lang="es-ES" sz="2400" i="1">
@@ -19378,7 +19311,7 @@
             </p:txBody>
           </p:sp>
         </mc:Choice>
-        <mc:Fallback>
+        <mc:Fallback xmlns="">
           <p:sp>
             <p:nvSpPr>
               <p:cNvPr id="2" name="TextBox 1">
@@ -19623,8 +19556,8 @@
           </a:extLst>
         </p:spPr>
       </p:pic>
-      <mc:AlternateContent xmlns:mc="http://schemas.openxmlformats.org/markup-compatibility/2006">
-        <mc:Choice xmlns:a14="http://schemas.microsoft.com/office/drawing/2010/main" Requires="a14">
+      <mc:AlternateContent xmlns:mc="http://schemas.openxmlformats.org/markup-compatibility/2006" xmlns:a14="http://schemas.microsoft.com/office/drawing/2010/main">
+        <mc:Choice Requires="a14">
           <p:sp>
             <p:nvSpPr>
               <p:cNvPr id="12" name="TextBox 11">
@@ -19677,19 +19610,7 @@
                             </a:solidFill>
                             <a:latin typeface="Cambria Math" panose="02040503050406030204" pitchFamily="18" charset="0"/>
                           </a:rPr>
-                          <m:t>d</m:t>
-                        </m:r>
-                        <m:r>
-                          <m:rPr>
-                            <m:sty m:val="p"/>
-                          </m:rPr>
-                          <a:rPr lang="es-ES" sz="3200" b="0" i="1" smtClean="0">
-                            <a:solidFill>
-                              <a:schemeClr val="tx1"/>
-                            </a:solidFill>
-                            <a:latin typeface="Cambria Math" panose="02040503050406030204" pitchFamily="18" charset="0"/>
-                          </a:rPr>
-                          <m:t>SSR</m:t>
+                          <m:t>dSSR</m:t>
                         </m:r>
                       </m:num>
                       <m:den>
@@ -19762,19 +19683,7 @@
                             </a:solidFill>
                             <a:latin typeface="Cambria Math" panose="02040503050406030204" pitchFamily="18" charset="0"/>
                           </a:rPr>
-                          <m:t>d</m:t>
-                        </m:r>
-                        <m:r>
-                          <m:rPr>
-                            <m:sty m:val="p"/>
-                          </m:rPr>
-                          <a:rPr lang="es-ES" sz="3200" b="0" i="1" smtClean="0">
-                            <a:solidFill>
-                              <a:schemeClr val="tx1"/>
-                            </a:solidFill>
-                            <a:latin typeface="Cambria Math" panose="02040503050406030204" pitchFamily="18" charset="0"/>
-                          </a:rPr>
-                          <m:t>SSR</m:t>
+                          <m:t>dSSR</m:t>
                         </m:r>
                       </m:num>
                       <m:den>
@@ -19799,7 +19708,7 @@
                         </a:solidFill>
                         <a:latin typeface="Cambria Math" panose="02040503050406030204" pitchFamily="18" charset="0"/>
                       </a:rPr>
-                      <m:t>*</m:t>
+                      <m:t>∗</m:t>
                     </m:r>
                     <m:f>
                       <m:fPr>
@@ -19885,7 +19794,7 @@
             </p:txBody>
           </p:sp>
         </mc:Choice>
-        <mc:Fallback>
+        <mc:Fallback xmlns="">
           <p:sp>
             <p:nvSpPr>
               <p:cNvPr id="12" name="TextBox 11">
@@ -19930,8 +19839,8 @@
           </p:sp>
         </mc:Fallback>
       </mc:AlternateContent>
-      <mc:AlternateContent xmlns:mc="http://schemas.openxmlformats.org/markup-compatibility/2006">
-        <mc:Choice xmlns:a14="http://schemas.microsoft.com/office/drawing/2010/main" Requires="a14">
+      <mc:AlternateContent xmlns:mc="http://schemas.openxmlformats.org/markup-compatibility/2006" xmlns:a14="http://schemas.microsoft.com/office/drawing/2010/main">
+        <mc:Choice Requires="a14">
           <p:sp>
             <p:nvSpPr>
               <p:cNvPr id="2" name="TextBox 1">
@@ -20187,7 +20096,7 @@
             </p:txBody>
           </p:sp>
         </mc:Choice>
-        <mc:Fallback>
+        <mc:Fallback xmlns="">
           <p:sp>
             <p:nvSpPr>
               <p:cNvPr id="2" name="TextBox 1">
@@ -20432,8 +20341,8 @@
           </a:extLst>
         </p:spPr>
       </p:pic>
-      <mc:AlternateContent xmlns:mc="http://schemas.openxmlformats.org/markup-compatibility/2006">
-        <mc:Choice xmlns:a14="http://schemas.microsoft.com/office/drawing/2010/main" Requires="a14">
+      <mc:AlternateContent xmlns:mc="http://schemas.openxmlformats.org/markup-compatibility/2006" xmlns:a14="http://schemas.microsoft.com/office/drawing/2010/main">
+        <mc:Choice Requires="a14">
           <p:sp>
             <p:nvSpPr>
               <p:cNvPr id="12" name="TextBox 11">
@@ -20486,19 +20395,7 @@
                             </a:solidFill>
                             <a:latin typeface="Cambria Math" panose="02040503050406030204" pitchFamily="18" charset="0"/>
                           </a:rPr>
-                          <m:t>d</m:t>
-                        </m:r>
-                        <m:r>
-                          <m:rPr>
-                            <m:sty m:val="p"/>
-                          </m:rPr>
-                          <a:rPr lang="es-ES" sz="3200" b="0" i="1" smtClean="0">
-                            <a:solidFill>
-                              <a:schemeClr val="tx1"/>
-                            </a:solidFill>
-                            <a:latin typeface="Cambria Math" panose="02040503050406030204" pitchFamily="18" charset="0"/>
-                          </a:rPr>
-                          <m:t>SSR</m:t>
+                          <m:t>dSSR</m:t>
                         </m:r>
                       </m:num>
                       <m:den>
@@ -20571,19 +20468,7 @@
                             </a:solidFill>
                             <a:latin typeface="Cambria Math" panose="02040503050406030204" pitchFamily="18" charset="0"/>
                           </a:rPr>
-                          <m:t>d</m:t>
-                        </m:r>
-                        <m:r>
-                          <m:rPr>
-                            <m:sty m:val="p"/>
-                          </m:rPr>
-                          <a:rPr lang="es-ES" sz="3200" b="0" i="1" smtClean="0">
-                            <a:solidFill>
-                              <a:schemeClr val="tx1"/>
-                            </a:solidFill>
-                            <a:latin typeface="Cambria Math" panose="02040503050406030204" pitchFamily="18" charset="0"/>
-                          </a:rPr>
-                          <m:t>SSR</m:t>
+                          <m:t>dSSR</m:t>
                         </m:r>
                       </m:num>
                       <m:den>
@@ -20821,13 +20706,7 @@
                                   <a:rPr lang="es-ES" sz="3200" i="1">
                                     <a:latin typeface="Cambria Math" panose="02040503050406030204" pitchFamily="18" charset="0"/>
                                   </a:rPr>
-                                  <m:t>−2</m:t>
-                                </m:r>
-                                <m:r>
-                                  <a:rPr lang="es-ES" sz="3200" i="1">
-                                    <a:latin typeface="Cambria Math" panose="02040503050406030204" pitchFamily="18" charset="0"/>
-                                  </a:rPr>
-                                  <m:t>(</m:t>
+                                  <m:t>−2(</m:t>
                                 </m:r>
                                 <m:r>
                                   <m:rPr>
@@ -20960,7 +20839,7 @@
             </p:txBody>
           </p:sp>
         </mc:Choice>
-        <mc:Fallback>
+        <mc:Fallback xmlns="">
           <p:sp>
             <p:nvSpPr>
               <p:cNvPr id="12" name="TextBox 11">
@@ -21284,8 +21163,8 @@
           </a:fontRef>
         </p:style>
       </p:cxnSp>
-      <mc:AlternateContent xmlns:mc="http://schemas.openxmlformats.org/markup-compatibility/2006">
-        <mc:Choice xmlns:a14="http://schemas.microsoft.com/office/drawing/2010/main" Requires="a14">
+      <mc:AlternateContent xmlns:mc="http://schemas.openxmlformats.org/markup-compatibility/2006" xmlns:a14="http://schemas.microsoft.com/office/drawing/2010/main">
+        <mc:Choice Requires="a14">
           <p:sp>
             <p:nvSpPr>
               <p:cNvPr id="7" name="TextBox 6">
@@ -21342,21 +21221,7 @@
                             </a:solidFill>
                             <a:latin typeface="Cambria Math" panose="02040503050406030204" pitchFamily="18" charset="0"/>
                           </a:rPr>
-                          <m:t>d</m:t>
-                        </m:r>
-                        <m:r>
-                          <m:rPr>
-                            <m:sty m:val="p"/>
-                          </m:rPr>
-                          <a:rPr lang="es-ES" sz="3200" b="0" i="1" smtClean="0">
-                            <a:solidFill>
-                              <a:schemeClr val="accent5">
-                                <a:lumMod val="75000"/>
-                              </a:schemeClr>
-                            </a:solidFill>
-                            <a:latin typeface="Cambria Math" panose="02040503050406030204" pitchFamily="18" charset="0"/>
-                          </a:rPr>
-                          <m:t>SSR</m:t>
+                          <m:t>dSSR</m:t>
                         </m:r>
                       </m:num>
                       <m:den>
@@ -21428,7 +21293,7 @@
             </p:txBody>
           </p:sp>
         </mc:Choice>
-        <mc:Fallback>
+        <mc:Fallback xmlns="">
           <p:sp>
             <p:nvSpPr>
               <p:cNvPr id="7" name="TextBox 6">
@@ -21673,8 +21538,8 @@
           </a:extLst>
         </p:spPr>
       </p:pic>
-      <mc:AlternateContent xmlns:mc="http://schemas.openxmlformats.org/markup-compatibility/2006">
-        <mc:Choice xmlns:a14="http://schemas.microsoft.com/office/drawing/2010/main" Requires="a14">
+      <mc:AlternateContent xmlns:mc="http://schemas.openxmlformats.org/markup-compatibility/2006" xmlns:a14="http://schemas.microsoft.com/office/drawing/2010/main">
+        <mc:Choice Requires="a14">
           <p:sp>
             <p:nvSpPr>
               <p:cNvPr id="12" name="TextBox 11">
@@ -21727,19 +21592,7 @@
                             </a:solidFill>
                             <a:latin typeface="Cambria Math" panose="02040503050406030204" pitchFamily="18" charset="0"/>
                           </a:rPr>
-                          <m:t>d</m:t>
-                        </m:r>
-                        <m:r>
-                          <m:rPr>
-                            <m:sty m:val="p"/>
-                          </m:rPr>
-                          <a:rPr lang="es-ES" sz="3200" b="0" i="1" smtClean="0">
-                            <a:solidFill>
-                              <a:schemeClr val="tx1"/>
-                            </a:solidFill>
-                            <a:latin typeface="Cambria Math" panose="02040503050406030204" pitchFamily="18" charset="0"/>
-                          </a:rPr>
-                          <m:t>SSR</m:t>
+                          <m:t>dSSR</m:t>
                         </m:r>
                       </m:num>
                       <m:den>
@@ -21812,19 +21665,7 @@
                             </a:solidFill>
                             <a:latin typeface="Cambria Math" panose="02040503050406030204" pitchFamily="18" charset="0"/>
                           </a:rPr>
-                          <m:t>d</m:t>
-                        </m:r>
-                        <m:r>
-                          <m:rPr>
-                            <m:sty m:val="p"/>
-                          </m:rPr>
-                          <a:rPr lang="es-ES" sz="3200" b="0" i="1" smtClean="0">
-                            <a:solidFill>
-                              <a:schemeClr val="tx1"/>
-                            </a:solidFill>
-                            <a:latin typeface="Cambria Math" panose="02040503050406030204" pitchFamily="18" charset="0"/>
-                          </a:rPr>
-                          <m:t>SSR</m:t>
+                          <m:t>dSSR</m:t>
                         </m:r>
                       </m:num>
                       <m:den>
@@ -22062,13 +21903,7 @@
                                   <a:rPr lang="es-ES" sz="3200" i="1">
                                     <a:latin typeface="Cambria Math" panose="02040503050406030204" pitchFamily="18" charset="0"/>
                                   </a:rPr>
-                                  <m:t>−2</m:t>
-                                </m:r>
-                                <m:r>
-                                  <a:rPr lang="es-ES" sz="3200" i="1">
-                                    <a:latin typeface="Cambria Math" panose="02040503050406030204" pitchFamily="18" charset="0"/>
-                                  </a:rPr>
-                                  <m:t>(</m:t>
+                                  <m:t>−2(</m:t>
                                 </m:r>
                                 <m:r>
                                   <m:rPr>
@@ -22201,7 +22036,7 @@
             </p:txBody>
           </p:sp>
         </mc:Choice>
-        <mc:Fallback>
+        <mc:Fallback xmlns="">
           <p:sp>
             <p:nvSpPr>
               <p:cNvPr id="12" name="TextBox 11">
@@ -22446,8 +22281,8 @@
           </a:extLst>
         </p:spPr>
       </p:pic>
-      <mc:AlternateContent xmlns:mc="http://schemas.openxmlformats.org/markup-compatibility/2006">
-        <mc:Choice xmlns:a14="http://schemas.microsoft.com/office/drawing/2010/main" Requires="a14">
+      <mc:AlternateContent xmlns:mc="http://schemas.openxmlformats.org/markup-compatibility/2006" xmlns:a14="http://schemas.microsoft.com/office/drawing/2010/main">
+        <mc:Choice Requires="a14">
           <p:sp>
             <p:nvSpPr>
               <p:cNvPr id="12" name="TextBox 11">
@@ -22598,13 +22433,7 @@
                                   <a:rPr lang="es-ES" sz="3200" i="1">
                                     <a:latin typeface="Cambria Math" panose="02040503050406030204" pitchFamily="18" charset="0"/>
                                   </a:rPr>
-                                  <m:t>−2</m:t>
-                                </m:r>
-                                <m:r>
-                                  <a:rPr lang="es-ES" sz="3200" i="1">
-                                    <a:latin typeface="Cambria Math" panose="02040503050406030204" pitchFamily="18" charset="0"/>
-                                  </a:rPr>
-                                  <m:t>(</m:t>
+                                  <m:t>−2(</m:t>
                                 </m:r>
                                 <m:r>
                                   <m:rPr>
@@ -22737,7 +22566,7 @@
             </p:txBody>
           </p:sp>
         </mc:Choice>
-        <mc:Fallback>
+        <mc:Fallback xmlns="">
           <p:sp>
             <p:nvSpPr>
               <p:cNvPr id="12" name="TextBox 11">
@@ -22848,8 +22677,8 @@
           </a:p>
         </p:txBody>
       </p:sp>
-      <mc:AlternateContent xmlns:mc="http://schemas.openxmlformats.org/markup-compatibility/2006">
-        <mc:Choice xmlns:a14="http://schemas.microsoft.com/office/drawing/2010/main" Requires="a14">
+      <mc:AlternateContent xmlns:mc="http://schemas.openxmlformats.org/markup-compatibility/2006" xmlns:a14="http://schemas.microsoft.com/office/drawing/2010/main">
+        <mc:Choice Requires="a14">
           <p:sp>
             <p:nvSpPr>
               <p:cNvPr id="6" name="TextBox 5">
@@ -23123,7 +22952,7 @@
             </p:txBody>
           </p:sp>
         </mc:Choice>
-        <mc:Fallback>
+        <mc:Fallback xmlns="">
           <p:sp>
             <p:nvSpPr>
               <p:cNvPr id="6" name="TextBox 5">
@@ -23398,8 +23227,8 @@
           </a:extLst>
         </p:spPr>
       </p:pic>
-      <mc:AlternateContent xmlns:mc="http://schemas.openxmlformats.org/markup-compatibility/2006">
-        <mc:Choice xmlns:a14="http://schemas.microsoft.com/office/drawing/2010/main" Requires="a14">
+      <mc:AlternateContent xmlns:mc="http://schemas.openxmlformats.org/markup-compatibility/2006" xmlns:a14="http://schemas.microsoft.com/office/drawing/2010/main">
+        <mc:Choice Requires="a14">
           <p:sp>
             <p:nvSpPr>
               <p:cNvPr id="6" name="TextBox 5">
@@ -23651,7 +23480,7 @@
             </p:txBody>
           </p:sp>
         </mc:Choice>
-        <mc:Fallback>
+        <mc:Fallback xmlns="">
           <p:sp>
             <p:nvSpPr>
               <p:cNvPr id="6" name="TextBox 5">
@@ -23732,8 +23561,8 @@
           </a:prstGeom>
         </p:spPr>
       </p:pic>
-      <mc:AlternateContent xmlns:mc="http://schemas.openxmlformats.org/markup-compatibility/2006">
-        <mc:Choice xmlns:p14="http://schemas.microsoft.com/office/powerpoint/2010/main" xmlns:aink="http://schemas.microsoft.com/office/drawing/2016/ink" Requires="p14 aink">
+      <mc:AlternateContent xmlns:mc="http://schemas.openxmlformats.org/markup-compatibility/2006" xmlns:p14="http://schemas.microsoft.com/office/powerpoint/2010/main" xmlns:aink="http://schemas.microsoft.com/office/drawing/2016/ink">
+        <mc:Choice Requires="p14 aink">
           <p:contentPart p14:bwMode="auto" r:id="rId5">
             <p14:nvContentPartPr>
               <p14:cNvPr id="7" name="Ink 6">
@@ -23752,7 +23581,7 @@
             </p14:xfrm>
           </p:contentPart>
         </mc:Choice>
-        <mc:Fallback>
+        <mc:Fallback xmlns="">
           <p:pic>
             <p:nvPicPr>
               <p:cNvPr id="7" name="Ink 6">
@@ -23783,8 +23612,8 @@
           </p:pic>
         </mc:Fallback>
       </mc:AlternateContent>
-      <mc:AlternateContent xmlns:mc="http://schemas.openxmlformats.org/markup-compatibility/2006">
-        <mc:Choice xmlns:p14="http://schemas.microsoft.com/office/powerpoint/2010/main" Requires="p14">
+      <mc:AlternateContent xmlns:mc="http://schemas.openxmlformats.org/markup-compatibility/2006" xmlns:p14="http://schemas.microsoft.com/office/powerpoint/2010/main">
+        <mc:Choice Requires="p14">
           <p:contentPart p14:bwMode="auto" r:id="rId7">
             <p14:nvContentPartPr>
               <p14:cNvPr id="15" name="Ink 14">
@@ -23803,7 +23632,7 @@
             </p14:xfrm>
           </p:contentPart>
         </mc:Choice>
-        <mc:Fallback>
+        <mc:Fallback xmlns="">
           <p:pic>
             <p:nvPicPr>
               <p:cNvPr id="15" name="Ink 14">
@@ -23834,8 +23663,8 @@
           </p:pic>
         </mc:Fallback>
       </mc:AlternateContent>
-      <mc:AlternateContent xmlns:mc="http://schemas.openxmlformats.org/markup-compatibility/2006">
-        <mc:Choice xmlns:p14="http://schemas.microsoft.com/office/powerpoint/2010/main" Requires="p14">
+      <mc:AlternateContent xmlns:mc="http://schemas.openxmlformats.org/markup-compatibility/2006" xmlns:p14="http://schemas.microsoft.com/office/powerpoint/2010/main">
+        <mc:Choice Requires="p14">
           <p:contentPart p14:bwMode="auto" r:id="rId9">
             <p14:nvContentPartPr>
               <p14:cNvPr id="16" name="Ink 15">
@@ -23854,7 +23683,7 @@
             </p14:xfrm>
           </p:contentPart>
         </mc:Choice>
-        <mc:Fallback>
+        <mc:Fallback xmlns="">
           <p:pic>
             <p:nvPicPr>
               <p:cNvPr id="16" name="Ink 15">
@@ -23885,8 +23714,8 @@
           </p:pic>
         </mc:Fallback>
       </mc:AlternateContent>
-      <mc:AlternateContent xmlns:mc="http://schemas.openxmlformats.org/markup-compatibility/2006">
-        <mc:Choice xmlns:p14="http://schemas.microsoft.com/office/powerpoint/2010/main" Requires="p14">
+      <mc:AlternateContent xmlns:mc="http://schemas.openxmlformats.org/markup-compatibility/2006" xmlns:p14="http://schemas.microsoft.com/office/powerpoint/2010/main">
+        <mc:Choice Requires="p14">
           <p:contentPart p14:bwMode="auto" r:id="rId11">
             <p14:nvContentPartPr>
               <p14:cNvPr id="17" name="Ink 16">
@@ -23905,7 +23734,7 @@
             </p14:xfrm>
           </p:contentPart>
         </mc:Choice>
-        <mc:Fallback>
+        <mc:Fallback xmlns="">
           <p:pic>
             <p:nvPicPr>
               <p:cNvPr id="17" name="Ink 16">
@@ -24343,8 +24172,8 @@
           </a:extLst>
         </p:spPr>
       </p:pic>
-      <mc:AlternateContent xmlns:mc="http://schemas.openxmlformats.org/markup-compatibility/2006">
-        <mc:Choice xmlns:a14="http://schemas.microsoft.com/office/drawing/2010/main" Requires="a14">
+      <mc:AlternateContent xmlns:mc="http://schemas.openxmlformats.org/markup-compatibility/2006" xmlns:a14="http://schemas.microsoft.com/office/drawing/2010/main">
+        <mc:Choice Requires="a14">
           <p:sp>
             <p:nvSpPr>
               <p:cNvPr id="12" name="TextBox 11">
@@ -24495,13 +24324,7 @@
                                   <a:rPr lang="es-ES" sz="3200" i="1">
                                     <a:latin typeface="Cambria Math" panose="02040503050406030204" pitchFamily="18" charset="0"/>
                                   </a:rPr>
-                                  <m:t>−2</m:t>
-                                </m:r>
-                                <m:r>
-                                  <a:rPr lang="es-ES" sz="3200" i="1">
-                                    <a:latin typeface="Cambria Math" panose="02040503050406030204" pitchFamily="18" charset="0"/>
-                                  </a:rPr>
-                                  <m:t>(</m:t>
+                                  <m:t>−2(</m:t>
                                 </m:r>
                                 <m:r>
                                   <m:rPr>
@@ -24634,7 +24457,7 @@
             </p:txBody>
           </p:sp>
         </mc:Choice>
-        <mc:Fallback>
+        <mc:Fallback xmlns="">
           <p:sp>
             <p:nvSpPr>
               <p:cNvPr id="12" name="TextBox 11">
@@ -25032,8 +24855,8 @@
           </a:fontRef>
         </p:style>
       </p:cxnSp>
-      <mc:AlternateContent xmlns:mc="http://schemas.openxmlformats.org/markup-compatibility/2006">
-        <mc:Choice xmlns:a14="http://schemas.microsoft.com/office/drawing/2010/main" Requires="a14">
+      <mc:AlternateContent xmlns:mc="http://schemas.openxmlformats.org/markup-compatibility/2006" xmlns:a14="http://schemas.microsoft.com/office/drawing/2010/main">
+        <mc:Choice Requires="a14">
           <p:sp>
             <p:nvSpPr>
               <p:cNvPr id="7" name="TextBox 6">
@@ -25184,7 +25007,7 @@
             </p:txBody>
           </p:sp>
         </mc:Choice>
-        <mc:Fallback>
+        <mc:Fallback xmlns="">
           <p:sp>
             <p:nvSpPr>
               <p:cNvPr id="7" name="TextBox 6">
@@ -25612,7 +25435,13 @@
   <p:cSld>
     <p:spTree>
       <p:nvGrpSpPr>
-        <p:cNvPr id="1" name=""/>
+        <p:cNvPr id="1" name="">
+          <a:extLst>
+            <a:ext uri="{FF2B5EF4-FFF2-40B4-BE49-F238E27FC236}">
+              <a16:creationId xmlns:a16="http://schemas.microsoft.com/office/drawing/2014/main" id="{235CEE5D-FE4E-44D6-565F-71AEC2B0818E}"/>
+            </a:ext>
+          </a:extLst>
+        </p:cNvPr>
         <p:cNvGrpSpPr/>
         <p:nvPr/>
       </p:nvGrpSpPr>
@@ -25626,58 +25455,299 @@
       </p:grpSpPr>
       <p:sp>
         <p:nvSpPr>
-          <p:cNvPr id="2" name="Title 1">
-            <a:extLst>
-              <a:ext uri="{FF2B5EF4-FFF2-40B4-BE49-F238E27FC236}">
-                <a16:creationId xmlns:a16="http://schemas.microsoft.com/office/drawing/2014/main" id="{8E043C13-8C0E-FF33-1444-FA9616B4DF6D}"/>
-              </a:ext>
-            </a:extLst>
-          </p:cNvPr>
-          <p:cNvSpPr>
-            <a:spLocks noGrp="1"/>
+          <p:cNvPr id="4" name="Title 1">
+            <a:extLst>
+              <a:ext uri="{FF2B5EF4-FFF2-40B4-BE49-F238E27FC236}">
+                <a16:creationId xmlns:a16="http://schemas.microsoft.com/office/drawing/2014/main" id="{3A7EB7B3-58DA-9616-3E12-5D51CD5C481E}"/>
+              </a:ext>
+            </a:extLst>
+          </p:cNvPr>
+          <p:cNvSpPr txBox="1">
+            <a:spLocks/>
           </p:cNvSpPr>
-          <p:nvPr>
-            <p:ph type="title"/>
-          </p:nvPr>
+          <p:nvPr/>
         </p:nvSpPr>
-        <p:spPr/>
+        <p:spPr>
+          <a:xfrm>
+            <a:off x="990600" y="517525"/>
+            <a:ext cx="11079480" cy="1325563"/>
+          </a:xfrm>
+          <a:prstGeom prst="rect">
+            <a:avLst/>
+          </a:prstGeom>
+        </p:spPr>
         <p:txBody>
-          <a:bodyPr/>
-          <a:lstStyle/>
-          <a:p>
-            <a:endParaRPr lang="en-US"/>
+          <a:bodyPr vert="horz" lIns="91440" tIns="45720" rIns="91440" bIns="45720" rtlCol="0" anchor="ctr">
+            <a:normAutofit/>
+          </a:bodyPr>
+          <a:lstStyle>
+            <a:lvl1pPr algn="l" defTabSz="914400" rtl="0" eaLnBrk="1" latinLnBrk="0" hangingPunct="1">
+              <a:lnSpc>
+                <a:spcPct val="90000"/>
+              </a:lnSpc>
+              <a:spcBef>
+                <a:spcPct val="0"/>
+              </a:spcBef>
+              <a:buNone/>
+              <a:defRPr sz="4400" kern="1200">
+                <a:solidFill>
+                  <a:schemeClr val="tx1"/>
+                </a:solidFill>
+                <a:latin typeface="+mj-lt"/>
+                <a:ea typeface="+mj-ea"/>
+                <a:cs typeface="+mj-cs"/>
+              </a:defRPr>
+            </a:lvl1pPr>
+          </a:lstStyle>
+          <a:p>
+            <a:r>
+              <a:rPr lang="es-ES" dirty="0">
+                <a:solidFill>
+                  <a:srgbClr val="EB178E"/>
+                </a:solidFill>
+                <a:latin typeface="Arial" panose="020B0604020202020204" pitchFamily="34" charset="0"/>
+                <a:cs typeface="Arial" panose="020B0604020202020204" pitchFamily="34" charset="0"/>
+              </a:rPr>
+              <a:t>Optimización </a:t>
+            </a:r>
+            <a:r>
+              <a:rPr lang="es-ES" dirty="0" err="1">
+                <a:solidFill>
+                  <a:srgbClr val="EB178E"/>
+                </a:solidFill>
+                <a:latin typeface="Arial" panose="020B0604020202020204" pitchFamily="34" charset="0"/>
+                <a:cs typeface="Arial" panose="020B0604020202020204" pitchFamily="34" charset="0"/>
+              </a:rPr>
+              <a:t>weights</a:t>
+            </a:r>
+            <a:r>
+              <a:rPr lang="es-ES" dirty="0">
+                <a:solidFill>
+                  <a:srgbClr val="EB178E"/>
+                </a:solidFill>
+                <a:latin typeface="Arial" panose="020B0604020202020204" pitchFamily="34" charset="0"/>
+                <a:cs typeface="Arial" panose="020B0604020202020204" pitchFamily="34" charset="0"/>
+              </a:rPr>
+              <a:t> &amp; </a:t>
+            </a:r>
+            <a:r>
+              <a:rPr lang="es-ES" dirty="0" err="1">
+                <a:solidFill>
+                  <a:srgbClr val="EB178E"/>
+                </a:solidFill>
+                <a:latin typeface="Arial" panose="020B0604020202020204" pitchFamily="34" charset="0"/>
+                <a:cs typeface="Arial" panose="020B0604020202020204" pitchFamily="34" charset="0"/>
+              </a:rPr>
+              <a:t>bias</a:t>
+            </a:r>
+            <a:r>
+              <a:rPr lang="es-ES" dirty="0">
+                <a:solidFill>
+                  <a:srgbClr val="EB178E"/>
+                </a:solidFill>
+                <a:latin typeface="Arial" panose="020B0604020202020204" pitchFamily="34" charset="0"/>
+                <a:cs typeface="Arial" panose="020B0604020202020204" pitchFamily="34" charset="0"/>
+              </a:rPr>
+              <a:t> con </a:t>
+            </a:r>
+            <a:r>
+              <a:rPr lang="es-ES" dirty="0" err="1">
+                <a:solidFill>
+                  <a:srgbClr val="EB178E"/>
+                </a:solidFill>
+                <a:latin typeface="Arial" panose="020B0604020202020204" pitchFamily="34" charset="0"/>
+                <a:cs typeface="Arial" panose="020B0604020202020204" pitchFamily="34" charset="0"/>
+              </a:rPr>
+              <a:t>backpropagation</a:t>
+            </a:r>
+            <a:endParaRPr lang="en-US" dirty="0">
+              <a:solidFill>
+                <a:srgbClr val="EB178E"/>
+              </a:solidFill>
+              <a:latin typeface="Arial" panose="020B0604020202020204" pitchFamily="34" charset="0"/>
+              <a:cs typeface="Arial" panose="020B0604020202020204" pitchFamily="34" charset="0"/>
+            </a:endParaRPr>
           </a:p>
         </p:txBody>
       </p:sp>
+      <p:pic>
+        <p:nvPicPr>
+          <p:cNvPr id="5" name="Picture 2">
+            <a:extLst>
+              <a:ext uri="{FF2B5EF4-FFF2-40B4-BE49-F238E27FC236}">
+                <a16:creationId xmlns:a16="http://schemas.microsoft.com/office/drawing/2014/main" id="{C0AB3A4D-D0F5-E2AF-E040-73B004372456}"/>
+              </a:ext>
+            </a:extLst>
+          </p:cNvPr>
+          <p:cNvPicPr>
+            <a:picLocks noChangeAspect="1" noChangeArrowheads="1"/>
+          </p:cNvPicPr>
+          <p:nvPr/>
+        </p:nvPicPr>
+        <p:blipFill>
+          <a:blip r:embed="rId2">
+            <a:extLst>
+              <a:ext uri="{28A0092B-C50C-407E-A947-70E740481C1C}">
+                <a14:useLocalDpi xmlns:a14="http://schemas.microsoft.com/office/drawing/2010/main" val="0"/>
+              </a:ext>
+            </a:extLst>
+          </a:blip>
+          <a:srcRect/>
+          <a:stretch>
+            <a:fillRect/>
+          </a:stretch>
+        </p:blipFill>
+        <p:spPr bwMode="auto">
+          <a:xfrm>
+            <a:off x="10881954" y="5786323"/>
+            <a:ext cx="943692" cy="852856"/>
+          </a:xfrm>
+          <a:prstGeom prst="rect">
+            <a:avLst/>
+          </a:prstGeom>
+          <a:noFill/>
+          <a:extLst>
+            <a:ext uri="{909E8E84-426E-40DD-AFC4-6F175D3DCCD1}">
+              <a14:hiddenFill xmlns:a14="http://schemas.microsoft.com/office/drawing/2010/main">
+                <a:solidFill>
+                  <a:srgbClr val="FFFFFF"/>
+                </a:solidFill>
+              </a14:hiddenFill>
+            </a:ext>
+          </a:extLst>
+        </p:spPr>
+      </p:pic>
+      <p:pic>
+        <p:nvPicPr>
+          <p:cNvPr id="3" name="Picture 2" descr="A graph with a line and a dotted line&#10;&#10;AI-generated content may be incorrect.">
+            <a:extLst>
+              <a:ext uri="{FF2B5EF4-FFF2-40B4-BE49-F238E27FC236}">
+                <a16:creationId xmlns:a16="http://schemas.microsoft.com/office/drawing/2014/main" id="{B9BE61C8-10EA-B75B-AD31-177198FDB314}"/>
+              </a:ext>
+            </a:extLst>
+          </p:cNvPr>
+          <p:cNvPicPr>
+            <a:picLocks noChangeAspect="1"/>
+          </p:cNvPicPr>
+          <p:nvPr/>
+        </p:nvPicPr>
+        <p:blipFill>
+          <a:blip r:embed="rId3">
+            <a:extLst>
+              <a:ext uri="{28A0092B-C50C-407E-A947-70E740481C1C}">
+                <a14:useLocalDpi xmlns:a14="http://schemas.microsoft.com/office/drawing/2010/main" val="0"/>
+              </a:ext>
+            </a:extLst>
+          </a:blip>
+          <a:stretch>
+            <a:fillRect/>
+          </a:stretch>
+        </p:blipFill>
+        <p:spPr>
+          <a:xfrm>
+            <a:off x="1381649" y="2303664"/>
+            <a:ext cx="5355076" cy="4335515"/>
+          </a:xfrm>
+          <a:prstGeom prst="rect">
+            <a:avLst/>
+          </a:prstGeom>
+        </p:spPr>
+      </p:pic>
+      <p:cxnSp>
+        <p:nvCxnSpPr>
+          <p:cNvPr id="6" name="Straight Connector 5">
+            <a:extLst>
+              <a:ext uri="{FF2B5EF4-FFF2-40B4-BE49-F238E27FC236}">
+                <a16:creationId xmlns:a16="http://schemas.microsoft.com/office/drawing/2014/main" id="{49D6E391-AE50-568E-3027-7F45D10B52B3}"/>
+              </a:ext>
+            </a:extLst>
+          </p:cNvPr>
+          <p:cNvCxnSpPr>
+            <a:cxnSpLocks/>
+          </p:cNvCxnSpPr>
+          <p:nvPr/>
+        </p:nvCxnSpPr>
+        <p:spPr>
+          <a:xfrm flipH="1">
+            <a:off x="5345247" y="3220278"/>
+            <a:ext cx="936283" cy="1715732"/>
+          </a:xfrm>
+          <a:prstGeom prst="line">
+            <a:avLst/>
+          </a:prstGeom>
+          <a:ln w="57150">
+            <a:solidFill>
+              <a:schemeClr val="accent5">
+                <a:lumMod val="75000"/>
+              </a:schemeClr>
+            </a:solidFill>
+          </a:ln>
+        </p:spPr>
+        <p:style>
+          <a:lnRef idx="2">
+            <a:schemeClr val="accent1"/>
+          </a:lnRef>
+          <a:fillRef idx="0">
+            <a:schemeClr val="accent1"/>
+          </a:fillRef>
+          <a:effectRef idx="1">
+            <a:schemeClr val="accent1"/>
+          </a:effectRef>
+          <a:fontRef idx="minor">
+            <a:schemeClr val="tx1"/>
+          </a:fontRef>
+        </p:style>
+      </p:cxnSp>
       <p:sp>
         <p:nvSpPr>
-          <p:cNvPr id="3" name="Content Placeholder 2">
-            <a:extLst>
-              <a:ext uri="{FF2B5EF4-FFF2-40B4-BE49-F238E27FC236}">
-                <a16:creationId xmlns:a16="http://schemas.microsoft.com/office/drawing/2014/main" id="{C117A703-B4F0-C9E9-D197-E0E519810C2F}"/>
-              </a:ext>
-            </a:extLst>
-          </p:cNvPr>
-          <p:cNvSpPr>
-            <a:spLocks noGrp="1"/>
-          </p:cNvSpPr>
-          <p:nvPr>
-            <p:ph idx="1"/>
-          </p:nvPr>
+          <p:cNvPr id="8" name="TextBox 7">
+            <a:extLst>
+              <a:ext uri="{FF2B5EF4-FFF2-40B4-BE49-F238E27FC236}">
+                <a16:creationId xmlns:a16="http://schemas.microsoft.com/office/drawing/2014/main" id="{56BAC955-DE86-339E-007F-44033F3F4C8E}"/>
+              </a:ext>
+            </a:extLst>
+          </p:cNvPr>
+          <p:cNvSpPr txBox="1"/>
+          <p:nvPr/>
         </p:nvSpPr>
-        <p:spPr/>
+        <p:spPr>
+          <a:xfrm>
+            <a:off x="7253557" y="2629044"/>
+            <a:ext cx="3964513" cy="2554545"/>
+          </a:xfrm>
+          <a:prstGeom prst="rect">
+            <a:avLst/>
+          </a:prstGeom>
+          <a:noFill/>
+        </p:spPr>
         <p:txBody>
-          <a:bodyPr/>
+          <a:bodyPr wrap="square">
+            <a:spAutoFit/>
+          </a:bodyPr>
           <a:lstStyle/>
           <a:p>
-            <a:endParaRPr lang="en-US"/>
+            <a:r>
+              <a:rPr lang="es-ES" sz="4000" dirty="0"/>
+              <a:t>Moverse hacia la izquierda</a:t>
+            </a:r>
+            <a:endParaRPr lang="es-ES" sz="4000" b="1" dirty="0"/>
+          </a:p>
+          <a:p>
+            <a:endParaRPr lang="es-ES" sz="4000" b="1" dirty="0"/>
+          </a:p>
+          <a:p>
+            <a:r>
+              <a:rPr lang="es-ES" sz="4000" b="1" dirty="0"/>
+              <a:t>¿Cuánto?</a:t>
+            </a:r>
+            <a:endParaRPr lang="es-ES" sz="4000" dirty="0"/>
           </a:p>
         </p:txBody>
       </p:sp>
     </p:spTree>
     <p:extLst>
       <p:ext uri="{BB962C8B-B14F-4D97-AF65-F5344CB8AC3E}">
-        <p14:creationId xmlns:p14="http://schemas.microsoft.com/office/powerpoint/2010/main" val="2175711327"/>
+        <p14:creationId xmlns:p14="http://schemas.microsoft.com/office/powerpoint/2010/main" val="66719289"/>
       </p:ext>
     </p:extLst>
   </p:cSld>
@@ -25692,7 +25762,13 @@
   <p:cSld>
     <p:spTree>
       <p:nvGrpSpPr>
-        <p:cNvPr id="1" name=""/>
+        <p:cNvPr id="1" name="">
+          <a:extLst>
+            <a:ext uri="{FF2B5EF4-FFF2-40B4-BE49-F238E27FC236}">
+              <a16:creationId xmlns:a16="http://schemas.microsoft.com/office/drawing/2014/main" id="{F9B18EDA-8312-EEA5-0EB7-18A61A691A4D}"/>
+            </a:ext>
+          </a:extLst>
+        </p:cNvPr>
         <p:cNvGrpSpPr/>
         <p:nvPr/>
       </p:nvGrpSpPr>
@@ -25706,62 +25782,299 @@
       </p:grpSpPr>
       <p:sp>
         <p:nvSpPr>
-          <p:cNvPr id="2" name="Title 1">
-            <a:extLst>
-              <a:ext uri="{FF2B5EF4-FFF2-40B4-BE49-F238E27FC236}">
-                <a16:creationId xmlns:a16="http://schemas.microsoft.com/office/drawing/2014/main" id="{442EE8FE-62FD-B8ED-2B02-170082EDCC6E}"/>
-              </a:ext>
-            </a:extLst>
-          </p:cNvPr>
-          <p:cNvSpPr>
-            <a:spLocks noGrp="1"/>
+          <p:cNvPr id="4" name="Title 1">
+            <a:extLst>
+              <a:ext uri="{FF2B5EF4-FFF2-40B4-BE49-F238E27FC236}">
+                <a16:creationId xmlns:a16="http://schemas.microsoft.com/office/drawing/2014/main" id="{2D967E57-5FCB-A416-205C-CB7561B6E1CF}"/>
+              </a:ext>
+            </a:extLst>
+          </p:cNvPr>
+          <p:cNvSpPr txBox="1">
+            <a:spLocks/>
           </p:cNvSpPr>
-          <p:nvPr>
-            <p:ph type="title"/>
-          </p:nvPr>
+          <p:nvPr/>
         </p:nvSpPr>
-        <p:spPr/>
+        <p:spPr>
+          <a:xfrm>
+            <a:off x="990600" y="517525"/>
+            <a:ext cx="11079480" cy="1325563"/>
+          </a:xfrm>
+          <a:prstGeom prst="rect">
+            <a:avLst/>
+          </a:prstGeom>
+        </p:spPr>
         <p:txBody>
-          <a:bodyPr/>
-          <a:lstStyle/>
-          <a:p>
-            <a:endParaRPr lang="en-US"/>
+          <a:bodyPr vert="horz" lIns="91440" tIns="45720" rIns="91440" bIns="45720" rtlCol="0" anchor="ctr">
+            <a:normAutofit/>
+          </a:bodyPr>
+          <a:lstStyle>
+            <a:lvl1pPr algn="l" defTabSz="914400" rtl="0" eaLnBrk="1" latinLnBrk="0" hangingPunct="1">
+              <a:lnSpc>
+                <a:spcPct val="90000"/>
+              </a:lnSpc>
+              <a:spcBef>
+                <a:spcPct val="0"/>
+              </a:spcBef>
+              <a:buNone/>
+              <a:defRPr sz="4400" kern="1200">
+                <a:solidFill>
+                  <a:schemeClr val="tx1"/>
+                </a:solidFill>
+                <a:latin typeface="+mj-lt"/>
+                <a:ea typeface="+mj-ea"/>
+                <a:cs typeface="+mj-cs"/>
+              </a:defRPr>
+            </a:lvl1pPr>
+          </a:lstStyle>
+          <a:p>
+            <a:r>
+              <a:rPr lang="es-ES" dirty="0">
+                <a:solidFill>
+                  <a:srgbClr val="EB178E"/>
+                </a:solidFill>
+                <a:latin typeface="Arial" panose="020B0604020202020204" pitchFamily="34" charset="0"/>
+                <a:cs typeface="Arial" panose="020B0604020202020204" pitchFamily="34" charset="0"/>
+              </a:rPr>
+              <a:t>Optimización </a:t>
+            </a:r>
+            <a:r>
+              <a:rPr lang="es-ES" dirty="0" err="1">
+                <a:solidFill>
+                  <a:srgbClr val="EB178E"/>
+                </a:solidFill>
+                <a:latin typeface="Arial" panose="020B0604020202020204" pitchFamily="34" charset="0"/>
+                <a:cs typeface="Arial" panose="020B0604020202020204" pitchFamily="34" charset="0"/>
+              </a:rPr>
+              <a:t>weights</a:t>
+            </a:r>
+            <a:r>
+              <a:rPr lang="es-ES" dirty="0">
+                <a:solidFill>
+                  <a:srgbClr val="EB178E"/>
+                </a:solidFill>
+                <a:latin typeface="Arial" panose="020B0604020202020204" pitchFamily="34" charset="0"/>
+                <a:cs typeface="Arial" panose="020B0604020202020204" pitchFamily="34" charset="0"/>
+              </a:rPr>
+              <a:t> &amp; </a:t>
+            </a:r>
+            <a:r>
+              <a:rPr lang="es-ES" dirty="0" err="1">
+                <a:solidFill>
+                  <a:srgbClr val="EB178E"/>
+                </a:solidFill>
+                <a:latin typeface="Arial" panose="020B0604020202020204" pitchFamily="34" charset="0"/>
+                <a:cs typeface="Arial" panose="020B0604020202020204" pitchFamily="34" charset="0"/>
+              </a:rPr>
+              <a:t>bias</a:t>
+            </a:r>
+            <a:r>
+              <a:rPr lang="es-ES" dirty="0">
+                <a:solidFill>
+                  <a:srgbClr val="EB178E"/>
+                </a:solidFill>
+                <a:latin typeface="Arial" panose="020B0604020202020204" pitchFamily="34" charset="0"/>
+                <a:cs typeface="Arial" panose="020B0604020202020204" pitchFamily="34" charset="0"/>
+              </a:rPr>
+              <a:t> con </a:t>
+            </a:r>
+            <a:r>
+              <a:rPr lang="es-ES" dirty="0" err="1">
+                <a:solidFill>
+                  <a:srgbClr val="EB178E"/>
+                </a:solidFill>
+                <a:latin typeface="Arial" panose="020B0604020202020204" pitchFamily="34" charset="0"/>
+                <a:cs typeface="Arial" panose="020B0604020202020204" pitchFamily="34" charset="0"/>
+              </a:rPr>
+              <a:t>backpropagation</a:t>
+            </a:r>
+            <a:endParaRPr lang="en-US" dirty="0">
+              <a:solidFill>
+                <a:srgbClr val="EB178E"/>
+              </a:solidFill>
+              <a:latin typeface="Arial" panose="020B0604020202020204" pitchFamily="34" charset="0"/>
+              <a:cs typeface="Arial" panose="020B0604020202020204" pitchFamily="34" charset="0"/>
+            </a:endParaRPr>
           </a:p>
         </p:txBody>
       </p:sp>
+      <p:pic>
+        <p:nvPicPr>
+          <p:cNvPr id="5" name="Picture 2">
+            <a:extLst>
+              <a:ext uri="{FF2B5EF4-FFF2-40B4-BE49-F238E27FC236}">
+                <a16:creationId xmlns:a16="http://schemas.microsoft.com/office/drawing/2014/main" id="{6F7CBB41-78EA-D84B-EA96-FC167B131DCA}"/>
+              </a:ext>
+            </a:extLst>
+          </p:cNvPr>
+          <p:cNvPicPr>
+            <a:picLocks noChangeAspect="1" noChangeArrowheads="1"/>
+          </p:cNvPicPr>
+          <p:nvPr/>
+        </p:nvPicPr>
+        <p:blipFill>
+          <a:blip r:embed="rId2">
+            <a:extLst>
+              <a:ext uri="{28A0092B-C50C-407E-A947-70E740481C1C}">
+                <a14:useLocalDpi xmlns:a14="http://schemas.microsoft.com/office/drawing/2010/main" val="0"/>
+              </a:ext>
+            </a:extLst>
+          </a:blip>
+          <a:srcRect/>
+          <a:stretch>
+            <a:fillRect/>
+          </a:stretch>
+        </p:blipFill>
+        <p:spPr bwMode="auto">
+          <a:xfrm>
+            <a:off x="10881954" y="5786323"/>
+            <a:ext cx="943692" cy="852856"/>
+          </a:xfrm>
+          <a:prstGeom prst="rect">
+            <a:avLst/>
+          </a:prstGeom>
+          <a:noFill/>
+          <a:extLst>
+            <a:ext uri="{909E8E84-426E-40DD-AFC4-6F175D3DCCD1}">
+              <a14:hiddenFill xmlns:a14="http://schemas.microsoft.com/office/drawing/2010/main">
+                <a:solidFill>
+                  <a:srgbClr val="FFFFFF"/>
+                </a:solidFill>
+              </a14:hiddenFill>
+            </a:ext>
+          </a:extLst>
+        </p:spPr>
+      </p:pic>
+      <p:pic>
+        <p:nvPicPr>
+          <p:cNvPr id="3" name="Picture 2" descr="A graph with a line and a dotted line&#10;&#10;AI-generated content may be incorrect.">
+            <a:extLst>
+              <a:ext uri="{FF2B5EF4-FFF2-40B4-BE49-F238E27FC236}">
+                <a16:creationId xmlns:a16="http://schemas.microsoft.com/office/drawing/2014/main" id="{ACBF15AD-5A42-F2EC-1AC9-21026187DD3C}"/>
+              </a:ext>
+            </a:extLst>
+          </p:cNvPr>
+          <p:cNvPicPr>
+            <a:picLocks noChangeAspect="1"/>
+          </p:cNvPicPr>
+          <p:nvPr/>
+        </p:nvPicPr>
+        <p:blipFill>
+          <a:blip r:embed="rId3">
+            <a:extLst>
+              <a:ext uri="{28A0092B-C50C-407E-A947-70E740481C1C}">
+                <a14:useLocalDpi xmlns:a14="http://schemas.microsoft.com/office/drawing/2010/main" val="0"/>
+              </a:ext>
+            </a:extLst>
+          </a:blip>
+          <a:stretch>
+            <a:fillRect/>
+          </a:stretch>
+        </p:blipFill>
+        <p:spPr>
+          <a:xfrm>
+            <a:off x="1381649" y="2303664"/>
+            <a:ext cx="5355076" cy="4335515"/>
+          </a:xfrm>
+          <a:prstGeom prst="rect">
+            <a:avLst/>
+          </a:prstGeom>
+        </p:spPr>
+      </p:pic>
+      <p:cxnSp>
+        <p:nvCxnSpPr>
+          <p:cNvPr id="6" name="Straight Connector 5">
+            <a:extLst>
+              <a:ext uri="{FF2B5EF4-FFF2-40B4-BE49-F238E27FC236}">
+                <a16:creationId xmlns:a16="http://schemas.microsoft.com/office/drawing/2014/main" id="{BC611FB9-0D85-B200-C6EE-BB3C53E091CF}"/>
+              </a:ext>
+            </a:extLst>
+          </p:cNvPr>
+          <p:cNvCxnSpPr>
+            <a:cxnSpLocks/>
+          </p:cNvCxnSpPr>
+          <p:nvPr/>
+        </p:nvCxnSpPr>
+        <p:spPr>
+          <a:xfrm>
+            <a:off x="1685677" y="4670914"/>
+            <a:ext cx="882594" cy="1038123"/>
+          </a:xfrm>
+          <a:prstGeom prst="line">
+            <a:avLst/>
+          </a:prstGeom>
+          <a:ln w="57150">
+            <a:solidFill>
+              <a:schemeClr val="accent5">
+                <a:lumMod val="75000"/>
+              </a:schemeClr>
+            </a:solidFill>
+          </a:ln>
+        </p:spPr>
+        <p:style>
+          <a:lnRef idx="2">
+            <a:schemeClr val="accent1"/>
+          </a:lnRef>
+          <a:fillRef idx="0">
+            <a:schemeClr val="accent1"/>
+          </a:fillRef>
+          <a:effectRef idx="1">
+            <a:schemeClr val="accent1"/>
+          </a:effectRef>
+          <a:fontRef idx="minor">
+            <a:schemeClr val="tx1"/>
+          </a:fontRef>
+        </p:style>
+      </p:cxnSp>
       <p:sp>
         <p:nvSpPr>
-          <p:cNvPr id="3" name="Content Placeholder 2">
-            <a:extLst>
-              <a:ext uri="{FF2B5EF4-FFF2-40B4-BE49-F238E27FC236}">
-                <a16:creationId xmlns:a16="http://schemas.microsoft.com/office/drawing/2014/main" id="{76324C6C-6953-62F3-2ECD-36FB130C0E26}"/>
-              </a:ext>
-            </a:extLst>
-          </p:cNvPr>
-          <p:cNvSpPr>
-            <a:spLocks noGrp="1"/>
-          </p:cNvSpPr>
-          <p:nvPr>
-            <p:ph idx="1"/>
-          </p:nvPr>
+          <p:cNvPr id="8" name="TextBox 7">
+            <a:extLst>
+              <a:ext uri="{FF2B5EF4-FFF2-40B4-BE49-F238E27FC236}">
+                <a16:creationId xmlns:a16="http://schemas.microsoft.com/office/drawing/2014/main" id="{C6F010A0-882F-304B-8B78-7A4F8AF1ECF0}"/>
+              </a:ext>
+            </a:extLst>
+          </p:cNvPr>
+          <p:cNvSpPr txBox="1"/>
+          <p:nvPr/>
         </p:nvSpPr>
-        <p:spPr/>
+        <p:spPr>
+          <a:xfrm>
+            <a:off x="7253557" y="2629044"/>
+            <a:ext cx="3964513" cy="2554545"/>
+          </a:xfrm>
+          <a:prstGeom prst="rect">
+            <a:avLst/>
+          </a:prstGeom>
+          <a:noFill/>
+        </p:spPr>
         <p:txBody>
-          <a:bodyPr/>
+          <a:bodyPr wrap="square">
+            <a:spAutoFit/>
+          </a:bodyPr>
           <a:lstStyle/>
           <a:p>
             <a:r>
-              <a:rPr lang="es-ES" dirty="0"/>
-              <a:t>Se podría meter ejemplo de calcular SSR para un input concreto</a:t>
-            </a:r>
-            <a:endParaRPr lang="en-US" dirty="0"/>
+              <a:rPr lang="es-ES" sz="4000" dirty="0"/>
+              <a:t>Moverse hacia la izquierda</a:t>
+            </a:r>
+            <a:endParaRPr lang="es-ES" sz="4000" b="1" dirty="0"/>
+          </a:p>
+          <a:p>
+            <a:endParaRPr lang="es-ES" sz="4000" b="1" dirty="0"/>
+          </a:p>
+          <a:p>
+            <a:r>
+              <a:rPr lang="es-ES" sz="4000" b="1" dirty="0"/>
+              <a:t>¿Cuánto?</a:t>
+            </a:r>
+            <a:endParaRPr lang="es-ES" sz="4000" dirty="0"/>
           </a:p>
         </p:txBody>
       </p:sp>
     </p:spTree>
     <p:extLst>
       <p:ext uri="{BB962C8B-B14F-4D97-AF65-F5344CB8AC3E}">
-        <p14:creationId xmlns:p14="http://schemas.microsoft.com/office/powerpoint/2010/main" val="3891003849"/>
+        <p14:creationId xmlns:p14="http://schemas.microsoft.com/office/powerpoint/2010/main" val="345733896"/>
       </p:ext>
     </p:extLst>
   </p:cSld>
@@ -25779,7 +26092,7 @@
         <p:cNvPr id="1" name="">
           <a:extLst>
             <a:ext uri="{FF2B5EF4-FFF2-40B4-BE49-F238E27FC236}">
-              <a16:creationId xmlns:a16="http://schemas.microsoft.com/office/drawing/2014/main" id="{98CF55ED-15E7-0673-3127-C4D16A2C90B5}"/>
+              <a16:creationId xmlns:a16="http://schemas.microsoft.com/office/drawing/2014/main" id="{5C127556-5EE6-811A-6E97-D83E2A38B196}"/>
             </a:ext>
           </a:extLst>
         </p:cNvPr>
@@ -25799,7 +26112,7 @@
           <p:cNvPr id="4" name="Title 1">
             <a:extLst>
               <a:ext uri="{FF2B5EF4-FFF2-40B4-BE49-F238E27FC236}">
-                <a16:creationId xmlns:a16="http://schemas.microsoft.com/office/drawing/2014/main" id="{A2FC4572-C349-192C-6E46-249DE1EE7D5F}"/>
+                <a16:creationId xmlns:a16="http://schemas.microsoft.com/office/drawing/2014/main" id="{2E6BEEA2-257B-9F25-BAAD-39BE6B01F8AB}"/>
               </a:ext>
             </a:extLst>
           </p:cNvPr>
@@ -25916,7 +26229,7 @@
           <p:cNvPr id="5" name="Picture 2">
             <a:extLst>
               <a:ext uri="{FF2B5EF4-FFF2-40B4-BE49-F238E27FC236}">
-                <a16:creationId xmlns:a16="http://schemas.microsoft.com/office/drawing/2014/main" id="{7A50CC6B-1B00-9277-9495-2F8E349C7C3F}"/>
+                <a16:creationId xmlns:a16="http://schemas.microsoft.com/office/drawing/2014/main" id="{34718875-142D-1062-E43D-EF24253D64D6}"/>
               </a:ext>
             </a:extLst>
           </p:cNvPr>
@@ -25960,10 +26273,10 @@
       </p:pic>
       <p:sp>
         <p:nvSpPr>
-          <p:cNvPr id="7" name="TextBox 6">
-            <a:extLst>
-              <a:ext uri="{FF2B5EF4-FFF2-40B4-BE49-F238E27FC236}">
-                <a16:creationId xmlns:a16="http://schemas.microsoft.com/office/drawing/2014/main" id="{3256EC35-046F-C8C9-1C3E-28111583A01F}"/>
+          <p:cNvPr id="2" name="TextBox 1">
+            <a:extLst>
+              <a:ext uri="{FF2B5EF4-FFF2-40B4-BE49-F238E27FC236}">
+                <a16:creationId xmlns:a16="http://schemas.microsoft.com/office/drawing/2014/main" id="{EEBB48EE-699D-DE17-5239-5C892D0BED8A}"/>
               </a:ext>
             </a:extLst>
           </p:cNvPr>
@@ -25972,8 +26285,8 @@
         </p:nvSpPr>
         <p:spPr>
           <a:xfrm>
-            <a:off x="990600" y="1909354"/>
-            <a:ext cx="4498849" cy="1754326"/>
+            <a:off x="990600" y="2537433"/>
+            <a:ext cx="9354047" cy="1754326"/>
           </a:xfrm>
           <a:prstGeom prst="rect">
             <a:avLst/>
@@ -25981,67 +26294,68 @@
           <a:noFill/>
         </p:spPr>
         <p:txBody>
-          <a:bodyPr wrap="square" rtlCol="0">
+          <a:bodyPr wrap="square">
             <a:spAutoFit/>
           </a:bodyPr>
           <a:lstStyle/>
           <a:p>
             <a:r>
-              <a:rPr lang="es-ES" dirty="0"/>
-              <a:t>-Funciones de pérdidas (SSR)</a:t>
-            </a:r>
-          </a:p>
-          <a:p>
-            <a:r>
-              <a:rPr lang="es-ES" dirty="0"/>
-              <a:t>-Regla de la cadena (breve)</a:t>
-            </a:r>
-          </a:p>
-          <a:p>
-            <a:r>
-              <a:rPr lang="es-ES" dirty="0"/>
-              <a:t>-</a:t>
-            </a:r>
-            <a:r>
-              <a:rPr lang="es-ES" dirty="0" err="1"/>
-              <a:t>Retropropagación</a:t>
-            </a:r>
-            <a:endParaRPr lang="es-ES" dirty="0"/>
-          </a:p>
-          <a:p>
-            <a:r>
-              <a:rPr lang="es-ES" dirty="0"/>
-              <a:t>-Ejemplo numérico</a:t>
-            </a:r>
-          </a:p>
-          <a:p>
-            <a:r>
-              <a:rPr lang="es-ES" dirty="0"/>
-              <a:t>-Código son </a:t>
-            </a:r>
-            <a:r>
-              <a:rPr lang="es-ES" dirty="0" err="1"/>
-              <a:t>Pytorch</a:t>
-            </a:r>
-            <a:endParaRPr lang="es-ES" dirty="0"/>
-          </a:p>
-          <a:p>
-            <a:r>
-              <a:rPr lang="es-ES" dirty="0"/>
-              <a:t>-Código </a:t>
-            </a:r>
-            <a:r>
-              <a:rPr lang="es-ES" dirty="0" err="1"/>
-              <a:t>Pytorch</a:t>
-            </a:r>
-            <a:endParaRPr lang="es-ES" dirty="0"/>
+              <a:rPr lang="es-ES" sz="2800" b="1" dirty="0" err="1"/>
+              <a:t>Learning</a:t>
+            </a:r>
+            <a:r>
+              <a:rPr lang="es-ES" sz="2800" b="1" dirty="0"/>
+              <a:t> </a:t>
+            </a:r>
+            <a:r>
+              <a:rPr lang="es-ES" sz="2800" b="1" dirty="0" err="1"/>
+              <a:t>Rate</a:t>
+            </a:r>
+            <a:r>
+              <a:rPr lang="es-ES" sz="2800" b="1" dirty="0"/>
+              <a:t> </a:t>
+            </a:r>
+            <a:r>
+              <a:rPr lang="es-ES" sz="2800" dirty="0"/>
+              <a:t>(Ratio de aprendizaje)</a:t>
+            </a:r>
+          </a:p>
+          <a:p>
+            <a:endParaRPr lang="es-ES" sz="4000" b="1" dirty="0"/>
+          </a:p>
+          <a:p>
+            <a:r>
+              <a:rPr lang="es-ES" sz="4000" b="1" dirty="0"/>
+              <a:t>Step </a:t>
+            </a:r>
+            <a:r>
+              <a:rPr lang="es-ES" sz="4000" b="1" dirty="0" err="1"/>
+              <a:t>Size</a:t>
+            </a:r>
+            <a:r>
+              <a:rPr lang="es-ES" sz="4000" b="1" dirty="0"/>
+              <a:t> = Derivative x </a:t>
+            </a:r>
+            <a:r>
+              <a:rPr lang="es-ES" sz="4000" b="1" dirty="0" err="1"/>
+              <a:t>Learning</a:t>
+            </a:r>
+            <a:r>
+              <a:rPr lang="es-ES" sz="4000" b="1" dirty="0"/>
+              <a:t> </a:t>
+            </a:r>
+            <a:r>
+              <a:rPr lang="es-ES" sz="4000" b="1" dirty="0" err="1"/>
+              <a:t>Rate</a:t>
+            </a:r>
+            <a:endParaRPr lang="es-ES" sz="4000" dirty="0"/>
           </a:p>
         </p:txBody>
       </p:sp>
     </p:spTree>
     <p:extLst>
       <p:ext uri="{BB962C8B-B14F-4D97-AF65-F5344CB8AC3E}">
-        <p14:creationId xmlns:p14="http://schemas.microsoft.com/office/powerpoint/2010/main" val="1647417615"/>
+        <p14:creationId xmlns:p14="http://schemas.microsoft.com/office/powerpoint/2010/main" val="1076324730"/>
       </p:ext>
     </p:extLst>
   </p:cSld>
@@ -26059,7 +26373,7 @@
         <p:cNvPr id="1" name="">
           <a:extLst>
             <a:ext uri="{FF2B5EF4-FFF2-40B4-BE49-F238E27FC236}">
-              <a16:creationId xmlns:a16="http://schemas.microsoft.com/office/drawing/2014/main" id="{46C4D660-6A4C-B646-B7BE-F0959804453B}"/>
+              <a16:creationId xmlns:a16="http://schemas.microsoft.com/office/drawing/2014/main" id="{C60DEBBD-0762-BE09-B372-C07179C6E44D}"/>
             </a:ext>
           </a:extLst>
         </p:cNvPr>
@@ -26074,142 +26388,12 @@
           <a:chExt cx="0" cy="0"/>
         </a:xfrm>
       </p:grpSpPr>
-      <p:pic>
-        <p:nvPicPr>
-          <p:cNvPr id="5" name="Picture 2">
-            <a:extLst>
-              <a:ext uri="{FF2B5EF4-FFF2-40B4-BE49-F238E27FC236}">
-                <a16:creationId xmlns:a16="http://schemas.microsoft.com/office/drawing/2014/main" id="{837FC799-7B81-A307-FFD9-BDFA0D18E14C}"/>
-              </a:ext>
-            </a:extLst>
-          </p:cNvPr>
-          <p:cNvPicPr>
-            <a:picLocks noChangeAspect="1" noChangeArrowheads="1"/>
-          </p:cNvPicPr>
-          <p:nvPr/>
-        </p:nvPicPr>
-        <p:blipFill>
-          <a:blip r:embed="rId2">
-            <a:extLst>
-              <a:ext uri="{28A0092B-C50C-407E-A947-70E740481C1C}">
-                <a14:useLocalDpi xmlns:a14="http://schemas.microsoft.com/office/drawing/2010/main" val="0"/>
-              </a:ext>
-            </a:extLst>
-          </a:blip>
-          <a:srcRect/>
-          <a:stretch>
-            <a:fillRect/>
-          </a:stretch>
-        </p:blipFill>
-        <p:spPr bwMode="auto">
-          <a:xfrm>
-            <a:off x="10881954" y="5786323"/>
-            <a:ext cx="943692" cy="852856"/>
-          </a:xfrm>
-          <a:prstGeom prst="rect">
-            <a:avLst/>
-          </a:prstGeom>
-          <a:noFill/>
-          <a:extLst>
-            <a:ext uri="{909E8E84-426E-40DD-AFC4-6F175D3DCCD1}">
-              <a14:hiddenFill xmlns:a14="http://schemas.microsoft.com/office/drawing/2010/main">
-                <a:solidFill>
-                  <a:srgbClr val="FFFFFF"/>
-                </a:solidFill>
-              </a14:hiddenFill>
-            </a:ext>
-          </a:extLst>
-        </p:spPr>
-      </p:pic>
       <p:sp>
         <p:nvSpPr>
-          <p:cNvPr id="6" name="TextBox 5">
-            <a:extLst>
-              <a:ext uri="{FF2B5EF4-FFF2-40B4-BE49-F238E27FC236}">
-                <a16:creationId xmlns:a16="http://schemas.microsoft.com/office/drawing/2014/main" id="{CB4B70AA-CDDF-2BC1-8775-0732B8C955E7}"/>
-              </a:ext>
-            </a:extLst>
-          </p:cNvPr>
-          <p:cNvSpPr txBox="1"/>
-          <p:nvPr/>
-        </p:nvSpPr>
-        <p:spPr>
-          <a:xfrm>
-            <a:off x="990599" y="1727276"/>
-            <a:ext cx="8736875" cy="584775"/>
-          </a:xfrm>
-          <a:prstGeom prst="rect">
-            <a:avLst/>
-          </a:prstGeom>
-          <a:noFill/>
-        </p:spPr>
-        <p:txBody>
-          <a:bodyPr wrap="square" rtlCol="0">
-            <a:spAutoFit/>
-          </a:bodyPr>
-          <a:lstStyle/>
-          <a:p>
-            <a:r>
-              <a:rPr lang="es-ES" sz="3200" dirty="0"/>
-              <a:t>¡Práctica!</a:t>
-            </a:r>
-            <a:endParaRPr lang="en-US" dirty="0"/>
-          </a:p>
-        </p:txBody>
-      </p:sp>
-      <p:pic>
-        <p:nvPicPr>
-          <p:cNvPr id="2" name="Picture 2">
-            <a:extLst>
-              <a:ext uri="{FF2B5EF4-FFF2-40B4-BE49-F238E27FC236}">
-                <a16:creationId xmlns:a16="http://schemas.microsoft.com/office/drawing/2014/main" id="{3477D16D-9759-F25C-A225-E2EF81296CDD}"/>
-              </a:ext>
-            </a:extLst>
-          </p:cNvPr>
-          <p:cNvPicPr>
-            <a:picLocks noChangeAspect="1" noChangeArrowheads="1"/>
-          </p:cNvPicPr>
-          <p:nvPr/>
-        </p:nvPicPr>
-        <p:blipFill>
-          <a:blip r:embed="rId3">
-            <a:extLst>
-              <a:ext uri="{28A0092B-C50C-407E-A947-70E740481C1C}">
-                <a14:useLocalDpi xmlns:a14="http://schemas.microsoft.com/office/drawing/2010/main" val="0"/>
-              </a:ext>
-            </a:extLst>
-          </a:blip>
-          <a:srcRect/>
-          <a:stretch>
-            <a:fillRect/>
-          </a:stretch>
-        </p:blipFill>
-        <p:spPr bwMode="auto">
-          <a:xfrm>
-            <a:off x="4902933" y="3019048"/>
-            <a:ext cx="2386134" cy="2767275"/>
-          </a:xfrm>
-          <a:prstGeom prst="rect">
-            <a:avLst/>
-          </a:prstGeom>
-          <a:noFill/>
-          <a:extLst>
-            <a:ext uri="{909E8E84-426E-40DD-AFC4-6F175D3DCCD1}">
-              <a14:hiddenFill xmlns:a14="http://schemas.microsoft.com/office/drawing/2010/main">
-                <a:solidFill>
-                  <a:srgbClr val="FFFFFF"/>
-                </a:solidFill>
-              </a14:hiddenFill>
-            </a:ext>
-          </a:extLst>
-        </p:spPr>
-      </p:pic>
-      <p:sp>
-        <p:nvSpPr>
-          <p:cNvPr id="3" name="Title 1">
-            <a:extLst>
-              <a:ext uri="{FF2B5EF4-FFF2-40B4-BE49-F238E27FC236}">
-                <a16:creationId xmlns:a16="http://schemas.microsoft.com/office/drawing/2014/main" id="{AF013A8C-31FC-6A62-561A-92AA3D990B5B}"/>
+          <p:cNvPr id="4" name="Title 1">
+            <a:extLst>
+              <a:ext uri="{FF2B5EF4-FFF2-40B4-BE49-F238E27FC236}">
+                <a16:creationId xmlns:a16="http://schemas.microsoft.com/office/drawing/2014/main" id="{4C978CFD-A806-DBC1-EF53-5FA3C5F0CE3E}"/>
               </a:ext>
             </a:extLst>
           </p:cNvPr>
@@ -26321,10 +26505,149 @@
           </a:p>
         </p:txBody>
       </p:sp>
+      <p:pic>
+        <p:nvPicPr>
+          <p:cNvPr id="5" name="Picture 2">
+            <a:extLst>
+              <a:ext uri="{FF2B5EF4-FFF2-40B4-BE49-F238E27FC236}">
+                <a16:creationId xmlns:a16="http://schemas.microsoft.com/office/drawing/2014/main" id="{87DC252B-AF12-8BBF-B0B5-BF47D6B7428B}"/>
+              </a:ext>
+            </a:extLst>
+          </p:cNvPr>
+          <p:cNvPicPr>
+            <a:picLocks noChangeAspect="1" noChangeArrowheads="1"/>
+          </p:cNvPicPr>
+          <p:nvPr/>
+        </p:nvPicPr>
+        <p:blipFill>
+          <a:blip r:embed="rId2">
+            <a:extLst>
+              <a:ext uri="{28A0092B-C50C-407E-A947-70E740481C1C}">
+                <a14:useLocalDpi xmlns:a14="http://schemas.microsoft.com/office/drawing/2010/main" val="0"/>
+              </a:ext>
+            </a:extLst>
+          </a:blip>
+          <a:srcRect/>
+          <a:stretch>
+            <a:fillRect/>
+          </a:stretch>
+        </p:blipFill>
+        <p:spPr bwMode="auto">
+          <a:xfrm>
+            <a:off x="10881954" y="5786323"/>
+            <a:ext cx="943692" cy="852856"/>
+          </a:xfrm>
+          <a:prstGeom prst="rect">
+            <a:avLst/>
+          </a:prstGeom>
+          <a:noFill/>
+          <a:extLst>
+            <a:ext uri="{909E8E84-426E-40DD-AFC4-6F175D3DCCD1}">
+              <a14:hiddenFill xmlns:a14="http://schemas.microsoft.com/office/drawing/2010/main">
+                <a:solidFill>
+                  <a:srgbClr val="FFFFFF"/>
+                </a:solidFill>
+              </a14:hiddenFill>
+            </a:ext>
+          </a:extLst>
+        </p:spPr>
+      </p:pic>
+      <p:sp>
+        <p:nvSpPr>
+          <p:cNvPr id="2" name="TextBox 1">
+            <a:extLst>
+              <a:ext uri="{FF2B5EF4-FFF2-40B4-BE49-F238E27FC236}">
+                <a16:creationId xmlns:a16="http://schemas.microsoft.com/office/drawing/2014/main" id="{D2CDE37E-1BCD-FABF-5930-721CA4341196}"/>
+              </a:ext>
+            </a:extLst>
+          </p:cNvPr>
+          <p:cNvSpPr txBox="1"/>
+          <p:nvPr/>
+        </p:nvSpPr>
+        <p:spPr>
+          <a:xfrm>
+            <a:off x="990600" y="2537433"/>
+            <a:ext cx="9354047" cy="2369880"/>
+          </a:xfrm>
+          <a:prstGeom prst="rect">
+            <a:avLst/>
+          </a:prstGeom>
+          <a:noFill/>
+        </p:spPr>
+        <p:txBody>
+          <a:bodyPr wrap="square">
+            <a:spAutoFit/>
+          </a:bodyPr>
+          <a:lstStyle/>
+          <a:p>
+            <a:r>
+              <a:rPr lang="es-ES" sz="2800" b="1" dirty="0" err="1"/>
+              <a:t>Learning</a:t>
+            </a:r>
+            <a:r>
+              <a:rPr lang="es-ES" sz="2800" b="1" dirty="0"/>
+              <a:t> </a:t>
+            </a:r>
+            <a:r>
+              <a:rPr lang="es-ES" sz="2800" b="1" dirty="0" err="1"/>
+              <a:t>Rate</a:t>
+            </a:r>
+            <a:r>
+              <a:rPr lang="es-ES" sz="2800" b="1" dirty="0"/>
+              <a:t> </a:t>
+            </a:r>
+            <a:r>
+              <a:rPr lang="es-ES" sz="2800" dirty="0"/>
+              <a:t>(Ratio de aprendizaje)</a:t>
+            </a:r>
+          </a:p>
+          <a:p>
+            <a:endParaRPr lang="es-ES" sz="4000" b="1" dirty="0"/>
+          </a:p>
+          <a:p>
+            <a:r>
+              <a:rPr lang="es-ES" sz="4000" b="1" dirty="0"/>
+              <a:t>Step </a:t>
+            </a:r>
+            <a:r>
+              <a:rPr lang="es-ES" sz="4000" b="1" dirty="0" err="1"/>
+              <a:t>Size</a:t>
+            </a:r>
+            <a:r>
+              <a:rPr lang="es-ES" sz="4000" b="1" dirty="0"/>
+              <a:t> = Derivative x </a:t>
+            </a:r>
+            <a:r>
+              <a:rPr lang="es-ES" sz="4000" b="1" dirty="0" err="1"/>
+              <a:t>Learning</a:t>
+            </a:r>
+            <a:r>
+              <a:rPr lang="es-ES" sz="4000" b="1" dirty="0"/>
+              <a:t> </a:t>
+            </a:r>
+            <a:r>
+              <a:rPr lang="es-ES" sz="4000" b="1" dirty="0" err="1"/>
+              <a:t>Rate</a:t>
+            </a:r>
+            <a:endParaRPr lang="es-ES" sz="4000" b="1" dirty="0"/>
+          </a:p>
+          <a:p>
+            <a:r>
+              <a:rPr lang="es-ES" sz="4000" b="1" dirty="0"/>
+              <a:t>New W3 = Old W3 -  Step </a:t>
+            </a:r>
+            <a:r>
+              <a:rPr lang="es-ES" sz="4000" b="1" dirty="0" err="1"/>
+              <a:t>Size</a:t>
+            </a:r>
+            <a:endParaRPr lang="es-ES" sz="4000" b="1" dirty="0"/>
+          </a:p>
+        </p:txBody>
+      </p:sp>
     </p:spTree>
     <p:extLst>
       <p:ext uri="{BB962C8B-B14F-4D97-AF65-F5344CB8AC3E}">
-        <p14:creationId xmlns:p14="http://schemas.microsoft.com/office/powerpoint/2010/main" val="1673312006"/>
+        <p14:creationId xmlns:p14="http://schemas.microsoft.com/office/powerpoint/2010/main" val="4146912103"/>
       </p:ext>
     </p:extLst>
   </p:cSld>
@@ -26342,7 +26665,7 @@
         <p:cNvPr id="1" name="">
           <a:extLst>
             <a:ext uri="{FF2B5EF4-FFF2-40B4-BE49-F238E27FC236}">
-              <a16:creationId xmlns:a16="http://schemas.microsoft.com/office/drawing/2014/main" id="{5A26BCF4-75B3-2EB2-8A00-676D5F956E0F}"/>
+              <a16:creationId xmlns:a16="http://schemas.microsoft.com/office/drawing/2014/main" id="{51B924EA-5F96-92BC-84C8-4CFE11BA8C49}"/>
             </a:ext>
           </a:extLst>
         </p:cNvPr>
@@ -26359,44 +26682,134 @@
       </p:grpSpPr>
       <p:sp>
         <p:nvSpPr>
-          <p:cNvPr id="2" name="Title 1">
-            <a:extLst>
-              <a:ext uri="{FF2B5EF4-FFF2-40B4-BE49-F238E27FC236}">
-                <a16:creationId xmlns:a16="http://schemas.microsoft.com/office/drawing/2014/main" id="{5470B7C3-0E8C-65FF-4A07-9AF7F51BAE1F}"/>
-              </a:ext>
-            </a:extLst>
-          </p:cNvPr>
-          <p:cNvSpPr>
-            <a:spLocks noGrp="1"/>
+          <p:cNvPr id="4" name="Title 1">
+            <a:extLst>
+              <a:ext uri="{FF2B5EF4-FFF2-40B4-BE49-F238E27FC236}">
+                <a16:creationId xmlns:a16="http://schemas.microsoft.com/office/drawing/2014/main" id="{1E2C86A3-1321-9CA6-C152-C7BADE130DBB}"/>
+              </a:ext>
+            </a:extLst>
+          </p:cNvPr>
+          <p:cNvSpPr txBox="1">
+            <a:spLocks/>
           </p:cNvSpPr>
-          <p:nvPr>
-            <p:ph type="title"/>
-          </p:nvPr>
+          <p:nvPr/>
         </p:nvSpPr>
-        <p:spPr/>
+        <p:spPr>
+          <a:xfrm>
+            <a:off x="990600" y="517525"/>
+            <a:ext cx="11079480" cy="1325563"/>
+          </a:xfrm>
+          <a:prstGeom prst="rect">
+            <a:avLst/>
+          </a:prstGeom>
+        </p:spPr>
         <p:txBody>
-          <a:bodyPr/>
-          <a:lstStyle/>
-          <a:p>
-            <a:endParaRPr lang="en-US"/>
+          <a:bodyPr vert="horz" lIns="91440" tIns="45720" rIns="91440" bIns="45720" rtlCol="0" anchor="ctr">
+            <a:normAutofit/>
+          </a:bodyPr>
+          <a:lstStyle>
+            <a:lvl1pPr algn="l" defTabSz="914400" rtl="0" eaLnBrk="1" latinLnBrk="0" hangingPunct="1">
+              <a:lnSpc>
+                <a:spcPct val="90000"/>
+              </a:lnSpc>
+              <a:spcBef>
+                <a:spcPct val="0"/>
+              </a:spcBef>
+              <a:buNone/>
+              <a:defRPr sz="4400" kern="1200">
+                <a:solidFill>
+                  <a:schemeClr val="tx1"/>
+                </a:solidFill>
+                <a:latin typeface="+mj-lt"/>
+                <a:ea typeface="+mj-ea"/>
+                <a:cs typeface="+mj-cs"/>
+              </a:defRPr>
+            </a:lvl1pPr>
+          </a:lstStyle>
+          <a:p>
+            <a:r>
+              <a:rPr lang="es-ES" dirty="0">
+                <a:solidFill>
+                  <a:srgbClr val="EB178E"/>
+                </a:solidFill>
+                <a:latin typeface="Arial" panose="020B0604020202020204" pitchFamily="34" charset="0"/>
+                <a:cs typeface="Arial" panose="020B0604020202020204" pitchFamily="34" charset="0"/>
+              </a:rPr>
+              <a:t>Optimización </a:t>
+            </a:r>
+            <a:r>
+              <a:rPr lang="es-ES" dirty="0" err="1">
+                <a:solidFill>
+                  <a:srgbClr val="EB178E"/>
+                </a:solidFill>
+                <a:latin typeface="Arial" panose="020B0604020202020204" pitchFamily="34" charset="0"/>
+                <a:cs typeface="Arial" panose="020B0604020202020204" pitchFamily="34" charset="0"/>
+              </a:rPr>
+              <a:t>weights</a:t>
+            </a:r>
+            <a:r>
+              <a:rPr lang="es-ES" dirty="0">
+                <a:solidFill>
+                  <a:srgbClr val="EB178E"/>
+                </a:solidFill>
+                <a:latin typeface="Arial" panose="020B0604020202020204" pitchFamily="34" charset="0"/>
+                <a:cs typeface="Arial" panose="020B0604020202020204" pitchFamily="34" charset="0"/>
+              </a:rPr>
+              <a:t> &amp; </a:t>
+            </a:r>
+            <a:r>
+              <a:rPr lang="es-ES" dirty="0" err="1">
+                <a:solidFill>
+                  <a:srgbClr val="EB178E"/>
+                </a:solidFill>
+                <a:latin typeface="Arial" panose="020B0604020202020204" pitchFamily="34" charset="0"/>
+                <a:cs typeface="Arial" panose="020B0604020202020204" pitchFamily="34" charset="0"/>
+              </a:rPr>
+              <a:t>bias</a:t>
+            </a:r>
+            <a:r>
+              <a:rPr lang="es-ES" dirty="0">
+                <a:solidFill>
+                  <a:srgbClr val="EB178E"/>
+                </a:solidFill>
+                <a:latin typeface="Arial" panose="020B0604020202020204" pitchFamily="34" charset="0"/>
+                <a:cs typeface="Arial" panose="020B0604020202020204" pitchFamily="34" charset="0"/>
+              </a:rPr>
+              <a:t> con </a:t>
+            </a:r>
+            <a:r>
+              <a:rPr lang="es-ES" dirty="0" err="1">
+                <a:solidFill>
+                  <a:srgbClr val="EB178E"/>
+                </a:solidFill>
+                <a:latin typeface="Arial" panose="020B0604020202020204" pitchFamily="34" charset="0"/>
+                <a:cs typeface="Arial" panose="020B0604020202020204" pitchFamily="34" charset="0"/>
+              </a:rPr>
+              <a:t>backpropagation</a:t>
+            </a:r>
+            <a:endParaRPr lang="en-US" dirty="0">
+              <a:solidFill>
+                <a:srgbClr val="EB178E"/>
+              </a:solidFill>
+              <a:latin typeface="Arial" panose="020B0604020202020204" pitchFamily="34" charset="0"/>
+              <a:cs typeface="Arial" panose="020B0604020202020204" pitchFamily="34" charset="0"/>
+            </a:endParaRPr>
           </a:p>
         </p:txBody>
       </p:sp>
       <p:pic>
         <p:nvPicPr>
-          <p:cNvPr id="1026" name="Picture 2">
-            <a:extLst>
-              <a:ext uri="{FF2B5EF4-FFF2-40B4-BE49-F238E27FC236}">
-                <a16:creationId xmlns:a16="http://schemas.microsoft.com/office/drawing/2014/main" id="{9DE39476-2D0F-B5B5-48E3-08871A4A9729}"/>
+          <p:cNvPr id="5" name="Picture 2">
+            <a:extLst>
+              <a:ext uri="{FF2B5EF4-FFF2-40B4-BE49-F238E27FC236}">
+                <a16:creationId xmlns:a16="http://schemas.microsoft.com/office/drawing/2014/main" id="{234C736C-BAA1-F639-3A98-94DAAF71907C}"/>
               </a:ext>
             </a:extLst>
           </p:cNvPr>
           <p:cNvPicPr>
-            <a:picLocks noGrp="1" noChangeAspect="1" noChangeArrowheads="1"/>
+            <a:picLocks noChangeAspect="1" noChangeArrowheads="1"/>
           </p:cNvPicPr>
-          <p:nvPr>
-            <p:ph idx="1"/>
-          </p:nvPr>
+          <p:nvPr/>
         </p:nvPicPr>
         <p:blipFill>
           <a:blip r:embed="rId2">
@@ -26431,10 +26844,166 @@
           </a:extLst>
         </p:spPr>
       </p:pic>
+      <p:pic>
+        <p:nvPicPr>
+          <p:cNvPr id="3" name="Picture 2" descr="A graph with a line and a dotted line&#10;&#10;AI-generated content may be incorrect.">
+            <a:extLst>
+              <a:ext uri="{FF2B5EF4-FFF2-40B4-BE49-F238E27FC236}">
+                <a16:creationId xmlns:a16="http://schemas.microsoft.com/office/drawing/2014/main" id="{8B779DD4-6FF9-DB9E-CBD3-0B13C7B5FB80}"/>
+              </a:ext>
+            </a:extLst>
+          </p:cNvPr>
+          <p:cNvPicPr>
+            <a:picLocks noChangeAspect="1"/>
+          </p:cNvPicPr>
+          <p:nvPr/>
+        </p:nvPicPr>
+        <p:blipFill>
+          <a:blip r:embed="rId3">
+            <a:extLst>
+              <a:ext uri="{28A0092B-C50C-407E-A947-70E740481C1C}">
+                <a14:useLocalDpi xmlns:a14="http://schemas.microsoft.com/office/drawing/2010/main" val="0"/>
+              </a:ext>
+            </a:extLst>
+          </a:blip>
+          <a:stretch>
+            <a:fillRect/>
+          </a:stretch>
+        </p:blipFill>
+        <p:spPr>
+          <a:xfrm>
+            <a:off x="185530" y="2175109"/>
+            <a:ext cx="5355076" cy="4335515"/>
+          </a:xfrm>
+          <a:prstGeom prst="rect">
+            <a:avLst/>
+          </a:prstGeom>
+        </p:spPr>
+      </p:pic>
+      <p:cxnSp>
+        <p:nvCxnSpPr>
+          <p:cNvPr id="6" name="Straight Connector 5">
+            <a:extLst>
+              <a:ext uri="{FF2B5EF4-FFF2-40B4-BE49-F238E27FC236}">
+                <a16:creationId xmlns:a16="http://schemas.microsoft.com/office/drawing/2014/main" id="{9047F709-845B-9212-15C0-3B07DE1339C9}"/>
+              </a:ext>
+            </a:extLst>
+          </p:cNvPr>
+          <p:cNvCxnSpPr/>
+          <p:nvPr/>
+        </p:nvCxnSpPr>
+        <p:spPr>
+          <a:xfrm flipH="1">
+            <a:off x="4809086" y="1877400"/>
+            <a:ext cx="731520" cy="1900362"/>
+          </a:xfrm>
+          <a:prstGeom prst="line">
+            <a:avLst/>
+          </a:prstGeom>
+          <a:ln w="57150">
+            <a:solidFill>
+              <a:schemeClr val="accent5">
+                <a:lumMod val="75000"/>
+              </a:schemeClr>
+            </a:solidFill>
+          </a:ln>
+        </p:spPr>
+        <p:style>
+          <a:lnRef idx="2">
+            <a:schemeClr val="accent1"/>
+          </a:lnRef>
+          <a:fillRef idx="0">
+            <a:schemeClr val="accent1"/>
+          </a:fillRef>
+          <a:effectRef idx="1">
+            <a:schemeClr val="accent1"/>
+          </a:effectRef>
+          <a:fontRef idx="minor">
+            <a:schemeClr val="tx1"/>
+          </a:fontRef>
+        </p:style>
+      </p:cxnSp>
+      <p:sp>
+        <p:nvSpPr>
+          <p:cNvPr id="8" name="TextBox 7">
+            <a:extLst>
+              <a:ext uri="{FF2B5EF4-FFF2-40B4-BE49-F238E27FC236}">
+                <a16:creationId xmlns:a16="http://schemas.microsoft.com/office/drawing/2014/main" id="{7CF03798-7070-D6B1-79F4-0F4A31E321B8}"/>
+              </a:ext>
+            </a:extLst>
+          </p:cNvPr>
+          <p:cNvSpPr txBox="1"/>
+          <p:nvPr/>
+        </p:nvSpPr>
+        <p:spPr>
+          <a:xfrm>
+            <a:off x="5754676" y="2369819"/>
+            <a:ext cx="6070969" cy="2554545"/>
+          </a:xfrm>
+          <a:prstGeom prst="rect">
+            <a:avLst/>
+          </a:prstGeom>
+          <a:noFill/>
+        </p:spPr>
+        <p:txBody>
+          <a:bodyPr wrap="square">
+            <a:spAutoFit/>
+          </a:bodyPr>
+          <a:lstStyle/>
+          <a:p>
+            <a:r>
+              <a:rPr lang="es-ES" sz="3200" dirty="0"/>
+              <a:t>Pendiente = 9.87</a:t>
+            </a:r>
+          </a:p>
+          <a:p>
+            <a:r>
+              <a:rPr lang="es-ES" sz="3200" dirty="0" err="1"/>
+              <a:t>Learning</a:t>
+            </a:r>
+            <a:r>
+              <a:rPr lang="es-ES" sz="3200" dirty="0"/>
+              <a:t> </a:t>
+            </a:r>
+            <a:r>
+              <a:rPr lang="es-ES" sz="3200" dirty="0" err="1"/>
+              <a:t>Rate</a:t>
+            </a:r>
+            <a:r>
+              <a:rPr lang="es-ES" sz="3200" dirty="0"/>
+              <a:t> = 0.01</a:t>
+            </a:r>
+          </a:p>
+          <a:p>
+            <a:endParaRPr lang="es-ES" sz="3200" dirty="0"/>
+          </a:p>
+          <a:p>
+            <a:r>
+              <a:rPr lang="es-ES" sz="3200" dirty="0"/>
+              <a:t>Step </a:t>
+            </a:r>
+            <a:r>
+              <a:rPr lang="es-ES" sz="3200" dirty="0" err="1"/>
+              <a:t>Size</a:t>
+            </a:r>
+            <a:r>
+              <a:rPr lang="es-ES" sz="3200" dirty="0"/>
+              <a:t> = 9.87 x 0.01 = 0.0987</a:t>
+            </a:r>
+          </a:p>
+          <a:p>
+            <a:r>
+              <a:rPr lang="es-ES" sz="3200" dirty="0"/>
+              <a:t>New W3 = 0 – 0.0987 = -0.0987</a:t>
+            </a:r>
+            <a:endParaRPr lang="en-US" sz="3200" dirty="0"/>
+          </a:p>
+        </p:txBody>
+      </p:sp>
     </p:spTree>
     <p:extLst>
       <p:ext uri="{BB962C8B-B14F-4D97-AF65-F5344CB8AC3E}">
-        <p14:creationId xmlns:p14="http://schemas.microsoft.com/office/powerpoint/2010/main" val="127420591"/>
+        <p14:creationId xmlns:p14="http://schemas.microsoft.com/office/powerpoint/2010/main" val="367287770"/>
       </p:ext>
     </p:extLst>
   </p:cSld>
@@ -26452,7 +27021,7 @@
         <p:cNvPr id="1" name="">
           <a:extLst>
             <a:ext uri="{FF2B5EF4-FFF2-40B4-BE49-F238E27FC236}">
-              <a16:creationId xmlns:a16="http://schemas.microsoft.com/office/drawing/2014/main" id="{AF327E39-ECCF-6910-8650-49F5528DCA3D}"/>
+              <a16:creationId xmlns:a16="http://schemas.microsoft.com/office/drawing/2014/main" id="{422E8B1A-DE39-8FF5-5C40-2E0ED7A0C03B}"/>
             </a:ext>
           </a:extLst>
         </p:cNvPr>
@@ -26469,44 +27038,134 @@
       </p:grpSpPr>
       <p:sp>
         <p:nvSpPr>
-          <p:cNvPr id="2" name="Title 1">
-            <a:extLst>
-              <a:ext uri="{FF2B5EF4-FFF2-40B4-BE49-F238E27FC236}">
-                <a16:creationId xmlns:a16="http://schemas.microsoft.com/office/drawing/2014/main" id="{768DC2AD-F381-28B0-514D-BA8D2F08813D}"/>
-              </a:ext>
-            </a:extLst>
-          </p:cNvPr>
-          <p:cNvSpPr>
-            <a:spLocks noGrp="1"/>
+          <p:cNvPr id="4" name="Title 1">
+            <a:extLst>
+              <a:ext uri="{FF2B5EF4-FFF2-40B4-BE49-F238E27FC236}">
+                <a16:creationId xmlns:a16="http://schemas.microsoft.com/office/drawing/2014/main" id="{F02E78E2-9D63-CF11-E393-4C77EE19D9DE}"/>
+              </a:ext>
+            </a:extLst>
+          </p:cNvPr>
+          <p:cNvSpPr txBox="1">
+            <a:spLocks/>
           </p:cNvSpPr>
-          <p:nvPr>
-            <p:ph type="title"/>
-          </p:nvPr>
+          <p:nvPr/>
         </p:nvSpPr>
-        <p:spPr/>
+        <p:spPr>
+          <a:xfrm>
+            <a:off x="990600" y="517525"/>
+            <a:ext cx="11079480" cy="1325563"/>
+          </a:xfrm>
+          <a:prstGeom prst="rect">
+            <a:avLst/>
+          </a:prstGeom>
+        </p:spPr>
         <p:txBody>
-          <a:bodyPr/>
-          <a:lstStyle/>
-          <a:p>
-            <a:endParaRPr lang="en-US"/>
+          <a:bodyPr vert="horz" lIns="91440" tIns="45720" rIns="91440" bIns="45720" rtlCol="0" anchor="ctr">
+            <a:normAutofit/>
+          </a:bodyPr>
+          <a:lstStyle>
+            <a:lvl1pPr algn="l" defTabSz="914400" rtl="0" eaLnBrk="1" latinLnBrk="0" hangingPunct="1">
+              <a:lnSpc>
+                <a:spcPct val="90000"/>
+              </a:lnSpc>
+              <a:spcBef>
+                <a:spcPct val="0"/>
+              </a:spcBef>
+              <a:buNone/>
+              <a:defRPr sz="4400" kern="1200">
+                <a:solidFill>
+                  <a:schemeClr val="tx1"/>
+                </a:solidFill>
+                <a:latin typeface="+mj-lt"/>
+                <a:ea typeface="+mj-ea"/>
+                <a:cs typeface="+mj-cs"/>
+              </a:defRPr>
+            </a:lvl1pPr>
+          </a:lstStyle>
+          <a:p>
+            <a:r>
+              <a:rPr lang="es-ES" dirty="0">
+                <a:solidFill>
+                  <a:srgbClr val="EB178E"/>
+                </a:solidFill>
+                <a:latin typeface="Arial" panose="020B0604020202020204" pitchFamily="34" charset="0"/>
+                <a:cs typeface="Arial" panose="020B0604020202020204" pitchFamily="34" charset="0"/>
+              </a:rPr>
+              <a:t>Optimización </a:t>
+            </a:r>
+            <a:r>
+              <a:rPr lang="es-ES" dirty="0" err="1">
+                <a:solidFill>
+                  <a:srgbClr val="EB178E"/>
+                </a:solidFill>
+                <a:latin typeface="Arial" panose="020B0604020202020204" pitchFamily="34" charset="0"/>
+                <a:cs typeface="Arial" panose="020B0604020202020204" pitchFamily="34" charset="0"/>
+              </a:rPr>
+              <a:t>weights</a:t>
+            </a:r>
+            <a:r>
+              <a:rPr lang="es-ES" dirty="0">
+                <a:solidFill>
+                  <a:srgbClr val="EB178E"/>
+                </a:solidFill>
+                <a:latin typeface="Arial" panose="020B0604020202020204" pitchFamily="34" charset="0"/>
+                <a:cs typeface="Arial" panose="020B0604020202020204" pitchFamily="34" charset="0"/>
+              </a:rPr>
+              <a:t> &amp; </a:t>
+            </a:r>
+            <a:r>
+              <a:rPr lang="es-ES" dirty="0" err="1">
+                <a:solidFill>
+                  <a:srgbClr val="EB178E"/>
+                </a:solidFill>
+                <a:latin typeface="Arial" panose="020B0604020202020204" pitchFamily="34" charset="0"/>
+                <a:cs typeface="Arial" panose="020B0604020202020204" pitchFamily="34" charset="0"/>
+              </a:rPr>
+              <a:t>bias</a:t>
+            </a:r>
+            <a:r>
+              <a:rPr lang="es-ES" dirty="0">
+                <a:solidFill>
+                  <a:srgbClr val="EB178E"/>
+                </a:solidFill>
+                <a:latin typeface="Arial" panose="020B0604020202020204" pitchFamily="34" charset="0"/>
+                <a:cs typeface="Arial" panose="020B0604020202020204" pitchFamily="34" charset="0"/>
+              </a:rPr>
+              <a:t> con </a:t>
+            </a:r>
+            <a:r>
+              <a:rPr lang="es-ES" dirty="0" err="1">
+                <a:solidFill>
+                  <a:srgbClr val="EB178E"/>
+                </a:solidFill>
+                <a:latin typeface="Arial" panose="020B0604020202020204" pitchFamily="34" charset="0"/>
+                <a:cs typeface="Arial" panose="020B0604020202020204" pitchFamily="34" charset="0"/>
+              </a:rPr>
+              <a:t>backpropagation</a:t>
+            </a:r>
+            <a:endParaRPr lang="en-US" dirty="0">
+              <a:solidFill>
+                <a:srgbClr val="EB178E"/>
+              </a:solidFill>
+              <a:latin typeface="Arial" panose="020B0604020202020204" pitchFamily="34" charset="0"/>
+              <a:cs typeface="Arial" panose="020B0604020202020204" pitchFamily="34" charset="0"/>
+            </a:endParaRPr>
           </a:p>
         </p:txBody>
       </p:sp>
       <p:pic>
         <p:nvPicPr>
-          <p:cNvPr id="1026" name="Picture 2">
-            <a:extLst>
-              <a:ext uri="{FF2B5EF4-FFF2-40B4-BE49-F238E27FC236}">
-                <a16:creationId xmlns:a16="http://schemas.microsoft.com/office/drawing/2014/main" id="{3E468F40-DCF3-1544-29D7-FC2777B194D6}"/>
+          <p:cNvPr id="5" name="Picture 2">
+            <a:extLst>
+              <a:ext uri="{FF2B5EF4-FFF2-40B4-BE49-F238E27FC236}">
+                <a16:creationId xmlns:a16="http://schemas.microsoft.com/office/drawing/2014/main" id="{18CB0AF4-3B38-B938-2103-046E0C922C7D}"/>
               </a:ext>
             </a:extLst>
           </p:cNvPr>
           <p:cNvPicPr>
-            <a:picLocks noGrp="1" noChangeAspect="1" noChangeArrowheads="1"/>
+            <a:picLocks noChangeAspect="1" noChangeArrowheads="1"/>
           </p:cNvPicPr>
-          <p:nvPr>
-            <p:ph idx="1"/>
-          </p:nvPr>
+          <p:nvPr/>
         </p:nvPicPr>
         <p:blipFill>
           <a:blip r:embed="rId2">
@@ -26541,10 +27200,239 @@
           </a:extLst>
         </p:spPr>
       </p:pic>
+      <p:pic>
+        <p:nvPicPr>
+          <p:cNvPr id="3" name="Picture 2" descr="A graph with a line and a dotted line&#10;&#10;AI-generated content may be incorrect.">
+            <a:extLst>
+              <a:ext uri="{FF2B5EF4-FFF2-40B4-BE49-F238E27FC236}">
+                <a16:creationId xmlns:a16="http://schemas.microsoft.com/office/drawing/2014/main" id="{41CD1C84-50E2-9506-C18C-6B7881D4511F}"/>
+              </a:ext>
+            </a:extLst>
+          </p:cNvPr>
+          <p:cNvPicPr>
+            <a:picLocks noChangeAspect="1"/>
+          </p:cNvPicPr>
+          <p:nvPr/>
+        </p:nvPicPr>
+        <p:blipFill>
+          <a:blip r:embed="rId3">
+            <a:extLst>
+              <a:ext uri="{28A0092B-C50C-407E-A947-70E740481C1C}">
+                <a14:useLocalDpi xmlns:a14="http://schemas.microsoft.com/office/drawing/2010/main" val="0"/>
+              </a:ext>
+            </a:extLst>
+          </a:blip>
+          <a:stretch>
+            <a:fillRect/>
+          </a:stretch>
+        </p:blipFill>
+        <p:spPr>
+          <a:xfrm>
+            <a:off x="185530" y="2175109"/>
+            <a:ext cx="5355076" cy="4335515"/>
+          </a:xfrm>
+          <a:prstGeom prst="rect">
+            <a:avLst/>
+          </a:prstGeom>
+        </p:spPr>
+      </p:pic>
+      <p:sp>
+        <p:nvSpPr>
+          <p:cNvPr id="8" name="TextBox 7">
+            <a:extLst>
+              <a:ext uri="{FF2B5EF4-FFF2-40B4-BE49-F238E27FC236}">
+                <a16:creationId xmlns:a16="http://schemas.microsoft.com/office/drawing/2014/main" id="{D26F36B0-281E-88FA-4109-EFA2111846F8}"/>
+              </a:ext>
+            </a:extLst>
+          </p:cNvPr>
+          <p:cNvSpPr txBox="1"/>
+          <p:nvPr/>
+        </p:nvSpPr>
+        <p:spPr>
+          <a:xfrm>
+            <a:off x="5754676" y="2369819"/>
+            <a:ext cx="6070969" cy="2062103"/>
+          </a:xfrm>
+          <a:prstGeom prst="rect">
+            <a:avLst/>
+          </a:prstGeom>
+          <a:noFill/>
+        </p:spPr>
+        <p:txBody>
+          <a:bodyPr wrap="square">
+            <a:spAutoFit/>
+          </a:bodyPr>
+          <a:lstStyle/>
+          <a:p>
+            <a:r>
+              <a:rPr lang="es-ES" sz="3200" dirty="0"/>
+              <a:t>New W3 = 0 – 0.0987 = -0.0987</a:t>
+            </a:r>
+          </a:p>
+          <a:p>
+            <a:r>
+              <a:rPr lang="es-ES" sz="3200" dirty="0"/>
+              <a:t>W3 = New W3</a:t>
+            </a:r>
+          </a:p>
+          <a:p>
+            <a:endParaRPr lang="es-ES" sz="3200" dirty="0"/>
+          </a:p>
+          <a:p>
+            <a:r>
+              <a:rPr lang="es-ES" sz="3200" b="1" dirty="0"/>
+              <a:t>Repetir!</a:t>
+            </a:r>
+            <a:endParaRPr lang="en-US" sz="3200" b="1" dirty="0"/>
+          </a:p>
+        </p:txBody>
+      </p:sp>
+      <p:sp>
+        <p:nvSpPr>
+          <p:cNvPr id="2" name="Multiplication Sign 1">
+            <a:extLst>
+              <a:ext uri="{FF2B5EF4-FFF2-40B4-BE49-F238E27FC236}">
+                <a16:creationId xmlns:a16="http://schemas.microsoft.com/office/drawing/2014/main" id="{192B412E-8D78-0694-45C7-11F911A75420}"/>
+              </a:ext>
+            </a:extLst>
+          </p:cNvPr>
+          <p:cNvSpPr/>
+          <p:nvPr/>
+        </p:nvSpPr>
+        <p:spPr>
+          <a:xfrm>
+            <a:off x="4839095" y="5709037"/>
+            <a:ext cx="467674" cy="397565"/>
+          </a:xfrm>
+          <a:prstGeom prst="mathMultiply">
+            <a:avLst/>
+          </a:prstGeom>
+          <a:solidFill>
+            <a:srgbClr val="C00000"/>
+          </a:solidFill>
+          <a:ln>
+            <a:solidFill>
+              <a:srgbClr val="C00000"/>
+            </a:solidFill>
+          </a:ln>
+        </p:spPr>
+        <p:style>
+          <a:lnRef idx="2">
+            <a:schemeClr val="accent1">
+              <a:shade val="15000"/>
+            </a:schemeClr>
+          </a:lnRef>
+          <a:fillRef idx="1">
+            <a:schemeClr val="accent1"/>
+          </a:fillRef>
+          <a:effectRef idx="0">
+            <a:schemeClr val="accent1"/>
+          </a:effectRef>
+          <a:fontRef idx="minor">
+            <a:schemeClr val="lt1"/>
+          </a:fontRef>
+        </p:style>
+        <p:txBody>
+          <a:bodyPr rtlCol="0" anchor="ctr"/>
+          <a:lstStyle/>
+          <a:p>
+            <a:pPr algn="ctr"/>
+            <a:endParaRPr lang="en-US"/>
+          </a:p>
+        </p:txBody>
+      </p:sp>
+      <p:cxnSp>
+        <p:nvCxnSpPr>
+          <p:cNvPr id="9" name="Straight Connector 8">
+            <a:extLst>
+              <a:ext uri="{FF2B5EF4-FFF2-40B4-BE49-F238E27FC236}">
+                <a16:creationId xmlns:a16="http://schemas.microsoft.com/office/drawing/2014/main" id="{233856FD-0107-FE9D-075F-2AC077C46395}"/>
+              </a:ext>
+            </a:extLst>
+          </p:cNvPr>
+          <p:cNvCxnSpPr>
+            <a:cxnSpLocks/>
+          </p:cNvCxnSpPr>
+          <p:nvPr/>
+        </p:nvCxnSpPr>
+        <p:spPr>
+          <a:xfrm flipH="1">
+            <a:off x="5072932" y="2886323"/>
+            <a:ext cx="63611" cy="2900000"/>
+          </a:xfrm>
+          <a:prstGeom prst="line">
+            <a:avLst/>
+          </a:prstGeom>
+          <a:ln>
+            <a:solidFill>
+              <a:srgbClr val="C00000"/>
+            </a:solidFill>
+          </a:ln>
+        </p:spPr>
+        <p:style>
+          <a:lnRef idx="2">
+            <a:schemeClr val="accent1"/>
+          </a:lnRef>
+          <a:fillRef idx="0">
+            <a:schemeClr val="accent1"/>
+          </a:fillRef>
+          <a:effectRef idx="1">
+            <a:schemeClr val="accent1"/>
+          </a:effectRef>
+          <a:fontRef idx="minor">
+            <a:schemeClr val="tx1"/>
+          </a:fontRef>
+        </p:style>
+      </p:cxnSp>
+      <p:cxnSp>
+        <p:nvCxnSpPr>
+          <p:cNvPr id="13" name="Straight Connector 12">
+            <a:extLst>
+              <a:ext uri="{FF2B5EF4-FFF2-40B4-BE49-F238E27FC236}">
+                <a16:creationId xmlns:a16="http://schemas.microsoft.com/office/drawing/2014/main" id="{76358204-49CA-2A26-F65F-4D6CB7928273}"/>
+              </a:ext>
+            </a:extLst>
+          </p:cNvPr>
+          <p:cNvCxnSpPr>
+            <a:cxnSpLocks/>
+          </p:cNvCxnSpPr>
+          <p:nvPr/>
+        </p:nvCxnSpPr>
+        <p:spPr>
+          <a:xfrm flipH="1">
+            <a:off x="4647845" y="2344484"/>
+            <a:ext cx="727236" cy="1682496"/>
+          </a:xfrm>
+          <a:prstGeom prst="line">
+            <a:avLst/>
+          </a:prstGeom>
+          <a:ln w="57150">
+            <a:solidFill>
+              <a:schemeClr val="accent5">
+                <a:lumMod val="75000"/>
+              </a:schemeClr>
+            </a:solidFill>
+          </a:ln>
+        </p:spPr>
+        <p:style>
+          <a:lnRef idx="2">
+            <a:schemeClr val="accent1"/>
+          </a:lnRef>
+          <a:fillRef idx="0">
+            <a:schemeClr val="accent1"/>
+          </a:fillRef>
+          <a:effectRef idx="1">
+            <a:schemeClr val="accent1"/>
+          </a:effectRef>
+          <a:fontRef idx="minor">
+            <a:schemeClr val="tx1"/>
+          </a:fontRef>
+        </p:style>
+      </p:cxnSp>
     </p:spTree>
     <p:extLst>
       <p:ext uri="{BB962C8B-B14F-4D97-AF65-F5344CB8AC3E}">
-        <p14:creationId xmlns:p14="http://schemas.microsoft.com/office/powerpoint/2010/main" val="1702201524"/>
+        <p14:creationId xmlns:p14="http://schemas.microsoft.com/office/powerpoint/2010/main" val="935032542"/>
       </p:ext>
     </p:extLst>
   </p:cSld>
@@ -26562,7 +27450,7 @@
         <p:cNvPr id="1" name="">
           <a:extLst>
             <a:ext uri="{FF2B5EF4-FFF2-40B4-BE49-F238E27FC236}">
-              <a16:creationId xmlns:a16="http://schemas.microsoft.com/office/drawing/2014/main" id="{76E4AB04-2945-B419-4F57-9F0584C783DD}"/>
+              <a16:creationId xmlns:a16="http://schemas.microsoft.com/office/drawing/2014/main" id="{995112F8-9804-103C-3303-5993DD3F8FA2}"/>
             </a:ext>
           </a:extLst>
         </p:cNvPr>
@@ -26579,44 +27467,134 @@
       </p:grpSpPr>
       <p:sp>
         <p:nvSpPr>
-          <p:cNvPr id="2" name="Title 1">
-            <a:extLst>
-              <a:ext uri="{FF2B5EF4-FFF2-40B4-BE49-F238E27FC236}">
-                <a16:creationId xmlns:a16="http://schemas.microsoft.com/office/drawing/2014/main" id="{79A25134-237B-33A6-2180-5AA21CA37263}"/>
-              </a:ext>
-            </a:extLst>
-          </p:cNvPr>
-          <p:cNvSpPr>
-            <a:spLocks noGrp="1"/>
+          <p:cNvPr id="4" name="Title 1">
+            <a:extLst>
+              <a:ext uri="{FF2B5EF4-FFF2-40B4-BE49-F238E27FC236}">
+                <a16:creationId xmlns:a16="http://schemas.microsoft.com/office/drawing/2014/main" id="{0D859898-C542-9DB3-E3D1-4EA539FF6C19}"/>
+              </a:ext>
+            </a:extLst>
+          </p:cNvPr>
+          <p:cNvSpPr txBox="1">
+            <a:spLocks/>
           </p:cNvSpPr>
-          <p:nvPr>
-            <p:ph type="title"/>
-          </p:nvPr>
+          <p:nvPr/>
         </p:nvSpPr>
-        <p:spPr/>
+        <p:spPr>
+          <a:xfrm>
+            <a:off x="990600" y="517525"/>
+            <a:ext cx="11079480" cy="1325563"/>
+          </a:xfrm>
+          <a:prstGeom prst="rect">
+            <a:avLst/>
+          </a:prstGeom>
+        </p:spPr>
         <p:txBody>
-          <a:bodyPr/>
-          <a:lstStyle/>
-          <a:p>
-            <a:endParaRPr lang="en-US"/>
+          <a:bodyPr vert="horz" lIns="91440" tIns="45720" rIns="91440" bIns="45720" rtlCol="0" anchor="ctr">
+            <a:normAutofit/>
+          </a:bodyPr>
+          <a:lstStyle>
+            <a:lvl1pPr algn="l" defTabSz="914400" rtl="0" eaLnBrk="1" latinLnBrk="0" hangingPunct="1">
+              <a:lnSpc>
+                <a:spcPct val="90000"/>
+              </a:lnSpc>
+              <a:spcBef>
+                <a:spcPct val="0"/>
+              </a:spcBef>
+              <a:buNone/>
+              <a:defRPr sz="4400" kern="1200">
+                <a:solidFill>
+                  <a:schemeClr val="tx1"/>
+                </a:solidFill>
+                <a:latin typeface="+mj-lt"/>
+                <a:ea typeface="+mj-ea"/>
+                <a:cs typeface="+mj-cs"/>
+              </a:defRPr>
+            </a:lvl1pPr>
+          </a:lstStyle>
+          <a:p>
+            <a:r>
+              <a:rPr lang="es-ES" dirty="0">
+                <a:solidFill>
+                  <a:srgbClr val="EB178E"/>
+                </a:solidFill>
+                <a:latin typeface="Arial" panose="020B0604020202020204" pitchFamily="34" charset="0"/>
+                <a:cs typeface="Arial" panose="020B0604020202020204" pitchFamily="34" charset="0"/>
+              </a:rPr>
+              <a:t>Optimización </a:t>
+            </a:r>
+            <a:r>
+              <a:rPr lang="es-ES" dirty="0" err="1">
+                <a:solidFill>
+                  <a:srgbClr val="EB178E"/>
+                </a:solidFill>
+                <a:latin typeface="Arial" panose="020B0604020202020204" pitchFamily="34" charset="0"/>
+                <a:cs typeface="Arial" panose="020B0604020202020204" pitchFamily="34" charset="0"/>
+              </a:rPr>
+              <a:t>weights</a:t>
+            </a:r>
+            <a:r>
+              <a:rPr lang="es-ES" dirty="0">
+                <a:solidFill>
+                  <a:srgbClr val="EB178E"/>
+                </a:solidFill>
+                <a:latin typeface="Arial" panose="020B0604020202020204" pitchFamily="34" charset="0"/>
+                <a:cs typeface="Arial" panose="020B0604020202020204" pitchFamily="34" charset="0"/>
+              </a:rPr>
+              <a:t> &amp; </a:t>
+            </a:r>
+            <a:r>
+              <a:rPr lang="es-ES" dirty="0" err="1">
+                <a:solidFill>
+                  <a:srgbClr val="EB178E"/>
+                </a:solidFill>
+                <a:latin typeface="Arial" panose="020B0604020202020204" pitchFamily="34" charset="0"/>
+                <a:cs typeface="Arial" panose="020B0604020202020204" pitchFamily="34" charset="0"/>
+              </a:rPr>
+              <a:t>bias</a:t>
+            </a:r>
+            <a:r>
+              <a:rPr lang="es-ES" dirty="0">
+                <a:solidFill>
+                  <a:srgbClr val="EB178E"/>
+                </a:solidFill>
+                <a:latin typeface="Arial" panose="020B0604020202020204" pitchFamily="34" charset="0"/>
+                <a:cs typeface="Arial" panose="020B0604020202020204" pitchFamily="34" charset="0"/>
+              </a:rPr>
+              <a:t> con </a:t>
+            </a:r>
+            <a:r>
+              <a:rPr lang="es-ES" dirty="0" err="1">
+                <a:solidFill>
+                  <a:srgbClr val="EB178E"/>
+                </a:solidFill>
+                <a:latin typeface="Arial" panose="020B0604020202020204" pitchFamily="34" charset="0"/>
+                <a:cs typeface="Arial" panose="020B0604020202020204" pitchFamily="34" charset="0"/>
+              </a:rPr>
+              <a:t>backpropagation</a:t>
+            </a:r>
+            <a:endParaRPr lang="en-US" dirty="0">
+              <a:solidFill>
+                <a:srgbClr val="EB178E"/>
+              </a:solidFill>
+              <a:latin typeface="Arial" panose="020B0604020202020204" pitchFamily="34" charset="0"/>
+              <a:cs typeface="Arial" panose="020B0604020202020204" pitchFamily="34" charset="0"/>
+            </a:endParaRPr>
           </a:p>
         </p:txBody>
       </p:sp>
       <p:pic>
         <p:nvPicPr>
-          <p:cNvPr id="1026" name="Picture 2">
-            <a:extLst>
-              <a:ext uri="{FF2B5EF4-FFF2-40B4-BE49-F238E27FC236}">
-                <a16:creationId xmlns:a16="http://schemas.microsoft.com/office/drawing/2014/main" id="{76A0DFAD-F3CD-0003-9697-79D06028394F}"/>
+          <p:cNvPr id="5" name="Picture 2">
+            <a:extLst>
+              <a:ext uri="{FF2B5EF4-FFF2-40B4-BE49-F238E27FC236}">
+                <a16:creationId xmlns:a16="http://schemas.microsoft.com/office/drawing/2014/main" id="{F3608539-1D15-2F72-B3E8-CC58F6C966F2}"/>
               </a:ext>
             </a:extLst>
           </p:cNvPr>
           <p:cNvPicPr>
-            <a:picLocks noGrp="1" noChangeAspect="1" noChangeArrowheads="1"/>
+            <a:picLocks noChangeAspect="1" noChangeArrowheads="1"/>
           </p:cNvPicPr>
-          <p:nvPr>
-            <p:ph idx="1"/>
-          </p:nvPr>
+          <p:nvPr/>
         </p:nvPicPr>
         <p:blipFill>
           <a:blip r:embed="rId2">
@@ -26651,10 +27629,238 @@
           </a:extLst>
         </p:spPr>
       </p:pic>
+      <p:pic>
+        <p:nvPicPr>
+          <p:cNvPr id="6" name="Picture 5" descr="A diagram of a clock&#10;&#10;AI-generated content may be incorrect.">
+            <a:extLst>
+              <a:ext uri="{FF2B5EF4-FFF2-40B4-BE49-F238E27FC236}">
+                <a16:creationId xmlns:a16="http://schemas.microsoft.com/office/drawing/2014/main" id="{C2340635-AB66-64CF-8E4B-93240CDDA746}"/>
+              </a:ext>
+            </a:extLst>
+          </p:cNvPr>
+          <p:cNvPicPr>
+            <a:picLocks noChangeAspect="1"/>
+          </p:cNvPicPr>
+          <p:nvPr/>
+        </p:nvPicPr>
+        <p:blipFill>
+          <a:blip r:embed="rId3">
+            <a:extLst>
+              <a:ext uri="{28A0092B-C50C-407E-A947-70E740481C1C}">
+                <a14:useLocalDpi xmlns:a14="http://schemas.microsoft.com/office/drawing/2010/main" val="0"/>
+              </a:ext>
+            </a:extLst>
+          </a:blip>
+          <a:stretch>
+            <a:fillRect/>
+          </a:stretch>
+        </p:blipFill>
+        <p:spPr>
+          <a:xfrm>
+            <a:off x="1568489" y="2571129"/>
+            <a:ext cx="9055022" cy="2895575"/>
+          </a:xfrm>
+          <a:prstGeom prst="rect">
+            <a:avLst/>
+          </a:prstGeom>
+        </p:spPr>
+      </p:pic>
+      <p:cxnSp>
+        <p:nvCxnSpPr>
+          <p:cNvPr id="3" name="Straight Arrow Connector 2">
+            <a:extLst>
+              <a:ext uri="{FF2B5EF4-FFF2-40B4-BE49-F238E27FC236}">
+                <a16:creationId xmlns:a16="http://schemas.microsoft.com/office/drawing/2014/main" id="{1C9C35FC-022B-579A-BB06-06EF34FD1CE8}"/>
+              </a:ext>
+            </a:extLst>
+          </p:cNvPr>
+          <p:cNvCxnSpPr/>
+          <p:nvPr/>
+        </p:nvCxnSpPr>
+        <p:spPr>
+          <a:xfrm>
+            <a:off x="1749288" y="2464904"/>
+            <a:ext cx="7863840" cy="0"/>
+          </a:xfrm>
+          <a:prstGeom prst="straightConnector1">
+            <a:avLst/>
+          </a:prstGeom>
+          <a:ln w="38100">
+            <a:tailEnd type="triangle"/>
+          </a:ln>
+        </p:spPr>
+        <p:style>
+          <a:lnRef idx="2">
+            <a:schemeClr val="dk1"/>
+          </a:lnRef>
+          <a:fillRef idx="0">
+            <a:schemeClr val="dk1"/>
+          </a:fillRef>
+          <a:effectRef idx="1">
+            <a:schemeClr val="dk1"/>
+          </a:effectRef>
+          <a:fontRef idx="minor">
+            <a:schemeClr val="tx1"/>
+          </a:fontRef>
+        </p:style>
+      </p:cxnSp>
+      <p:cxnSp>
+        <p:nvCxnSpPr>
+          <p:cNvPr id="8" name="Straight Arrow Connector 7">
+            <a:extLst>
+              <a:ext uri="{FF2B5EF4-FFF2-40B4-BE49-F238E27FC236}">
+                <a16:creationId xmlns:a16="http://schemas.microsoft.com/office/drawing/2014/main" id="{CE0B9104-A8F6-F658-8E33-AB2AEA8B4220}"/>
+              </a:ext>
+            </a:extLst>
+          </p:cNvPr>
+          <p:cNvCxnSpPr>
+            <a:cxnSpLocks/>
+          </p:cNvCxnSpPr>
+          <p:nvPr/>
+        </p:nvCxnSpPr>
+        <p:spPr>
+          <a:xfrm flipH="1">
+            <a:off x="2684227" y="5702410"/>
+            <a:ext cx="6823546" cy="0"/>
+          </a:xfrm>
+          <a:prstGeom prst="straightConnector1">
+            <a:avLst/>
+          </a:prstGeom>
+          <a:ln w="38100">
+            <a:tailEnd type="triangle"/>
+          </a:ln>
+        </p:spPr>
+        <p:style>
+          <a:lnRef idx="2">
+            <a:schemeClr val="dk1"/>
+          </a:lnRef>
+          <a:fillRef idx="0">
+            <a:schemeClr val="dk1"/>
+          </a:fillRef>
+          <a:effectRef idx="1">
+            <a:schemeClr val="dk1"/>
+          </a:effectRef>
+          <a:fontRef idx="minor">
+            <a:schemeClr val="tx1"/>
+          </a:fontRef>
+        </p:style>
+      </p:cxnSp>
+      <p:sp>
+        <p:nvSpPr>
+          <p:cNvPr id="11" name="TextBox 10">
+            <a:extLst>
+              <a:ext uri="{FF2B5EF4-FFF2-40B4-BE49-F238E27FC236}">
+                <a16:creationId xmlns:a16="http://schemas.microsoft.com/office/drawing/2014/main" id="{DC81BF27-23E5-421B-9D22-98D13EFFA03F}"/>
+              </a:ext>
+            </a:extLst>
+          </p:cNvPr>
+          <p:cNvSpPr txBox="1"/>
+          <p:nvPr/>
+        </p:nvSpPr>
+        <p:spPr>
+          <a:xfrm>
+            <a:off x="4945710" y="1969556"/>
+            <a:ext cx="2329733" cy="461665"/>
+          </a:xfrm>
+          <a:prstGeom prst="rect">
+            <a:avLst/>
+          </a:prstGeom>
+          <a:noFill/>
+        </p:spPr>
+        <p:txBody>
+          <a:bodyPr wrap="square" rtlCol="0">
+            <a:spAutoFit/>
+          </a:bodyPr>
+          <a:lstStyle/>
+          <a:p>
+            <a:r>
+              <a:rPr lang="es-ES" sz="2400" b="1" dirty="0"/>
+              <a:t>Forward </a:t>
+            </a:r>
+            <a:r>
+              <a:rPr lang="es-ES" sz="2400" b="1" dirty="0" err="1"/>
+              <a:t>pass</a:t>
+            </a:r>
+            <a:endParaRPr lang="en-US" sz="2400" b="1" dirty="0"/>
+          </a:p>
+        </p:txBody>
+      </p:sp>
+      <p:sp>
+        <p:nvSpPr>
+          <p:cNvPr id="12" name="TextBox 11">
+            <a:extLst>
+              <a:ext uri="{FF2B5EF4-FFF2-40B4-BE49-F238E27FC236}">
+                <a16:creationId xmlns:a16="http://schemas.microsoft.com/office/drawing/2014/main" id="{2C14E673-85FE-4D2B-6C48-08349BAA982C}"/>
+              </a:ext>
+            </a:extLst>
+          </p:cNvPr>
+          <p:cNvSpPr txBox="1"/>
+          <p:nvPr/>
+        </p:nvSpPr>
+        <p:spPr>
+          <a:xfrm>
+            <a:off x="4945710" y="5786323"/>
+            <a:ext cx="2838617" cy="461665"/>
+          </a:xfrm>
+          <a:prstGeom prst="rect">
+            <a:avLst/>
+          </a:prstGeom>
+          <a:noFill/>
+        </p:spPr>
+        <p:txBody>
+          <a:bodyPr wrap="square" rtlCol="0">
+            <a:spAutoFit/>
+          </a:bodyPr>
+          <a:lstStyle/>
+          <a:p>
+            <a:r>
+              <a:rPr lang="es-ES" sz="2400" b="1" dirty="0" err="1"/>
+              <a:t>Backpropagation</a:t>
+            </a:r>
+            <a:endParaRPr lang="en-US" sz="2400" b="1" dirty="0"/>
+          </a:p>
+        </p:txBody>
+      </p:sp>
+      <p:sp>
+        <p:nvSpPr>
+          <p:cNvPr id="13" name="TextBox 12">
+            <a:extLst>
+              <a:ext uri="{FF2B5EF4-FFF2-40B4-BE49-F238E27FC236}">
+                <a16:creationId xmlns:a16="http://schemas.microsoft.com/office/drawing/2014/main" id="{866E9F6A-E671-A44D-90D8-6541E85D7DAE}"/>
+              </a:ext>
+            </a:extLst>
+          </p:cNvPr>
+          <p:cNvSpPr txBox="1"/>
+          <p:nvPr/>
+        </p:nvSpPr>
+        <p:spPr>
+          <a:xfrm>
+            <a:off x="171616" y="5466704"/>
+            <a:ext cx="3155344" cy="461665"/>
+          </a:xfrm>
+          <a:prstGeom prst="rect">
+            <a:avLst/>
+          </a:prstGeom>
+          <a:noFill/>
+        </p:spPr>
+        <p:txBody>
+          <a:bodyPr wrap="square" rtlCol="0">
+            <a:spAutoFit/>
+          </a:bodyPr>
+          <a:lstStyle/>
+          <a:p>
+            <a:r>
+              <a:rPr lang="es-ES" sz="2400" dirty="0"/>
+              <a:t>Actualización W3</a:t>
+            </a:r>
+            <a:endParaRPr lang="en-US" sz="2400" dirty="0"/>
+          </a:p>
+        </p:txBody>
+      </p:sp>
     </p:spTree>
     <p:extLst>
       <p:ext uri="{BB962C8B-B14F-4D97-AF65-F5344CB8AC3E}">
-        <p14:creationId xmlns:p14="http://schemas.microsoft.com/office/powerpoint/2010/main" val="2581888322"/>
+        <p14:creationId xmlns:p14="http://schemas.microsoft.com/office/powerpoint/2010/main" val="900146271"/>
       </p:ext>
     </p:extLst>
   </p:cSld>
@@ -26954,6 +28160,783 @@
         <p:cNvPr id="1" name="">
           <a:extLst>
             <a:ext uri="{FF2B5EF4-FFF2-40B4-BE49-F238E27FC236}">
+              <a16:creationId xmlns:a16="http://schemas.microsoft.com/office/drawing/2014/main" id="{46C4D660-6A4C-B646-B7BE-F0959804453B}"/>
+            </a:ext>
+          </a:extLst>
+        </p:cNvPr>
+        <p:cNvGrpSpPr/>
+        <p:nvPr/>
+      </p:nvGrpSpPr>
+      <p:grpSpPr>
+        <a:xfrm>
+          <a:off x="0" y="0"/>
+          <a:ext cx="0" cy="0"/>
+          <a:chOff x="0" y="0"/>
+          <a:chExt cx="0" cy="0"/>
+        </a:xfrm>
+      </p:grpSpPr>
+      <p:pic>
+        <p:nvPicPr>
+          <p:cNvPr id="5" name="Picture 2">
+            <a:extLst>
+              <a:ext uri="{FF2B5EF4-FFF2-40B4-BE49-F238E27FC236}">
+                <a16:creationId xmlns:a16="http://schemas.microsoft.com/office/drawing/2014/main" id="{837FC799-7B81-A307-FFD9-BDFA0D18E14C}"/>
+              </a:ext>
+            </a:extLst>
+          </p:cNvPr>
+          <p:cNvPicPr>
+            <a:picLocks noChangeAspect="1" noChangeArrowheads="1"/>
+          </p:cNvPicPr>
+          <p:nvPr/>
+        </p:nvPicPr>
+        <p:blipFill>
+          <a:blip r:embed="rId2">
+            <a:extLst>
+              <a:ext uri="{28A0092B-C50C-407E-A947-70E740481C1C}">
+                <a14:useLocalDpi xmlns:a14="http://schemas.microsoft.com/office/drawing/2010/main" val="0"/>
+              </a:ext>
+            </a:extLst>
+          </a:blip>
+          <a:srcRect/>
+          <a:stretch>
+            <a:fillRect/>
+          </a:stretch>
+        </p:blipFill>
+        <p:spPr bwMode="auto">
+          <a:xfrm>
+            <a:off x="10881954" y="5786323"/>
+            <a:ext cx="943692" cy="852856"/>
+          </a:xfrm>
+          <a:prstGeom prst="rect">
+            <a:avLst/>
+          </a:prstGeom>
+          <a:noFill/>
+          <a:extLst>
+            <a:ext uri="{909E8E84-426E-40DD-AFC4-6F175D3DCCD1}">
+              <a14:hiddenFill xmlns:a14="http://schemas.microsoft.com/office/drawing/2010/main">
+                <a:solidFill>
+                  <a:srgbClr val="FFFFFF"/>
+                </a:solidFill>
+              </a14:hiddenFill>
+            </a:ext>
+          </a:extLst>
+        </p:spPr>
+      </p:pic>
+      <p:sp>
+        <p:nvSpPr>
+          <p:cNvPr id="6" name="TextBox 5">
+            <a:extLst>
+              <a:ext uri="{FF2B5EF4-FFF2-40B4-BE49-F238E27FC236}">
+                <a16:creationId xmlns:a16="http://schemas.microsoft.com/office/drawing/2014/main" id="{CB4B70AA-CDDF-2BC1-8775-0732B8C955E7}"/>
+              </a:ext>
+            </a:extLst>
+          </p:cNvPr>
+          <p:cNvSpPr txBox="1"/>
+          <p:nvPr/>
+        </p:nvSpPr>
+        <p:spPr>
+          <a:xfrm>
+            <a:off x="990599" y="1727276"/>
+            <a:ext cx="8736875" cy="584775"/>
+          </a:xfrm>
+          <a:prstGeom prst="rect">
+            <a:avLst/>
+          </a:prstGeom>
+          <a:noFill/>
+        </p:spPr>
+        <p:txBody>
+          <a:bodyPr wrap="square" rtlCol="0">
+            <a:spAutoFit/>
+          </a:bodyPr>
+          <a:lstStyle/>
+          <a:p>
+            <a:r>
+              <a:rPr lang="es-ES" sz="3200" dirty="0"/>
+              <a:t>¡Práctica!</a:t>
+            </a:r>
+            <a:endParaRPr lang="en-US" dirty="0"/>
+          </a:p>
+        </p:txBody>
+      </p:sp>
+      <p:pic>
+        <p:nvPicPr>
+          <p:cNvPr id="2" name="Picture 2">
+            <a:extLst>
+              <a:ext uri="{FF2B5EF4-FFF2-40B4-BE49-F238E27FC236}">
+                <a16:creationId xmlns:a16="http://schemas.microsoft.com/office/drawing/2014/main" id="{3477D16D-9759-F25C-A225-E2EF81296CDD}"/>
+              </a:ext>
+            </a:extLst>
+          </p:cNvPr>
+          <p:cNvPicPr>
+            <a:picLocks noChangeAspect="1" noChangeArrowheads="1"/>
+          </p:cNvPicPr>
+          <p:nvPr/>
+        </p:nvPicPr>
+        <p:blipFill>
+          <a:blip r:embed="rId3">
+            <a:extLst>
+              <a:ext uri="{28A0092B-C50C-407E-A947-70E740481C1C}">
+                <a14:useLocalDpi xmlns:a14="http://schemas.microsoft.com/office/drawing/2010/main" val="0"/>
+              </a:ext>
+            </a:extLst>
+          </a:blip>
+          <a:srcRect/>
+          <a:stretch>
+            <a:fillRect/>
+          </a:stretch>
+        </p:blipFill>
+        <p:spPr bwMode="auto">
+          <a:xfrm>
+            <a:off x="4902933" y="3019048"/>
+            <a:ext cx="2386134" cy="2767275"/>
+          </a:xfrm>
+          <a:prstGeom prst="rect">
+            <a:avLst/>
+          </a:prstGeom>
+          <a:noFill/>
+          <a:extLst>
+            <a:ext uri="{909E8E84-426E-40DD-AFC4-6F175D3DCCD1}">
+              <a14:hiddenFill xmlns:a14="http://schemas.microsoft.com/office/drawing/2010/main">
+                <a:solidFill>
+                  <a:srgbClr val="FFFFFF"/>
+                </a:solidFill>
+              </a14:hiddenFill>
+            </a:ext>
+          </a:extLst>
+        </p:spPr>
+      </p:pic>
+      <p:sp>
+        <p:nvSpPr>
+          <p:cNvPr id="3" name="Title 1">
+            <a:extLst>
+              <a:ext uri="{FF2B5EF4-FFF2-40B4-BE49-F238E27FC236}">
+                <a16:creationId xmlns:a16="http://schemas.microsoft.com/office/drawing/2014/main" id="{AF013A8C-31FC-6A62-561A-92AA3D990B5B}"/>
+              </a:ext>
+            </a:extLst>
+          </p:cNvPr>
+          <p:cNvSpPr txBox="1">
+            <a:spLocks/>
+          </p:cNvSpPr>
+          <p:nvPr/>
+        </p:nvSpPr>
+        <p:spPr>
+          <a:xfrm>
+            <a:off x="990600" y="517525"/>
+            <a:ext cx="11079480" cy="1325563"/>
+          </a:xfrm>
+          <a:prstGeom prst="rect">
+            <a:avLst/>
+          </a:prstGeom>
+        </p:spPr>
+        <p:txBody>
+          <a:bodyPr vert="horz" lIns="91440" tIns="45720" rIns="91440" bIns="45720" rtlCol="0" anchor="ctr">
+            <a:normAutofit/>
+          </a:bodyPr>
+          <a:lstStyle>
+            <a:lvl1pPr algn="l" defTabSz="914400" rtl="0" eaLnBrk="1" latinLnBrk="0" hangingPunct="1">
+              <a:lnSpc>
+                <a:spcPct val="90000"/>
+              </a:lnSpc>
+              <a:spcBef>
+                <a:spcPct val="0"/>
+              </a:spcBef>
+              <a:buNone/>
+              <a:defRPr sz="4400" kern="1200">
+                <a:solidFill>
+                  <a:schemeClr val="tx1"/>
+                </a:solidFill>
+                <a:latin typeface="+mj-lt"/>
+                <a:ea typeface="+mj-ea"/>
+                <a:cs typeface="+mj-cs"/>
+              </a:defRPr>
+            </a:lvl1pPr>
+          </a:lstStyle>
+          <a:p>
+            <a:r>
+              <a:rPr lang="es-ES" dirty="0">
+                <a:solidFill>
+                  <a:srgbClr val="EB178E"/>
+                </a:solidFill>
+                <a:latin typeface="Arial" panose="020B0604020202020204" pitchFamily="34" charset="0"/>
+                <a:cs typeface="Arial" panose="020B0604020202020204" pitchFamily="34" charset="0"/>
+              </a:rPr>
+              <a:t>Optimización </a:t>
+            </a:r>
+            <a:r>
+              <a:rPr lang="es-ES" dirty="0" err="1">
+                <a:solidFill>
+                  <a:srgbClr val="EB178E"/>
+                </a:solidFill>
+                <a:latin typeface="Arial" panose="020B0604020202020204" pitchFamily="34" charset="0"/>
+                <a:cs typeface="Arial" panose="020B0604020202020204" pitchFamily="34" charset="0"/>
+              </a:rPr>
+              <a:t>weights</a:t>
+            </a:r>
+            <a:r>
+              <a:rPr lang="es-ES" dirty="0">
+                <a:solidFill>
+                  <a:srgbClr val="EB178E"/>
+                </a:solidFill>
+                <a:latin typeface="Arial" panose="020B0604020202020204" pitchFamily="34" charset="0"/>
+                <a:cs typeface="Arial" panose="020B0604020202020204" pitchFamily="34" charset="0"/>
+              </a:rPr>
+              <a:t> &amp; </a:t>
+            </a:r>
+            <a:r>
+              <a:rPr lang="es-ES" dirty="0" err="1">
+                <a:solidFill>
+                  <a:srgbClr val="EB178E"/>
+                </a:solidFill>
+                <a:latin typeface="Arial" panose="020B0604020202020204" pitchFamily="34" charset="0"/>
+                <a:cs typeface="Arial" panose="020B0604020202020204" pitchFamily="34" charset="0"/>
+              </a:rPr>
+              <a:t>bias</a:t>
+            </a:r>
+            <a:r>
+              <a:rPr lang="es-ES" dirty="0">
+                <a:solidFill>
+                  <a:srgbClr val="EB178E"/>
+                </a:solidFill>
+                <a:latin typeface="Arial" panose="020B0604020202020204" pitchFamily="34" charset="0"/>
+                <a:cs typeface="Arial" panose="020B0604020202020204" pitchFamily="34" charset="0"/>
+              </a:rPr>
+              <a:t> con </a:t>
+            </a:r>
+            <a:r>
+              <a:rPr lang="es-ES" dirty="0" err="1">
+                <a:solidFill>
+                  <a:srgbClr val="EB178E"/>
+                </a:solidFill>
+                <a:latin typeface="Arial" panose="020B0604020202020204" pitchFamily="34" charset="0"/>
+                <a:cs typeface="Arial" panose="020B0604020202020204" pitchFamily="34" charset="0"/>
+              </a:rPr>
+              <a:t>backpropagation</a:t>
+            </a:r>
+            <a:endParaRPr lang="en-US" dirty="0">
+              <a:solidFill>
+                <a:srgbClr val="EB178E"/>
+              </a:solidFill>
+              <a:latin typeface="Arial" panose="020B0604020202020204" pitchFamily="34" charset="0"/>
+              <a:cs typeface="Arial" panose="020B0604020202020204" pitchFamily="34" charset="0"/>
+            </a:endParaRPr>
+          </a:p>
+        </p:txBody>
+      </p:sp>
+    </p:spTree>
+    <p:extLst>
+      <p:ext uri="{BB962C8B-B14F-4D97-AF65-F5344CB8AC3E}">
+        <p14:creationId xmlns:p14="http://schemas.microsoft.com/office/powerpoint/2010/main" val="1673312006"/>
+      </p:ext>
+    </p:extLst>
+  </p:cSld>
+  <p:clrMapOvr>
+    <a:masterClrMapping/>
+  </p:clrMapOvr>
+</p:sld>
+</file>
+
+<file path=ppt/slides/slide61.xml><?xml version="1.0" encoding="utf-8"?>
+<p:sld xmlns:a="http://schemas.openxmlformats.org/drawingml/2006/main" xmlns:r="http://schemas.openxmlformats.org/officeDocument/2006/relationships" xmlns:p="http://schemas.openxmlformats.org/presentationml/2006/main">
+  <p:cSld>
+    <p:spTree>
+      <p:nvGrpSpPr>
+        <p:cNvPr id="1" name=""/>
+        <p:cNvGrpSpPr/>
+        <p:nvPr/>
+      </p:nvGrpSpPr>
+      <p:grpSpPr>
+        <a:xfrm>
+          <a:off x="0" y="0"/>
+          <a:ext cx="0" cy="0"/>
+          <a:chOff x="0" y="0"/>
+          <a:chExt cx="0" cy="0"/>
+        </a:xfrm>
+      </p:grpSpPr>
+      <p:sp>
+        <p:nvSpPr>
+          <p:cNvPr id="2" name="Title 1">
+            <a:extLst>
+              <a:ext uri="{FF2B5EF4-FFF2-40B4-BE49-F238E27FC236}">
+                <a16:creationId xmlns:a16="http://schemas.microsoft.com/office/drawing/2014/main" id="{8E043C13-8C0E-FF33-1444-FA9616B4DF6D}"/>
+              </a:ext>
+            </a:extLst>
+          </p:cNvPr>
+          <p:cNvSpPr>
+            <a:spLocks noGrp="1"/>
+          </p:cNvSpPr>
+          <p:nvPr>
+            <p:ph type="title"/>
+          </p:nvPr>
+        </p:nvSpPr>
+        <p:spPr/>
+        <p:txBody>
+          <a:bodyPr/>
+          <a:lstStyle/>
+          <a:p>
+            <a:endParaRPr lang="en-US"/>
+          </a:p>
+        </p:txBody>
+      </p:sp>
+      <p:sp>
+        <p:nvSpPr>
+          <p:cNvPr id="3" name="Content Placeholder 2">
+            <a:extLst>
+              <a:ext uri="{FF2B5EF4-FFF2-40B4-BE49-F238E27FC236}">
+                <a16:creationId xmlns:a16="http://schemas.microsoft.com/office/drawing/2014/main" id="{C117A703-B4F0-C9E9-D197-E0E519810C2F}"/>
+              </a:ext>
+            </a:extLst>
+          </p:cNvPr>
+          <p:cNvSpPr>
+            <a:spLocks noGrp="1"/>
+          </p:cNvSpPr>
+          <p:nvPr>
+            <p:ph idx="1"/>
+          </p:nvPr>
+        </p:nvSpPr>
+        <p:spPr/>
+        <p:txBody>
+          <a:bodyPr/>
+          <a:lstStyle/>
+          <a:p>
+            <a:endParaRPr lang="en-US"/>
+          </a:p>
+        </p:txBody>
+      </p:sp>
+    </p:spTree>
+    <p:extLst>
+      <p:ext uri="{BB962C8B-B14F-4D97-AF65-F5344CB8AC3E}">
+        <p14:creationId xmlns:p14="http://schemas.microsoft.com/office/powerpoint/2010/main" val="2175711327"/>
+      </p:ext>
+    </p:extLst>
+  </p:cSld>
+  <p:clrMapOvr>
+    <a:masterClrMapping/>
+  </p:clrMapOvr>
+</p:sld>
+</file>
+
+<file path=ppt/slides/slide62.xml><?xml version="1.0" encoding="utf-8"?>
+<p:sld xmlns:a="http://schemas.openxmlformats.org/drawingml/2006/main" xmlns:r="http://schemas.openxmlformats.org/officeDocument/2006/relationships" xmlns:p="http://schemas.openxmlformats.org/presentationml/2006/main">
+  <p:cSld>
+    <p:spTree>
+      <p:nvGrpSpPr>
+        <p:cNvPr id="1" name=""/>
+        <p:cNvGrpSpPr/>
+        <p:nvPr/>
+      </p:nvGrpSpPr>
+      <p:grpSpPr>
+        <a:xfrm>
+          <a:off x="0" y="0"/>
+          <a:ext cx="0" cy="0"/>
+          <a:chOff x="0" y="0"/>
+          <a:chExt cx="0" cy="0"/>
+        </a:xfrm>
+      </p:grpSpPr>
+      <p:sp>
+        <p:nvSpPr>
+          <p:cNvPr id="2" name="Title 1">
+            <a:extLst>
+              <a:ext uri="{FF2B5EF4-FFF2-40B4-BE49-F238E27FC236}">
+                <a16:creationId xmlns:a16="http://schemas.microsoft.com/office/drawing/2014/main" id="{442EE8FE-62FD-B8ED-2B02-170082EDCC6E}"/>
+              </a:ext>
+            </a:extLst>
+          </p:cNvPr>
+          <p:cNvSpPr>
+            <a:spLocks noGrp="1"/>
+          </p:cNvSpPr>
+          <p:nvPr>
+            <p:ph type="title"/>
+          </p:nvPr>
+        </p:nvSpPr>
+        <p:spPr/>
+        <p:txBody>
+          <a:bodyPr/>
+          <a:lstStyle/>
+          <a:p>
+            <a:endParaRPr lang="en-US"/>
+          </a:p>
+        </p:txBody>
+      </p:sp>
+      <p:sp>
+        <p:nvSpPr>
+          <p:cNvPr id="3" name="Content Placeholder 2">
+            <a:extLst>
+              <a:ext uri="{FF2B5EF4-FFF2-40B4-BE49-F238E27FC236}">
+                <a16:creationId xmlns:a16="http://schemas.microsoft.com/office/drawing/2014/main" id="{76324C6C-6953-62F3-2ECD-36FB130C0E26}"/>
+              </a:ext>
+            </a:extLst>
+          </p:cNvPr>
+          <p:cNvSpPr>
+            <a:spLocks noGrp="1"/>
+          </p:cNvSpPr>
+          <p:nvPr>
+            <p:ph idx="1"/>
+          </p:nvPr>
+        </p:nvSpPr>
+        <p:spPr/>
+        <p:txBody>
+          <a:bodyPr/>
+          <a:lstStyle/>
+          <a:p>
+            <a:r>
+              <a:rPr lang="es-ES" dirty="0"/>
+              <a:t>Se podría meter ejemplo de calcular SSR para un input concreto</a:t>
+            </a:r>
+            <a:endParaRPr lang="en-US" dirty="0"/>
+          </a:p>
+        </p:txBody>
+      </p:sp>
+    </p:spTree>
+    <p:extLst>
+      <p:ext uri="{BB962C8B-B14F-4D97-AF65-F5344CB8AC3E}">
+        <p14:creationId xmlns:p14="http://schemas.microsoft.com/office/powerpoint/2010/main" val="3891003849"/>
+      </p:ext>
+    </p:extLst>
+  </p:cSld>
+  <p:clrMapOvr>
+    <a:masterClrMapping/>
+  </p:clrMapOvr>
+</p:sld>
+</file>
+
+<file path=ppt/slides/slide63.xml><?xml version="1.0" encoding="utf-8"?>
+<p:sld xmlns:a="http://schemas.openxmlformats.org/drawingml/2006/main" xmlns:r="http://schemas.openxmlformats.org/officeDocument/2006/relationships" xmlns:p="http://schemas.openxmlformats.org/presentationml/2006/main">
+  <p:cSld>
+    <p:spTree>
+      <p:nvGrpSpPr>
+        <p:cNvPr id="1" name="">
+          <a:extLst>
+            <a:ext uri="{FF2B5EF4-FFF2-40B4-BE49-F238E27FC236}">
+              <a16:creationId xmlns:a16="http://schemas.microsoft.com/office/drawing/2014/main" id="{5A26BCF4-75B3-2EB2-8A00-676D5F956E0F}"/>
+            </a:ext>
+          </a:extLst>
+        </p:cNvPr>
+        <p:cNvGrpSpPr/>
+        <p:nvPr/>
+      </p:nvGrpSpPr>
+      <p:grpSpPr>
+        <a:xfrm>
+          <a:off x="0" y="0"/>
+          <a:ext cx="0" cy="0"/>
+          <a:chOff x="0" y="0"/>
+          <a:chExt cx="0" cy="0"/>
+        </a:xfrm>
+      </p:grpSpPr>
+      <p:sp>
+        <p:nvSpPr>
+          <p:cNvPr id="2" name="Title 1">
+            <a:extLst>
+              <a:ext uri="{FF2B5EF4-FFF2-40B4-BE49-F238E27FC236}">
+                <a16:creationId xmlns:a16="http://schemas.microsoft.com/office/drawing/2014/main" id="{5470B7C3-0E8C-65FF-4A07-9AF7F51BAE1F}"/>
+              </a:ext>
+            </a:extLst>
+          </p:cNvPr>
+          <p:cNvSpPr>
+            <a:spLocks noGrp="1"/>
+          </p:cNvSpPr>
+          <p:nvPr>
+            <p:ph type="title"/>
+          </p:nvPr>
+        </p:nvSpPr>
+        <p:spPr/>
+        <p:txBody>
+          <a:bodyPr/>
+          <a:lstStyle/>
+          <a:p>
+            <a:endParaRPr lang="en-US"/>
+          </a:p>
+        </p:txBody>
+      </p:sp>
+      <p:pic>
+        <p:nvPicPr>
+          <p:cNvPr id="1026" name="Picture 2">
+            <a:extLst>
+              <a:ext uri="{FF2B5EF4-FFF2-40B4-BE49-F238E27FC236}">
+                <a16:creationId xmlns:a16="http://schemas.microsoft.com/office/drawing/2014/main" id="{9DE39476-2D0F-B5B5-48E3-08871A4A9729}"/>
+              </a:ext>
+            </a:extLst>
+          </p:cNvPr>
+          <p:cNvPicPr>
+            <a:picLocks noGrp="1" noChangeAspect="1" noChangeArrowheads="1"/>
+          </p:cNvPicPr>
+          <p:nvPr>
+            <p:ph idx="1"/>
+          </p:nvPr>
+        </p:nvPicPr>
+        <p:blipFill>
+          <a:blip r:embed="rId2">
+            <a:extLst>
+              <a:ext uri="{28A0092B-C50C-407E-A947-70E740481C1C}">
+                <a14:useLocalDpi xmlns:a14="http://schemas.microsoft.com/office/drawing/2010/main" val="0"/>
+              </a:ext>
+            </a:extLst>
+          </a:blip>
+          <a:srcRect/>
+          <a:stretch>
+            <a:fillRect/>
+          </a:stretch>
+        </p:blipFill>
+        <p:spPr bwMode="auto">
+          <a:xfrm>
+            <a:off x="10881954" y="5786323"/>
+            <a:ext cx="943692" cy="852856"/>
+          </a:xfrm>
+          <a:prstGeom prst="rect">
+            <a:avLst/>
+          </a:prstGeom>
+          <a:noFill/>
+          <a:extLst>
+            <a:ext uri="{909E8E84-426E-40DD-AFC4-6F175D3DCCD1}">
+              <a14:hiddenFill xmlns:a14="http://schemas.microsoft.com/office/drawing/2010/main">
+                <a:solidFill>
+                  <a:srgbClr val="FFFFFF"/>
+                </a:solidFill>
+              </a14:hiddenFill>
+            </a:ext>
+          </a:extLst>
+        </p:spPr>
+      </p:pic>
+    </p:spTree>
+    <p:extLst>
+      <p:ext uri="{BB962C8B-B14F-4D97-AF65-F5344CB8AC3E}">
+        <p14:creationId xmlns:p14="http://schemas.microsoft.com/office/powerpoint/2010/main" val="127420591"/>
+      </p:ext>
+    </p:extLst>
+  </p:cSld>
+  <p:clrMapOvr>
+    <a:masterClrMapping/>
+  </p:clrMapOvr>
+</p:sld>
+</file>
+
+<file path=ppt/slides/slide64.xml><?xml version="1.0" encoding="utf-8"?>
+<p:sld xmlns:a="http://schemas.openxmlformats.org/drawingml/2006/main" xmlns:r="http://schemas.openxmlformats.org/officeDocument/2006/relationships" xmlns:p="http://schemas.openxmlformats.org/presentationml/2006/main">
+  <p:cSld>
+    <p:spTree>
+      <p:nvGrpSpPr>
+        <p:cNvPr id="1" name="">
+          <a:extLst>
+            <a:ext uri="{FF2B5EF4-FFF2-40B4-BE49-F238E27FC236}">
+              <a16:creationId xmlns:a16="http://schemas.microsoft.com/office/drawing/2014/main" id="{AF327E39-ECCF-6910-8650-49F5528DCA3D}"/>
+            </a:ext>
+          </a:extLst>
+        </p:cNvPr>
+        <p:cNvGrpSpPr/>
+        <p:nvPr/>
+      </p:nvGrpSpPr>
+      <p:grpSpPr>
+        <a:xfrm>
+          <a:off x="0" y="0"/>
+          <a:ext cx="0" cy="0"/>
+          <a:chOff x="0" y="0"/>
+          <a:chExt cx="0" cy="0"/>
+        </a:xfrm>
+      </p:grpSpPr>
+      <p:sp>
+        <p:nvSpPr>
+          <p:cNvPr id="2" name="Title 1">
+            <a:extLst>
+              <a:ext uri="{FF2B5EF4-FFF2-40B4-BE49-F238E27FC236}">
+                <a16:creationId xmlns:a16="http://schemas.microsoft.com/office/drawing/2014/main" id="{768DC2AD-F381-28B0-514D-BA8D2F08813D}"/>
+              </a:ext>
+            </a:extLst>
+          </p:cNvPr>
+          <p:cNvSpPr>
+            <a:spLocks noGrp="1"/>
+          </p:cNvSpPr>
+          <p:nvPr>
+            <p:ph type="title"/>
+          </p:nvPr>
+        </p:nvSpPr>
+        <p:spPr/>
+        <p:txBody>
+          <a:bodyPr/>
+          <a:lstStyle/>
+          <a:p>
+            <a:endParaRPr lang="en-US"/>
+          </a:p>
+        </p:txBody>
+      </p:sp>
+      <p:pic>
+        <p:nvPicPr>
+          <p:cNvPr id="1026" name="Picture 2">
+            <a:extLst>
+              <a:ext uri="{FF2B5EF4-FFF2-40B4-BE49-F238E27FC236}">
+                <a16:creationId xmlns:a16="http://schemas.microsoft.com/office/drawing/2014/main" id="{3E468F40-DCF3-1544-29D7-FC2777B194D6}"/>
+              </a:ext>
+            </a:extLst>
+          </p:cNvPr>
+          <p:cNvPicPr>
+            <a:picLocks noGrp="1" noChangeAspect="1" noChangeArrowheads="1"/>
+          </p:cNvPicPr>
+          <p:nvPr>
+            <p:ph idx="1"/>
+          </p:nvPr>
+        </p:nvPicPr>
+        <p:blipFill>
+          <a:blip r:embed="rId2">
+            <a:extLst>
+              <a:ext uri="{28A0092B-C50C-407E-A947-70E740481C1C}">
+                <a14:useLocalDpi xmlns:a14="http://schemas.microsoft.com/office/drawing/2010/main" val="0"/>
+              </a:ext>
+            </a:extLst>
+          </a:blip>
+          <a:srcRect/>
+          <a:stretch>
+            <a:fillRect/>
+          </a:stretch>
+        </p:blipFill>
+        <p:spPr bwMode="auto">
+          <a:xfrm>
+            <a:off x="10881954" y="5786323"/>
+            <a:ext cx="943692" cy="852856"/>
+          </a:xfrm>
+          <a:prstGeom prst="rect">
+            <a:avLst/>
+          </a:prstGeom>
+          <a:noFill/>
+          <a:extLst>
+            <a:ext uri="{909E8E84-426E-40DD-AFC4-6F175D3DCCD1}">
+              <a14:hiddenFill xmlns:a14="http://schemas.microsoft.com/office/drawing/2010/main">
+                <a:solidFill>
+                  <a:srgbClr val="FFFFFF"/>
+                </a:solidFill>
+              </a14:hiddenFill>
+            </a:ext>
+          </a:extLst>
+        </p:spPr>
+      </p:pic>
+    </p:spTree>
+    <p:extLst>
+      <p:ext uri="{BB962C8B-B14F-4D97-AF65-F5344CB8AC3E}">
+        <p14:creationId xmlns:p14="http://schemas.microsoft.com/office/powerpoint/2010/main" val="1702201524"/>
+      </p:ext>
+    </p:extLst>
+  </p:cSld>
+  <p:clrMapOvr>
+    <a:masterClrMapping/>
+  </p:clrMapOvr>
+</p:sld>
+</file>
+
+<file path=ppt/slides/slide65.xml><?xml version="1.0" encoding="utf-8"?>
+<p:sld xmlns:a="http://schemas.openxmlformats.org/drawingml/2006/main" xmlns:r="http://schemas.openxmlformats.org/officeDocument/2006/relationships" xmlns:p="http://schemas.openxmlformats.org/presentationml/2006/main">
+  <p:cSld>
+    <p:spTree>
+      <p:nvGrpSpPr>
+        <p:cNvPr id="1" name="">
+          <a:extLst>
+            <a:ext uri="{FF2B5EF4-FFF2-40B4-BE49-F238E27FC236}">
+              <a16:creationId xmlns:a16="http://schemas.microsoft.com/office/drawing/2014/main" id="{76E4AB04-2945-B419-4F57-9F0584C783DD}"/>
+            </a:ext>
+          </a:extLst>
+        </p:cNvPr>
+        <p:cNvGrpSpPr/>
+        <p:nvPr/>
+      </p:nvGrpSpPr>
+      <p:grpSpPr>
+        <a:xfrm>
+          <a:off x="0" y="0"/>
+          <a:ext cx="0" cy="0"/>
+          <a:chOff x="0" y="0"/>
+          <a:chExt cx="0" cy="0"/>
+        </a:xfrm>
+      </p:grpSpPr>
+      <p:sp>
+        <p:nvSpPr>
+          <p:cNvPr id="2" name="Title 1">
+            <a:extLst>
+              <a:ext uri="{FF2B5EF4-FFF2-40B4-BE49-F238E27FC236}">
+                <a16:creationId xmlns:a16="http://schemas.microsoft.com/office/drawing/2014/main" id="{79A25134-237B-33A6-2180-5AA21CA37263}"/>
+              </a:ext>
+            </a:extLst>
+          </p:cNvPr>
+          <p:cNvSpPr>
+            <a:spLocks noGrp="1"/>
+          </p:cNvSpPr>
+          <p:nvPr>
+            <p:ph type="title"/>
+          </p:nvPr>
+        </p:nvSpPr>
+        <p:spPr/>
+        <p:txBody>
+          <a:bodyPr/>
+          <a:lstStyle/>
+          <a:p>
+            <a:endParaRPr lang="en-US"/>
+          </a:p>
+        </p:txBody>
+      </p:sp>
+      <p:pic>
+        <p:nvPicPr>
+          <p:cNvPr id="1026" name="Picture 2">
+            <a:extLst>
+              <a:ext uri="{FF2B5EF4-FFF2-40B4-BE49-F238E27FC236}">
+                <a16:creationId xmlns:a16="http://schemas.microsoft.com/office/drawing/2014/main" id="{76A0DFAD-F3CD-0003-9697-79D06028394F}"/>
+              </a:ext>
+            </a:extLst>
+          </p:cNvPr>
+          <p:cNvPicPr>
+            <a:picLocks noGrp="1" noChangeAspect="1" noChangeArrowheads="1"/>
+          </p:cNvPicPr>
+          <p:nvPr>
+            <p:ph idx="1"/>
+          </p:nvPr>
+        </p:nvPicPr>
+        <p:blipFill>
+          <a:blip r:embed="rId2">
+            <a:extLst>
+              <a:ext uri="{28A0092B-C50C-407E-A947-70E740481C1C}">
+                <a14:useLocalDpi xmlns:a14="http://schemas.microsoft.com/office/drawing/2010/main" val="0"/>
+              </a:ext>
+            </a:extLst>
+          </a:blip>
+          <a:srcRect/>
+          <a:stretch>
+            <a:fillRect/>
+          </a:stretch>
+        </p:blipFill>
+        <p:spPr bwMode="auto">
+          <a:xfrm>
+            <a:off x="10881954" y="5786323"/>
+            <a:ext cx="943692" cy="852856"/>
+          </a:xfrm>
+          <a:prstGeom prst="rect">
+            <a:avLst/>
+          </a:prstGeom>
+          <a:noFill/>
+          <a:extLst>
+            <a:ext uri="{909E8E84-426E-40DD-AFC4-6F175D3DCCD1}">
+              <a14:hiddenFill xmlns:a14="http://schemas.microsoft.com/office/drawing/2010/main">
+                <a:solidFill>
+                  <a:srgbClr val="FFFFFF"/>
+                </a:solidFill>
+              </a14:hiddenFill>
+            </a:ext>
+          </a:extLst>
+        </p:spPr>
+      </p:pic>
+    </p:spTree>
+    <p:extLst>
+      <p:ext uri="{BB962C8B-B14F-4D97-AF65-F5344CB8AC3E}">
+        <p14:creationId xmlns:p14="http://schemas.microsoft.com/office/powerpoint/2010/main" val="2581888322"/>
+      </p:ext>
+    </p:extLst>
+  </p:cSld>
+  <p:clrMapOvr>
+    <a:masterClrMapping/>
+  </p:clrMapOvr>
+</p:sld>
+</file>
+
+<file path=ppt/slides/slide66.xml><?xml version="1.0" encoding="utf-8"?>
+<p:sld xmlns:a="http://schemas.openxmlformats.org/drawingml/2006/main" xmlns:r="http://schemas.openxmlformats.org/officeDocument/2006/relationships" xmlns:p="http://schemas.openxmlformats.org/presentationml/2006/main">
+  <p:cSld>
+    <p:spTree>
+      <p:nvGrpSpPr>
+        <p:cNvPr id="1" name="">
+          <a:extLst>
+            <a:ext uri="{FF2B5EF4-FFF2-40B4-BE49-F238E27FC236}">
               <a16:creationId xmlns:a16="http://schemas.microsoft.com/office/drawing/2014/main" id="{DA8BDF43-C7CA-4F32-E57A-810BE1CB32A5}"/>
             </a:ext>
           </a:extLst>
@@ -27056,7 +29039,7 @@
 </p:sld>
 </file>
 
-<file path=ppt/slides/slide61.xml><?xml version="1.0" encoding="utf-8"?>
+<file path=ppt/slides/slide67.xml><?xml version="1.0" encoding="utf-8"?>
 <p:sld xmlns:a="http://schemas.openxmlformats.org/drawingml/2006/main" xmlns:r="http://schemas.openxmlformats.org/officeDocument/2006/relationships" xmlns:p="http://schemas.openxmlformats.org/presentationml/2006/main">
   <p:cSld>
     <p:spTree>
@@ -27166,7 +29149,7 @@
 </p:sld>
 </file>
 
-<file path=ppt/slides/slide62.xml><?xml version="1.0" encoding="utf-8"?>
+<file path=ppt/slides/slide68.xml><?xml version="1.0" encoding="utf-8"?>
 <p:sld xmlns:a="http://schemas.openxmlformats.org/drawingml/2006/main" xmlns:r="http://schemas.openxmlformats.org/officeDocument/2006/relationships" xmlns:p="http://schemas.openxmlformats.org/presentationml/2006/main">
   <p:cSld>
     <p:spTree>
@@ -27276,7 +29259,7 @@
 </p:sld>
 </file>
 
-<file path=ppt/slides/slide63.xml><?xml version="1.0" encoding="utf-8"?>
+<file path=ppt/slides/slide69.xml><?xml version="1.0" encoding="utf-8"?>
 <p:sld xmlns:a="http://schemas.openxmlformats.org/drawingml/2006/main" xmlns:r="http://schemas.openxmlformats.org/officeDocument/2006/relationships" xmlns:p="http://schemas.openxmlformats.org/presentationml/2006/main">
   <p:cSld>
     <p:spTree>

</xml_diff>